<commit_message>
Updates to code and PPTX
</commit_message>
<xml_diff>
--- a/CCSC-MW Fall 2024 Conference Tutorial.pptx
+++ b/CCSC-MW Fall 2024 Conference Tutorial.pptx
@@ -6,7 +6,7 @@
     <p:sldMasterId id="2147483664" r:id="rId2"/>
   </p:sldMasterIdLst>
   <p:notesMasterIdLst>
-    <p:notesMasterId r:id="rId22"/>
+    <p:notesMasterId r:id="rId21"/>
   </p:notesMasterIdLst>
   <p:sldIdLst>
     <p:sldId id="256" r:id="rId3"/>
@@ -19,15 +19,14 @@
     <p:sldId id="399" r:id="rId10"/>
     <p:sldId id="413" r:id="rId11"/>
     <p:sldId id="414" r:id="rId12"/>
-    <p:sldId id="445" r:id="rId13"/>
-    <p:sldId id="452" r:id="rId14"/>
-    <p:sldId id="447" r:id="rId15"/>
-    <p:sldId id="454" r:id="rId16"/>
-    <p:sldId id="448" r:id="rId17"/>
-    <p:sldId id="450" r:id="rId18"/>
-    <p:sldId id="451" r:id="rId19"/>
-    <p:sldId id="449" r:id="rId20"/>
-    <p:sldId id="453" r:id="rId21"/>
+    <p:sldId id="452" r:id="rId13"/>
+    <p:sldId id="447" r:id="rId14"/>
+    <p:sldId id="454" r:id="rId15"/>
+    <p:sldId id="448" r:id="rId16"/>
+    <p:sldId id="450" r:id="rId17"/>
+    <p:sldId id="451" r:id="rId18"/>
+    <p:sldId id="449" r:id="rId19"/>
+    <p:sldId id="453" r:id="rId20"/>
   </p:sldIdLst>
   <p:sldSz cx="12192000" cy="6858000"/>
   <p:notesSz cx="6858000" cy="9144000"/>
@@ -141,7 +140,6 @@
             <p14:sldId id="399"/>
             <p14:sldId id="413"/>
             <p14:sldId id="414"/>
-            <p14:sldId id="445"/>
             <p14:sldId id="452"/>
             <p14:sldId id="447"/>
             <p14:sldId id="454"/>
@@ -172,7 +170,7 @@
   <pc:docChgLst>
     <pc:chgData name="Nicholson, Delmer (Bill) (nicholdw)" userId="b56c8833-ee42-4335-8085-70d597acedf2" providerId="ADAL" clId="{FB213E8F-52F0-4CAB-A62F-63FF4F093653}"/>
     <pc:docChg chg="undo custSel addSld delSld modSld modSection">
-      <pc:chgData name="Nicholson, Delmer (Bill) (nicholdw)" userId="b56c8833-ee42-4335-8085-70d597acedf2" providerId="ADAL" clId="{FB213E8F-52F0-4CAB-A62F-63FF4F093653}" dt="2024-09-16T16:27:07.265" v="705" actId="47"/>
+      <pc:chgData name="Nicholson, Delmer (Bill) (nicholdw)" userId="b56c8833-ee42-4335-8085-70d597acedf2" providerId="ADAL" clId="{FB213E8F-52F0-4CAB-A62F-63FF4F093653}" dt="2024-09-17T18:39:38.447" v="711" actId="6549"/>
       <pc:docMkLst>
         <pc:docMk/>
       </pc:docMkLst>
@@ -491,6 +489,13 @@
           <pc:sldMk cId="2368070232" sldId="443"/>
         </pc:sldMkLst>
       </pc:sldChg>
+      <pc:sldChg chg="del">
+        <pc:chgData name="Nicholson, Delmer (Bill) (nicholdw)" userId="b56c8833-ee42-4335-8085-70d597acedf2" providerId="ADAL" clId="{FB213E8F-52F0-4CAB-A62F-63FF4F093653}" dt="2024-09-17T18:30:17.512" v="706" actId="47"/>
+        <pc:sldMkLst>
+          <pc:docMk/>
+          <pc:sldMk cId="1094644783" sldId="445"/>
+        </pc:sldMkLst>
+      </pc:sldChg>
       <pc:sldChg chg="modSp mod">
         <pc:chgData name="Nicholson, Delmer (Bill) (nicholdw)" userId="b56c8833-ee42-4335-8085-70d597acedf2" providerId="ADAL" clId="{FB213E8F-52F0-4CAB-A62F-63FF4F093653}" dt="2024-09-16T16:04:58.651" v="678" actId="20577"/>
         <pc:sldMkLst>
@@ -522,13 +527,13 @@
         </pc:spChg>
       </pc:sldChg>
       <pc:sldChg chg="modSp mod">
-        <pc:chgData name="Nicholson, Delmer (Bill) (nicholdw)" userId="b56c8833-ee42-4335-8085-70d597acedf2" providerId="ADAL" clId="{FB213E8F-52F0-4CAB-A62F-63FF4F093653}" dt="2024-09-16T15:58:40.560" v="639" actId="114"/>
+        <pc:chgData name="Nicholson, Delmer (Bill) (nicholdw)" userId="b56c8833-ee42-4335-8085-70d597acedf2" providerId="ADAL" clId="{FB213E8F-52F0-4CAB-A62F-63FF4F093653}" dt="2024-09-17T18:39:14.416" v="710" actId="20577"/>
         <pc:sldMkLst>
           <pc:docMk/>
           <pc:sldMk cId="448040412" sldId="450"/>
         </pc:sldMkLst>
         <pc:spChg chg="mod">
-          <ac:chgData name="Nicholson, Delmer (Bill) (nicholdw)" userId="b56c8833-ee42-4335-8085-70d597acedf2" providerId="ADAL" clId="{FB213E8F-52F0-4CAB-A62F-63FF4F093653}" dt="2024-09-16T15:58:40.560" v="639" actId="114"/>
+          <ac:chgData name="Nicholson, Delmer (Bill) (nicholdw)" userId="b56c8833-ee42-4335-8085-70d597acedf2" providerId="ADAL" clId="{FB213E8F-52F0-4CAB-A62F-63FF4F093653}" dt="2024-09-17T18:39:14.416" v="710" actId="20577"/>
           <ac:spMkLst>
             <pc:docMk/>
             <pc:sldMk cId="448040412" sldId="450"/>
@@ -537,13 +542,13 @@
         </pc:spChg>
       </pc:sldChg>
       <pc:sldChg chg="modSp mod">
-        <pc:chgData name="Nicholson, Delmer (Bill) (nicholdw)" userId="b56c8833-ee42-4335-8085-70d597acedf2" providerId="ADAL" clId="{FB213E8F-52F0-4CAB-A62F-63FF4F093653}" dt="2024-09-16T15:58:54.424" v="645" actId="20577"/>
+        <pc:chgData name="Nicholson, Delmer (Bill) (nicholdw)" userId="b56c8833-ee42-4335-8085-70d597acedf2" providerId="ADAL" clId="{FB213E8F-52F0-4CAB-A62F-63FF4F093653}" dt="2024-09-17T18:39:38.447" v="711" actId="6549"/>
         <pc:sldMkLst>
           <pc:docMk/>
           <pc:sldMk cId="2895837283" sldId="451"/>
         </pc:sldMkLst>
         <pc:spChg chg="mod">
-          <ac:chgData name="Nicholson, Delmer (Bill) (nicholdw)" userId="b56c8833-ee42-4335-8085-70d597acedf2" providerId="ADAL" clId="{FB213E8F-52F0-4CAB-A62F-63FF4F093653}" dt="2024-09-16T15:58:54.424" v="645" actId="20577"/>
+          <ac:chgData name="Nicholson, Delmer (Bill) (nicholdw)" userId="b56c8833-ee42-4335-8085-70d597acedf2" providerId="ADAL" clId="{FB213E8F-52F0-4CAB-A62F-63FF4F093653}" dt="2024-09-17T18:39:38.447" v="711" actId="6549"/>
           <ac:spMkLst>
             <pc:docMk/>
             <pc:sldMk cId="2895837283" sldId="451"/>
@@ -638,7 +643,7 @@
         </pc:spChg>
       </pc:sldChg>
       <pc:sldChg chg="addSp modSp new mod">
-        <pc:chgData name="Nicholson, Delmer (Bill) (nicholdw)" userId="b56c8833-ee42-4335-8085-70d597acedf2" providerId="ADAL" clId="{FB213E8F-52F0-4CAB-A62F-63FF4F093653}" dt="2024-09-16T15:57:14.780" v="638" actId="6549"/>
+        <pc:chgData name="Nicholson, Delmer (Bill) (nicholdw)" userId="b56c8833-ee42-4335-8085-70d597acedf2" providerId="ADAL" clId="{FB213E8F-52F0-4CAB-A62F-63FF4F093653}" dt="2024-09-17T18:38:42.024" v="709" actId="20577"/>
         <pc:sldMkLst>
           <pc:docMk/>
           <pc:sldMk cId="1685030177" sldId="454"/>
@@ -652,7 +657,7 @@
           </ac:spMkLst>
         </pc:spChg>
         <pc:spChg chg="mod">
-          <ac:chgData name="Nicholson, Delmer (Bill) (nicholdw)" userId="b56c8833-ee42-4335-8085-70d597acedf2" providerId="ADAL" clId="{FB213E8F-52F0-4CAB-A62F-63FF4F093653}" dt="2024-09-16T15:57:14.780" v="638" actId="6549"/>
+          <ac:chgData name="Nicholson, Delmer (Bill) (nicholdw)" userId="b56c8833-ee42-4335-8085-70d597acedf2" providerId="ADAL" clId="{FB213E8F-52F0-4CAB-A62F-63FF4F093653}" dt="2024-09-17T18:38:42.024" v="709" actId="20577"/>
           <ac:spMkLst>
             <pc:docMk/>
             <pc:sldMk cId="1685030177" sldId="454"/>
@@ -755,7 +760,7 @@
           <a:p>
             <a:fld id="{52C640F9-5F57-4A56-A18C-41BD23F454DE}" type="datetimeFigureOut">
               <a:rPr lang="en-US" smtClean="0"/>
-              <a:t>9/16/2024</a:t>
+              <a:t>9/17/2024</a:t>
             </a:fld>
             <a:endParaRPr lang="en-US" dirty="0"/>
           </a:p>
@@ -4366,7 +4371,7 @@
           <a:p>
             <a:fld id="{6DAF16FE-B93F-47FF-95FE-4BD6A1B07446}" type="datetimeFigureOut">
               <a:rPr lang="en-US" smtClean="0"/>
-              <a:t>9/16/2024</a:t>
+              <a:t>9/17/2024</a:t>
             </a:fld>
             <a:endParaRPr lang="en-US" dirty="0"/>
           </a:p>
@@ -5940,13 +5945,7 @@
   <p:cSld>
     <p:spTree>
       <p:nvGrpSpPr>
-        <p:cNvPr id="1" name="">
-          <a:extLst>
-            <a:ext uri="{FF2B5EF4-FFF2-40B4-BE49-F238E27FC236}">
-              <a16:creationId xmlns:a16="http://schemas.microsoft.com/office/drawing/2014/main" id="{797DE611-B605-2B04-19E1-00F5D0AD9BA6}"/>
-            </a:ext>
-          </a:extLst>
-        </p:cNvPr>
+        <p:cNvPr id="1" name=""/>
         <p:cNvGrpSpPr/>
         <p:nvPr/>
       </p:nvGrpSpPr>
@@ -5963,7 +5962,7 @@
           <p:cNvPr id="2" name="Title 1">
             <a:extLst>
               <a:ext uri="{FF2B5EF4-FFF2-40B4-BE49-F238E27FC236}">
-                <a16:creationId xmlns:a16="http://schemas.microsoft.com/office/drawing/2014/main" id="{5C5FDB18-0542-D7D2-9D0D-BC283CA93D5E}"/>
+                <a16:creationId xmlns:a16="http://schemas.microsoft.com/office/drawing/2014/main" id="{3220A0A9-208F-459C-5048-A528233BA955}"/>
               </a:ext>
             </a:extLst>
           </p:cNvPr>
@@ -5974,134 +5973,24 @@
             <p:ph type="title"/>
           </p:nvPr>
         </p:nvSpPr>
-        <p:spPr>
-          <a:xfrm>
-            <a:off x="609600" y="274638"/>
-            <a:ext cx="10972800" cy="656091"/>
-          </a:xfrm>
-        </p:spPr>
-        <p:txBody>
-          <a:bodyPr>
-            <a:normAutofit fontScale="90000"/>
-          </a:bodyPr>
-          <a:lstStyle/>
-          <a:p>
-            <a:r>
-              <a:rPr lang="en-US" dirty="0"/>
-              <a:t>Previous question and correct answer</a:t>
-            </a:r>
-          </a:p>
-        </p:txBody>
-      </p:sp>
-      <p:sp>
-        <p:nvSpPr>
-          <p:cNvPr id="3" name="Content Placeholder 2">
-            <a:extLst>
-              <a:ext uri="{FF2B5EF4-FFF2-40B4-BE49-F238E27FC236}">
-                <a16:creationId xmlns:a16="http://schemas.microsoft.com/office/drawing/2014/main" id="{6898E637-35FC-0EDB-1C03-E916E6122298}"/>
-              </a:ext>
-            </a:extLst>
-          </p:cNvPr>
-          <p:cNvSpPr>
-            <a:spLocks noGrp="1"/>
-          </p:cNvSpPr>
-          <p:nvPr>
-            <p:ph idx="1"/>
-          </p:nvPr>
-        </p:nvSpPr>
-        <p:spPr>
-          <a:xfrm>
-            <a:off x="805543" y="1446543"/>
-            <a:ext cx="11208258" cy="1713036"/>
-          </a:xfrm>
-        </p:spPr>
+        <p:spPr/>
         <p:txBody>
           <a:bodyPr/>
           <a:lstStyle/>
           <a:p>
-            <a:pPr marL="0" indent="0">
-              <a:buNone/>
-            </a:pPr>
-            <a:r>
-              <a:rPr lang="en-US" b="0" i="0" u="none" strike="noStrike" dirty="0">
-                <a:solidFill>
-                  <a:srgbClr val="000000"/>
-                </a:solidFill>
-                <a:effectLst/>
-              </a:rPr>
-              <a:t>“</a:t>
-            </a:r>
-            <a:r>
-              <a:rPr lang="en-US" sz="2800" dirty="0">
-                <a:solidFill>
-                  <a:srgbClr val="000000"/>
-                </a:solidFill>
-                <a:effectLst/>
-                <a:highlight>
-                  <a:srgbClr val="FFFFFF"/>
-                </a:highlight>
-                <a:latin typeface="Courier New" panose="02070309020205020404" pitchFamily="49" charset="0"/>
-              </a:rPr>
-              <a:t>How many penguins are less than 8 years old and weight less than 12 kg?</a:t>
-            </a:r>
-            <a:r>
-              <a:rPr lang="en-US" b="0" i="0" u="none" strike="noStrike" dirty="0">
-                <a:solidFill>
-                  <a:srgbClr val="000000"/>
-                </a:solidFill>
-                <a:effectLst/>
-              </a:rPr>
-              <a:t>”</a:t>
-            </a:r>
-            <a:endParaRPr lang="en-US" dirty="0"/>
-          </a:p>
-        </p:txBody>
-      </p:sp>
-      <p:sp>
-        <p:nvSpPr>
-          <p:cNvPr id="5" name="TextBox 4">
-            <a:extLst>
-              <a:ext uri="{FF2B5EF4-FFF2-40B4-BE49-F238E27FC236}">
-                <a16:creationId xmlns:a16="http://schemas.microsoft.com/office/drawing/2014/main" id="{F252B297-9A82-10E0-A82B-28BB50695AF2}"/>
-              </a:ext>
-            </a:extLst>
-          </p:cNvPr>
-          <p:cNvSpPr txBox="1"/>
-          <p:nvPr/>
-        </p:nvSpPr>
-        <p:spPr>
-          <a:xfrm>
-            <a:off x="4951206" y="3243684"/>
-            <a:ext cx="1366467" cy="584775"/>
-          </a:xfrm>
-          <a:prstGeom prst="rect">
-            <a:avLst/>
-          </a:prstGeom>
-          <a:noFill/>
-        </p:spPr>
-        <p:txBody>
-          <a:bodyPr wrap="square">
-            <a:spAutoFit/>
-          </a:bodyPr>
-          <a:lstStyle/>
-          <a:p>
-            <a:r>
-              <a:rPr lang="en-US" sz="3200" dirty="0">
-                <a:highlight>
-                  <a:srgbClr val="FFFF00"/>
-                </a:highlight>
-              </a:rPr>
-              <a:t>One</a:t>
-            </a:r>
-          </a:p>
-        </p:txBody>
-      </p:sp>
-      <p:sp>
-        <p:nvSpPr>
-          <p:cNvPr id="4" name="Title 3">
-            <a:extLst>
-              <a:ext uri="{FF2B5EF4-FFF2-40B4-BE49-F238E27FC236}">
-                <a16:creationId xmlns:a16="http://schemas.microsoft.com/office/drawing/2014/main" id="{E420F32A-A027-EA56-34D6-35D68A5D5959}"/>
+            <a:r>
+              <a:rPr lang="en-US"/>
+              <a:t>The data in this benchmark is JSON</a:t>
+            </a:r>
+          </a:p>
+        </p:txBody>
+      </p:sp>
+      <p:sp>
+        <p:nvSpPr>
+          <p:cNvPr id="6" name="Title 3">
+            <a:extLst>
+              <a:ext uri="{FF2B5EF4-FFF2-40B4-BE49-F238E27FC236}">
+                <a16:creationId xmlns:a16="http://schemas.microsoft.com/office/drawing/2014/main" id="{6213C0AA-6FCF-6ACD-E765-073E1409A8BA}"/>
               </a:ext>
             </a:extLst>
           </p:cNvPr>
@@ -6161,10 +6050,54 @@
           </a:p>
         </p:txBody>
       </p:sp>
+      <p:sp>
+        <p:nvSpPr>
+          <p:cNvPr id="12" name="TextBox 11">
+            <a:extLst>
+              <a:ext uri="{FF2B5EF4-FFF2-40B4-BE49-F238E27FC236}">
+                <a16:creationId xmlns:a16="http://schemas.microsoft.com/office/drawing/2014/main" id="{4BA69257-0CD2-1F7E-9A42-3E277FA41BA1}"/>
+              </a:ext>
+            </a:extLst>
+          </p:cNvPr>
+          <p:cNvSpPr txBox="1"/>
+          <p:nvPr/>
+        </p:nvSpPr>
+        <p:spPr>
+          <a:xfrm>
+            <a:off x="1069974" y="1863289"/>
+            <a:ext cx="10410825" cy="2031325"/>
+          </a:xfrm>
+          <a:prstGeom prst="rect">
+            <a:avLst/>
+          </a:prstGeom>
+          <a:noFill/>
+        </p:spPr>
+        <p:txBody>
+          <a:bodyPr wrap="square">
+            <a:spAutoFit/>
+          </a:bodyPr>
+          <a:lstStyle/>
+          <a:p>
+            <a:r>
+              <a:rPr lang="en-US"/>
+              <a:t>{"input": "Here is a table where the first line is a header and each subsequent line is a penguin:  name, age, height (cm), weight (kg) Louis, 7, 50, 11 Bernard, 5, 80, 13 Vincent, 9, 60, 11 Gwen, 8, 70, 15  For example: the age of Louis is 7, the weight of Gwen is 15 kg, the height of Bernard is 80 cm.  We now add a penguin to the table:\nJames, 12, 90, 12\nHow many penguins are less than 8 years old and weight less than 12 kg?\nOptions:\n(A) 1\n(B) 2\n(C) 3\n(D) 4\n(E) 5", </a:t>
+            </a:r>
+          </a:p>
+          <a:p>
+            <a:endParaRPr lang="en-US"/>
+          </a:p>
+          <a:p>
+            <a:r>
+              <a:rPr lang="en-US"/>
+              <a:t>"target": "(A)"},</a:t>
+            </a:r>
+          </a:p>
+        </p:txBody>
+      </p:sp>
     </p:spTree>
     <p:extLst>
       <p:ext uri="{BB962C8B-B14F-4D97-AF65-F5344CB8AC3E}">
-        <p14:creationId xmlns:p14="http://schemas.microsoft.com/office/powerpoint/2010/main" val="1094644783"/>
+        <p14:creationId xmlns:p14="http://schemas.microsoft.com/office/powerpoint/2010/main" val="3049971536"/>
       </p:ext>
     </p:extLst>
   </p:cSld>
@@ -6196,7 +6129,7 @@
           <p:cNvPr id="2" name="Title 1">
             <a:extLst>
               <a:ext uri="{FF2B5EF4-FFF2-40B4-BE49-F238E27FC236}">
-                <a16:creationId xmlns:a16="http://schemas.microsoft.com/office/drawing/2014/main" id="{3220A0A9-208F-459C-5048-A528233BA955}"/>
+                <a16:creationId xmlns:a16="http://schemas.microsoft.com/office/drawing/2014/main" id="{D4E835D7-4D32-E76F-D434-903A42971593}"/>
               </a:ext>
             </a:extLst>
           </p:cNvPr>
@@ -6214,124 +6147,100 @@
           <a:p>
             <a:r>
               <a:rPr lang="en-US"/>
-              <a:t>The data in this benchmark is JSON</a:t>
-            </a:r>
-          </a:p>
-        </p:txBody>
-      </p:sp>
-      <p:sp>
-        <p:nvSpPr>
-          <p:cNvPr id="6" name="Title 3">
-            <a:extLst>
-              <a:ext uri="{FF2B5EF4-FFF2-40B4-BE49-F238E27FC236}">
-                <a16:creationId xmlns:a16="http://schemas.microsoft.com/office/drawing/2014/main" id="{6213C0AA-6FCF-6ACD-E765-073E1409A8BA}"/>
-              </a:ext>
-            </a:extLst>
-          </p:cNvPr>
-          <p:cNvSpPr txBox="1">
-            <a:spLocks/>
-          </p:cNvSpPr>
-          <p:nvPr/>
-        </p:nvSpPr>
-        <p:spPr>
-          <a:xfrm>
-            <a:off x="79077" y="6267450"/>
-            <a:ext cx="3172123" cy="517730"/>
-          </a:xfrm>
-          <a:prstGeom prst="rect">
-            <a:avLst/>
-          </a:prstGeom>
-          <a:solidFill>
-            <a:schemeClr val="bg1"/>
-          </a:solidFill>
-          <a:effectLst>
-            <a:outerShdw blurRad="50800" dist="38100" dir="8100000" algn="tr" rotWithShape="0">
-              <a:prstClr val="black">
-                <a:alpha val="40000"/>
-              </a:prstClr>
-            </a:outerShdw>
-          </a:effectLst>
-        </p:spPr>
-        <p:txBody>
-          <a:bodyPr vert="horz" lIns="91440" tIns="45720" rIns="91440" bIns="45720" rtlCol="0" anchor="ctr">
-            <a:normAutofit fontScale="97500"/>
-          </a:bodyPr>
-          <a:lstStyle>
-            <a:lvl1pPr algn="l" defTabSz="914400" rtl="0" eaLnBrk="1" latinLnBrk="0" hangingPunct="1">
-              <a:lnSpc>
-                <a:spcPct val="90000"/>
-              </a:lnSpc>
-              <a:spcBef>
-                <a:spcPct val="0"/>
-              </a:spcBef>
-              <a:buNone/>
-              <a:defRPr sz="4400" kern="1200">
-                <a:solidFill>
-                  <a:schemeClr val="tx1"/>
-                </a:solidFill>
-                <a:latin typeface="+mj-lt"/>
-                <a:ea typeface="+mj-ea"/>
-                <a:cs typeface="+mj-cs"/>
-              </a:defRPr>
-            </a:lvl1pPr>
-          </a:lstStyle>
-          <a:p>
-            <a:r>
-              <a:rPr lang="en-US" sz="2000"/>
-              <a:t>Big-Bench Hard Benchmark</a:t>
-            </a:r>
-            <a:endParaRPr lang="en-US" sz="2000" dirty="0"/>
-          </a:p>
-        </p:txBody>
-      </p:sp>
-      <p:sp>
-        <p:nvSpPr>
-          <p:cNvPr id="12" name="TextBox 11">
-            <a:extLst>
-              <a:ext uri="{FF2B5EF4-FFF2-40B4-BE49-F238E27FC236}">
-                <a16:creationId xmlns:a16="http://schemas.microsoft.com/office/drawing/2014/main" id="{4BA69257-0CD2-1F7E-9A42-3E277FA41BA1}"/>
-              </a:ext>
-            </a:extLst>
-          </p:cNvPr>
-          <p:cNvSpPr txBox="1"/>
-          <p:nvPr/>
-        </p:nvSpPr>
-        <p:spPr>
-          <a:xfrm>
-            <a:off x="1069974" y="1863289"/>
-            <a:ext cx="10410825" cy="2031325"/>
-          </a:xfrm>
-          <a:prstGeom prst="rect">
-            <a:avLst/>
-          </a:prstGeom>
-          <a:noFill/>
-        </p:spPr>
-        <p:txBody>
-          <a:bodyPr wrap="square">
-            <a:spAutoFit/>
-          </a:bodyPr>
+              <a:t>Analysis Strategy</a:t>
+            </a:r>
+          </a:p>
+        </p:txBody>
+      </p:sp>
+      <p:sp>
+        <p:nvSpPr>
+          <p:cNvPr id="3" name="Content Placeholder 2">
+            <a:extLst>
+              <a:ext uri="{FF2B5EF4-FFF2-40B4-BE49-F238E27FC236}">
+                <a16:creationId xmlns:a16="http://schemas.microsoft.com/office/drawing/2014/main" id="{FDF8C00E-E454-5A90-BBC2-075A2B7B284F}"/>
+              </a:ext>
+            </a:extLst>
+          </p:cNvPr>
+          <p:cNvSpPr>
+            <a:spLocks noGrp="1"/>
+          </p:cNvSpPr>
+          <p:nvPr>
+            <p:ph idx="1"/>
+          </p:nvPr>
+        </p:nvSpPr>
+        <p:spPr/>
+        <p:txBody>
+          <a:bodyPr/>
           <a:lstStyle/>
           <a:p>
             <a:r>
               <a:rPr lang="en-US"/>
-              <a:t>{"input": "Here is a table where the first line is a header and each subsequent line is a penguin:  name, age, height (cm), weight (kg) Louis, 7, 50, 11 Bernard, 5, 80, 13 Vincent, 9, 60, 11 Gwen, 8, 70, 15  For example: the age of Louis is 7, the weight of Gwen is 15 kg, the height of Bernard is 80 cm.  We now add a penguin to the table:\nJames, 12, 90, 12\nHow many penguins are less than 8 years old and weight less than 12 kg?\nOptions:\n(A) 1\n(B) 2\n(C) 3\n(D) 4\n(E) 5", </a:t>
+              <a:t>Obtain the corpus of questions</a:t>
+            </a:r>
+          </a:p>
+          <a:p>
+            <a:r>
+              <a:rPr lang="en-US"/>
+              <a:t>Load the questions into a list of dictionaries and a big text string.</a:t>
+            </a:r>
+          </a:p>
+          <a:p>
+            <a:r>
+              <a:rPr lang="en-US"/>
+              <a:t>Perform analysis</a:t>
+            </a:r>
+          </a:p>
+          <a:p>
+            <a:pPr lvl="1"/>
+            <a:r>
+              <a:rPr lang="en-US"/>
+              <a:t>Select a random question</a:t>
+            </a:r>
+          </a:p>
+          <a:p>
+            <a:pPr lvl="1"/>
+            <a:r>
+              <a:rPr lang="en-US"/>
+              <a:t>Compute readability indices</a:t>
+            </a:r>
+          </a:p>
+          <a:p>
+            <a:pPr lvl="1"/>
+            <a:r>
+              <a:rPr lang="en-US"/>
+              <a:t>Build a word cloud</a:t>
+            </a:r>
+          </a:p>
+          <a:p>
+            <a:pPr lvl="1"/>
+            <a:r>
+              <a:rPr lang="en-US"/>
+              <a:t>Compute word frequencies</a:t>
+            </a:r>
+          </a:p>
+          <a:p>
+            <a:pPr lvl="1"/>
+            <a:r>
+              <a:rPr lang="en-US"/>
+              <a:t>Compute longest words</a:t>
+            </a:r>
+          </a:p>
+          <a:p>
+            <a:pPr lvl="1"/>
+            <a:r>
+              <a:rPr lang="en-US"/>
+              <a:t>Find words not in the dictionary</a:t>
             </a:r>
           </a:p>
           <a:p>
             <a:endParaRPr lang="en-US"/>
-          </a:p>
-          <a:p>
-            <a:r>
-              <a:rPr lang="en-US"/>
-              <a:t>"target": "(A)"},</a:t>
-            </a:r>
           </a:p>
         </p:txBody>
       </p:sp>
     </p:spTree>
     <p:extLst>
       <p:ext uri="{BB962C8B-B14F-4D97-AF65-F5344CB8AC3E}">
-        <p14:creationId xmlns:p14="http://schemas.microsoft.com/office/powerpoint/2010/main" val="3049971536"/>
+        <p14:creationId xmlns:p14="http://schemas.microsoft.com/office/powerpoint/2010/main" val="3623561811"/>
       </p:ext>
     </p:extLst>
   </p:cSld>
@@ -6363,7 +6272,7 @@
           <p:cNvPr id="2" name="Title 1">
             <a:extLst>
               <a:ext uri="{FF2B5EF4-FFF2-40B4-BE49-F238E27FC236}">
-                <a16:creationId xmlns:a16="http://schemas.microsoft.com/office/drawing/2014/main" id="{D4E835D7-4D32-E76F-D434-903A42971593}"/>
+                <a16:creationId xmlns:a16="http://schemas.microsoft.com/office/drawing/2014/main" id="{F687EE5D-8588-E4E9-8CDA-40ED9372917C}"/>
               </a:ext>
             </a:extLst>
           </p:cNvPr>
@@ -6381,7 +6290,7 @@
           <a:p>
             <a:r>
               <a:rPr lang="en-US"/>
-              <a:t>Analysis Strategy</a:t>
+              <a:t>We don’t care about</a:t>
             </a:r>
           </a:p>
         </p:txBody>
@@ -6391,7 +6300,7 @@
           <p:cNvPr id="3" name="Content Placeholder 2">
             <a:extLst>
               <a:ext uri="{FF2B5EF4-FFF2-40B4-BE49-F238E27FC236}">
-                <a16:creationId xmlns:a16="http://schemas.microsoft.com/office/drawing/2014/main" id="{FDF8C00E-E454-5A90-BBC2-075A2B7B284F}"/>
+                <a16:creationId xmlns:a16="http://schemas.microsoft.com/office/drawing/2014/main" id="{CD2CF0FF-A79B-9D50-C9A0-BF17A4C8A8F6}"/>
               </a:ext>
             </a:extLst>
           </p:cNvPr>
@@ -6402,71 +6311,69 @@
             <p:ph idx="1"/>
           </p:nvPr>
         </p:nvSpPr>
-        <p:spPr/>
+        <p:spPr>
+          <a:xfrm>
+            <a:off x="838200" y="1825625"/>
+            <a:ext cx="10515600" cy="1895475"/>
+          </a:xfrm>
+        </p:spPr>
         <p:txBody>
           <a:bodyPr/>
           <a:lstStyle/>
           <a:p>
             <a:r>
               <a:rPr lang="en-US"/>
-              <a:t>Obtain the corpus of questions</a:t>
-            </a:r>
-          </a:p>
-          <a:p>
-            <a:r>
-              <a:rPr lang="en-US"/>
-              <a:t>Load the questions into a list of dictionaries and a big text string.</a:t>
-            </a:r>
-          </a:p>
-          <a:p>
-            <a:r>
-              <a:rPr lang="en-US"/>
-              <a:t>Perform analysis</a:t>
-            </a:r>
-          </a:p>
-          <a:p>
-            <a:pPr lvl="1"/>
-            <a:r>
-              <a:rPr lang="en-US"/>
-              <a:t>Select a random question</a:t>
-            </a:r>
-          </a:p>
-          <a:p>
-            <a:pPr lvl="1"/>
-            <a:r>
-              <a:rPr lang="en-US"/>
-              <a:t>Compute readability indices</a:t>
-            </a:r>
-          </a:p>
-          <a:p>
-            <a:pPr lvl="1"/>
-            <a:r>
-              <a:rPr lang="en-US"/>
-              <a:t>Build a word cloud</a:t>
-            </a:r>
-          </a:p>
-          <a:p>
-            <a:pPr lvl="1"/>
-            <a:r>
-              <a:rPr lang="en-US"/>
-              <a:t>Compute word frequencies</a:t>
-            </a:r>
-          </a:p>
-          <a:p>
-            <a:pPr lvl="1"/>
-            <a:r>
-              <a:rPr lang="en-US"/>
-              <a:t>Compute longest words</a:t>
-            </a:r>
-          </a:p>
-          <a:p>
-            <a:pPr lvl="1"/>
-            <a:r>
-              <a:rPr lang="en-US"/>
-              <a:t>Find words not in the dictionary</a:t>
-            </a:r>
-          </a:p>
-          <a:p>
+              <a:t>Validity of questions*</a:t>
+            </a:r>
+          </a:p>
+          <a:p>
+            <a:r>
+              <a:rPr lang="en-US"/>
+              <a:t>Correct answers</a:t>
+            </a:r>
+          </a:p>
+          <a:p>
+            <a:endParaRPr lang="en-US"/>
+          </a:p>
+          <a:p>
+            <a:endParaRPr lang="en-US"/>
+          </a:p>
+        </p:txBody>
+      </p:sp>
+      <p:sp>
+        <p:nvSpPr>
+          <p:cNvPr id="5" name="TextBox 4">
+            <a:extLst>
+              <a:ext uri="{FF2B5EF4-FFF2-40B4-BE49-F238E27FC236}">
+                <a16:creationId xmlns:a16="http://schemas.microsoft.com/office/drawing/2014/main" id="{E029A906-BD24-EE68-017C-5809292F9FD5}"/>
+              </a:ext>
+            </a:extLst>
+          </p:cNvPr>
+          <p:cNvSpPr txBox="1"/>
+          <p:nvPr/>
+        </p:nvSpPr>
+        <p:spPr>
+          <a:xfrm>
+            <a:off x="406400" y="5988734"/>
+            <a:ext cx="10617200" cy="369332"/>
+          </a:xfrm>
+          <a:prstGeom prst="rect">
+            <a:avLst/>
+          </a:prstGeom>
+          <a:noFill/>
+        </p:spPr>
+        <p:txBody>
+          <a:bodyPr wrap="square">
+            <a:spAutoFit/>
+          </a:bodyPr>
+          <a:lstStyle/>
+          <a:p>
+            <a:r>
+              <a:rPr lang="en-US">
+                <a:hlinkClick r:id="rId2"/>
+              </a:rPr>
+              <a:t>* https://www.surgehq.ai/blog/hellaswag-or-hellabad-36-of-this-popular-llm-benchmark-contains-errors</a:t>
+            </a:r>
             <a:endParaRPr lang="en-US"/>
           </a:p>
         </p:txBody>
@@ -6474,7 +6381,7 @@
     </p:spTree>
     <p:extLst>
       <p:ext uri="{BB962C8B-B14F-4D97-AF65-F5344CB8AC3E}">
-        <p14:creationId xmlns:p14="http://schemas.microsoft.com/office/powerpoint/2010/main" val="3623561811"/>
+        <p14:creationId xmlns:p14="http://schemas.microsoft.com/office/powerpoint/2010/main" val="1685030177"/>
       </p:ext>
     </p:extLst>
   </p:cSld>
@@ -6506,7 +6413,7 @@
           <p:cNvPr id="2" name="Title 1">
             <a:extLst>
               <a:ext uri="{FF2B5EF4-FFF2-40B4-BE49-F238E27FC236}">
-                <a16:creationId xmlns:a16="http://schemas.microsoft.com/office/drawing/2014/main" id="{F687EE5D-8588-E4E9-8CDA-40ED9372917C}"/>
+                <a16:creationId xmlns:a16="http://schemas.microsoft.com/office/drawing/2014/main" id="{FDFA3455-CC54-1858-F6E1-9D1E9F367A9C}"/>
               </a:ext>
             </a:extLst>
           </p:cNvPr>
@@ -6524,7 +6431,7 @@
           <a:p>
             <a:r>
               <a:rPr lang="en-US"/>
-              <a:t>We don’t care about</a:t>
+              <a:t>Our Software Architecture</a:t>
             </a:r>
           </a:p>
         </p:txBody>
@@ -6534,7 +6441,7 @@
           <p:cNvPr id="3" name="Content Placeholder 2">
             <a:extLst>
               <a:ext uri="{FF2B5EF4-FFF2-40B4-BE49-F238E27FC236}">
-                <a16:creationId xmlns:a16="http://schemas.microsoft.com/office/drawing/2014/main" id="{CD2CF0FF-A79B-9D50-C9A0-BF17A4C8A8F6}"/>
+                <a16:creationId xmlns:a16="http://schemas.microsoft.com/office/drawing/2014/main" id="{8A9B0413-47E3-6CF1-E675-81423FE2363C}"/>
               </a:ext>
             </a:extLst>
           </p:cNvPr>
@@ -6547,8 +6454,8 @@
         </p:nvSpPr>
         <p:spPr>
           <a:xfrm>
-            <a:off x="838200" y="1825625"/>
-            <a:ext cx="10515600" cy="1895475"/>
+            <a:off x="294968" y="1825625"/>
+            <a:ext cx="11749548" cy="4351338"/>
           </a:xfrm>
         </p:spPr>
         <p:txBody>
@@ -6557,57 +6464,64 @@
           <a:p>
             <a:r>
               <a:rPr lang="en-US"/>
-              <a:t>Validity of questions*</a:t>
-            </a:r>
-          </a:p>
-          <a:p>
-            <a:r>
-              <a:rPr lang="en-US"/>
-              <a:t>The correct answers</a:t>
+              <a:t>Jupyter Notebooks</a:t>
             </a:r>
           </a:p>
           <a:p>
             <a:endParaRPr lang="en-US"/>
           </a:p>
           <a:p>
+            <a:r>
+              <a:rPr lang="en-US"/>
+              <a:t>Each benchmark has an entry point module: </a:t>
+            </a:r>
+            <a:r>
+              <a:rPr lang="en-US" b="1"/>
+              <a:t>Main {benchmark}.ipynb</a:t>
+            </a:r>
+          </a:p>
+          <a:p>
             <a:endParaRPr lang="en-US"/>
           </a:p>
-        </p:txBody>
-      </p:sp>
-      <p:sp>
-        <p:nvSpPr>
-          <p:cNvPr id="5" name="TextBox 4">
-            <a:extLst>
-              <a:ext uri="{FF2B5EF4-FFF2-40B4-BE49-F238E27FC236}">
-                <a16:creationId xmlns:a16="http://schemas.microsoft.com/office/drawing/2014/main" id="{E029A906-BD24-EE68-017C-5809292F9FD5}"/>
-              </a:ext>
-            </a:extLst>
-          </p:cNvPr>
-          <p:cNvSpPr txBox="1"/>
-          <p:nvPr/>
-        </p:nvSpPr>
-        <p:spPr>
-          <a:xfrm>
-            <a:off x="406400" y="5988734"/>
-            <a:ext cx="10617200" cy="369332"/>
-          </a:xfrm>
-          <a:prstGeom prst="rect">
-            <a:avLst/>
-          </a:prstGeom>
-          <a:noFill/>
-        </p:spPr>
-        <p:txBody>
-          <a:bodyPr wrap="square">
-            <a:spAutoFit/>
-          </a:bodyPr>
-          <a:lstStyle/>
-          <a:p>
-            <a:r>
-              <a:rPr lang="en-US">
-                <a:hlinkClick r:id="rId2"/>
-              </a:rPr>
-              <a:t>* https://www.surgehq.ai/blog/hellaswag-or-hellabad-36-of-this-popular-llm-benchmark-contains-errors</a:t>
-            </a:r>
+          <a:p>
+            <a:r>
+              <a:rPr lang="en-US"/>
+              <a:t>Each benchmark has a directory structure</a:t>
+            </a:r>
+          </a:p>
+          <a:p>
+            <a:pPr lvl="1"/>
+            <a:r>
+              <a:rPr lang="en-US"/>
+              <a:t>A folder with the benchmark name, containing</a:t>
+            </a:r>
+          </a:p>
+          <a:p>
+            <a:pPr lvl="2"/>
+            <a:r>
+              <a:rPr lang="en-US"/>
+              <a:t>Questions in a folder called </a:t>
+            </a:r>
+            <a:r>
+              <a:rPr lang="en-US" b="1"/>
+              <a:t>data</a:t>
+            </a:r>
+          </a:p>
+          <a:p>
+            <a:pPr lvl="2"/>
+            <a:r>
+              <a:rPr lang="en-US"/>
+              <a:t>Results in a folder called </a:t>
+            </a:r>
+            <a:r>
+              <a:rPr lang="en-US" b="1"/>
+              <a:t>results</a:t>
+            </a:r>
+          </a:p>
+          <a:p>
+            <a:endParaRPr lang="en-US"/>
+          </a:p>
+          <a:p>
             <a:endParaRPr lang="en-US"/>
           </a:p>
         </p:txBody>
@@ -6615,7 +6529,7 @@
     </p:spTree>
     <p:extLst>
       <p:ext uri="{BB962C8B-B14F-4D97-AF65-F5344CB8AC3E}">
-        <p14:creationId xmlns:p14="http://schemas.microsoft.com/office/powerpoint/2010/main" val="1685030177"/>
+        <p14:creationId xmlns:p14="http://schemas.microsoft.com/office/powerpoint/2010/main" val="2534863046"/>
       </p:ext>
     </p:extLst>
   </p:cSld>
@@ -6647,7 +6561,7 @@
           <p:cNvPr id="2" name="Title 1">
             <a:extLst>
               <a:ext uri="{FF2B5EF4-FFF2-40B4-BE49-F238E27FC236}">
-                <a16:creationId xmlns:a16="http://schemas.microsoft.com/office/drawing/2014/main" id="{FDFA3455-CC54-1858-F6E1-9D1E9F367A9C}"/>
+                <a16:creationId xmlns:a16="http://schemas.microsoft.com/office/drawing/2014/main" id="{78669370-A7BB-C18D-7C08-92128946698E}"/>
               </a:ext>
             </a:extLst>
           </p:cNvPr>
@@ -6665,7 +6579,7 @@
           <a:p>
             <a:r>
               <a:rPr lang="en-US"/>
-              <a:t>Our Software Architecture</a:t>
+              <a:t>Consuming questions in different formats, from different sources.</a:t>
             </a:r>
           </a:p>
         </p:txBody>
@@ -6675,7 +6589,7 @@
           <p:cNvPr id="3" name="Content Placeholder 2">
             <a:extLst>
               <a:ext uri="{FF2B5EF4-FFF2-40B4-BE49-F238E27FC236}">
-                <a16:creationId xmlns:a16="http://schemas.microsoft.com/office/drawing/2014/main" id="{8A9B0413-47E3-6CF1-E675-81423FE2363C}"/>
+                <a16:creationId xmlns:a16="http://schemas.microsoft.com/office/drawing/2014/main" id="{D3CD48A2-3AE9-F3E5-DCCB-7FF4CA79883C}"/>
               </a:ext>
             </a:extLst>
           </p:cNvPr>
@@ -6688,82 +6602,86 @@
         </p:nvSpPr>
         <p:spPr>
           <a:xfrm>
-            <a:off x="294968" y="1825625"/>
-            <a:ext cx="11749548" cy="4351338"/>
+            <a:off x="838200" y="2573106"/>
+            <a:ext cx="10515600" cy="3286279"/>
           </a:xfrm>
         </p:spPr>
         <p:txBody>
           <a:bodyPr/>
           <a:lstStyle/>
           <a:p>
-            <a:r>
-              <a:rPr lang="en-US"/>
-              <a:t>Jupyter Notebooks</a:t>
-            </a:r>
-          </a:p>
-          <a:p>
+            <a:pPr marL="0" indent="0">
+              <a:buNone/>
+            </a:pPr>
+            <a:r>
+              <a:rPr lang="en-US"/>
+              <a:t>In our code, we end up with:</a:t>
+            </a:r>
+          </a:p>
+          <a:p>
+            <a:pPr lvl="1"/>
+            <a:r>
+              <a:rPr lang="en-US"/>
+              <a:t>A dictionary called </a:t>
+            </a:r>
+            <a:r>
+              <a:rPr lang="en-US" i="1"/>
+              <a:t>questions</a:t>
+            </a:r>
+            <a:r>
+              <a:rPr lang="en-US"/>
+              <a:t> with 2 keys:</a:t>
+            </a:r>
+          </a:p>
+          <a:p>
+            <a:pPr lvl="2"/>
+            <a:r>
+              <a:rPr lang="en-US"/>
+              <a:t>Key “input”-&gt; the text of the question</a:t>
+            </a:r>
+          </a:p>
+          <a:p>
+            <a:pPr lvl="2"/>
+            <a:r>
+              <a:rPr lang="en-US"/>
+              <a:t>Key “target” -&gt; the text of the possible answers</a:t>
+            </a:r>
+          </a:p>
+          <a:p>
+            <a:pPr lvl="2"/>
             <a:endParaRPr lang="en-US"/>
           </a:p>
           <a:p>
-            <a:r>
-              <a:rPr lang="en-US"/>
-              <a:t>Each benchmark has an entry point module: </a:t>
-            </a:r>
-            <a:r>
-              <a:rPr lang="en-US" b="1"/>
-              <a:t>Main {benchmark}.ipynb</a:t>
-            </a:r>
-          </a:p>
-          <a:p>
-            <a:endParaRPr lang="en-US"/>
-          </a:p>
-          <a:p>
-            <a:r>
-              <a:rPr lang="en-US"/>
-              <a:t>Each benchmark has a directory structure</a:t>
-            </a:r>
-          </a:p>
-          <a:p>
             <a:pPr lvl="1"/>
             <a:r>
               <a:rPr lang="en-US"/>
-              <a:t>A folder with the benchmark name, containing</a:t>
+              <a:t>A humongous string called </a:t>
+            </a:r>
+            <a:r>
+              <a:rPr lang="en-US" i="1"/>
+              <a:t>text</a:t>
             </a:r>
           </a:p>
           <a:p>
             <a:pPr lvl="2"/>
             <a:r>
               <a:rPr lang="en-US"/>
-              <a:t>Questions in a folder called </a:t>
-            </a:r>
-            <a:r>
-              <a:rPr lang="en-US" b="1"/>
-              <a:t>data</a:t>
+              <a:t>All the questions and answers appended together. </a:t>
             </a:r>
           </a:p>
           <a:p>
             <a:pPr lvl="2"/>
             <a:r>
               <a:rPr lang="en-US"/>
-              <a:t>Results in a folder called </a:t>
-            </a:r>
-            <a:r>
-              <a:rPr lang="en-US" b="1"/>
-              <a:t>results</a:t>
-            </a:r>
-          </a:p>
-          <a:p>
-            <a:endParaRPr lang="en-US"/>
-          </a:p>
-          <a:p>
-            <a:endParaRPr lang="en-US"/>
+              <a:t>Some cleanup, but not much. </a:t>
+            </a:r>
           </a:p>
         </p:txBody>
       </p:sp>
     </p:spTree>
     <p:extLst>
       <p:ext uri="{BB962C8B-B14F-4D97-AF65-F5344CB8AC3E}">
-        <p14:creationId xmlns:p14="http://schemas.microsoft.com/office/powerpoint/2010/main" val="2534863046"/>
+        <p14:creationId xmlns:p14="http://schemas.microsoft.com/office/powerpoint/2010/main" val="448040412"/>
       </p:ext>
     </p:extLst>
   </p:cSld>
@@ -6795,7 +6713,7 @@
           <p:cNvPr id="2" name="Title 1">
             <a:extLst>
               <a:ext uri="{FF2B5EF4-FFF2-40B4-BE49-F238E27FC236}">
-                <a16:creationId xmlns:a16="http://schemas.microsoft.com/office/drawing/2014/main" id="{78669370-A7BB-C18D-7C08-92128946698E}"/>
+                <a16:creationId xmlns:a16="http://schemas.microsoft.com/office/drawing/2014/main" id="{9FB0CD49-94D2-C9E8-85C5-5645D8D67B5A}"/>
               </a:ext>
             </a:extLst>
           </p:cNvPr>
@@ -6813,7 +6731,7 @@
           <a:p>
             <a:r>
               <a:rPr lang="en-US"/>
-              <a:t>Consuming questions in different formats, from different sources.</a:t>
+              <a:t>Build your own benchmark processor</a:t>
             </a:r>
           </a:p>
         </p:txBody>
@@ -6823,7 +6741,7 @@
           <p:cNvPr id="3" name="Content Placeholder 2">
             <a:extLst>
               <a:ext uri="{FF2B5EF4-FFF2-40B4-BE49-F238E27FC236}">
-                <a16:creationId xmlns:a16="http://schemas.microsoft.com/office/drawing/2014/main" id="{D3CD48A2-3AE9-F3E5-DCCB-7FF4CA79883C}"/>
+                <a16:creationId xmlns:a16="http://schemas.microsoft.com/office/drawing/2014/main" id="{9BD455EE-60DD-B6F0-9D8D-AB7CB705677E}"/>
               </a:ext>
             </a:extLst>
           </p:cNvPr>
@@ -6834,84 +6752,83 @@
             <p:ph idx="1"/>
           </p:nvPr>
         </p:nvSpPr>
-        <p:spPr>
-          <a:xfrm>
-            <a:off x="838200" y="2573106"/>
-            <a:ext cx="10515600" cy="3286279"/>
-          </a:xfrm>
-        </p:spPr>
+        <p:spPr/>
         <p:txBody>
           <a:bodyPr/>
           <a:lstStyle/>
           <a:p>
-            <a:pPr marL="0" indent="0">
-              <a:buNone/>
-            </a:pPr>
-            <a:r>
-              <a:rPr lang="en-US"/>
-              <a:t>In our code, we end up with:</a:t>
+            <a:r>
+              <a:rPr lang="en-US"/>
+              <a:t>Create the directory structure</a:t>
+            </a:r>
+          </a:p>
+          <a:p>
+            <a:endParaRPr lang="en-US"/>
+          </a:p>
+          <a:p>
+            <a:r>
+              <a:rPr lang="en-US"/>
+              <a:t>Add a processor class to load the original data</a:t>
             </a:r>
           </a:p>
           <a:p>
             <a:pPr lvl="1"/>
             <a:r>
               <a:rPr lang="en-US"/>
-              <a:t>A dictionary called </a:t>
-            </a:r>
-            <a:r>
-              <a:rPr lang="en-US" i="1"/>
-              <a:t>questions</a:t>
-            </a:r>
-            <a:r>
-              <a:rPr lang="en-US"/>
-              <a:t> with 2 keys:</a:t>
-            </a:r>
-          </a:p>
-          <a:p>
-            <a:pPr lvl="2"/>
-            <a:r>
-              <a:rPr lang="en-US"/>
-              <a:t>Key “input”-&gt; the text of the question</a:t>
-            </a:r>
-          </a:p>
-          <a:p>
-            <a:pPr lvl="2"/>
-            <a:r>
-              <a:rPr lang="en-US"/>
-              <a:t>Key “target” -&gt; the text of the possible answers</a:t>
+              <a:t>Json_Processor.ipynb, or</a:t>
             </a:r>
           </a:p>
           <a:p>
             <a:pPr lvl="1"/>
             <a:r>
               <a:rPr lang="en-US"/>
-              <a:t>A humongous string called </a:t>
-            </a:r>
-            <a:r>
-              <a:rPr lang="en-US" i="1"/>
-              <a:t>text</a:t>
-            </a:r>
-          </a:p>
-          <a:p>
-            <a:pPr lvl="2"/>
-            <a:r>
-              <a:rPr lang="en-US"/>
-              <a:t>All the questions and answers appended together. </a:t>
-            </a:r>
-          </a:p>
-          <a:p>
-            <a:pPr lvl="2"/>
-            <a:r>
-              <a:rPr lang="en-US"/>
-              <a:t>Some cleanup, but not much. </a:t>
-            </a:r>
+              <a:t>CSV_Processor.ipynb</a:t>
+            </a:r>
+          </a:p>
+          <a:p>
+            <a:pPr lvl="1"/>
+            <a:endParaRPr lang="en-US"/>
+          </a:p>
+          <a:p>
+            <a:r>
+              <a:rPr lang="en-US"/>
+              <a:t>Start with a copy of </a:t>
+            </a:r>
+            <a:r>
+              <a:rPr lang="en-US">
+                <a:latin typeface="Courier New" panose="02070309020205020404" pitchFamily="49" charset="0"/>
+                <a:cs typeface="Courier New" panose="02070309020205020404" pitchFamily="49" charset="0"/>
+              </a:rPr>
+              <a:t>Main Template.ipynb</a:t>
+            </a:r>
+          </a:p>
+          <a:p>
+            <a:pPr lvl="1"/>
+            <a:r>
+              <a:rPr lang="en-US"/>
+              <a:t>Follow the “ToDo”s in that notebook</a:t>
+            </a:r>
+          </a:p>
+          <a:p>
+            <a:pPr lvl="1"/>
+            <a:r>
+              <a:rPr lang="en-US"/>
+              <a:t>Run the notebook, look in the results folder</a:t>
+            </a:r>
+          </a:p>
+          <a:p>
+            <a:pPr lvl="1"/>
+            <a:endParaRPr lang="en-US"/>
+          </a:p>
+          <a:p>
+            <a:endParaRPr lang="en-US"/>
           </a:p>
         </p:txBody>
       </p:sp>
     </p:spTree>
     <p:extLst>
       <p:ext uri="{BB962C8B-B14F-4D97-AF65-F5344CB8AC3E}">
-        <p14:creationId xmlns:p14="http://schemas.microsoft.com/office/powerpoint/2010/main" val="448040412"/>
+        <p14:creationId xmlns:p14="http://schemas.microsoft.com/office/powerpoint/2010/main" val="2895837283"/>
       </p:ext>
     </p:extLst>
   </p:cSld>
@@ -6943,153 +6860,6 @@
           <p:cNvPr id="2" name="Title 1">
             <a:extLst>
               <a:ext uri="{FF2B5EF4-FFF2-40B4-BE49-F238E27FC236}">
-                <a16:creationId xmlns:a16="http://schemas.microsoft.com/office/drawing/2014/main" id="{9FB0CD49-94D2-C9E8-85C5-5645D8D67B5A}"/>
-              </a:ext>
-            </a:extLst>
-          </p:cNvPr>
-          <p:cNvSpPr>
-            <a:spLocks noGrp="1"/>
-          </p:cNvSpPr>
-          <p:nvPr>
-            <p:ph type="title"/>
-          </p:nvPr>
-        </p:nvSpPr>
-        <p:spPr/>
-        <p:txBody>
-          <a:bodyPr/>
-          <a:lstStyle/>
-          <a:p>
-            <a:r>
-              <a:rPr lang="en-US"/>
-              <a:t>Build your own benchmark processor</a:t>
-            </a:r>
-          </a:p>
-        </p:txBody>
-      </p:sp>
-      <p:sp>
-        <p:nvSpPr>
-          <p:cNvPr id="3" name="Content Placeholder 2">
-            <a:extLst>
-              <a:ext uri="{FF2B5EF4-FFF2-40B4-BE49-F238E27FC236}">
-                <a16:creationId xmlns:a16="http://schemas.microsoft.com/office/drawing/2014/main" id="{9BD455EE-60DD-B6F0-9D8D-AB7CB705677E}"/>
-              </a:ext>
-            </a:extLst>
-          </p:cNvPr>
-          <p:cNvSpPr>
-            <a:spLocks noGrp="1"/>
-          </p:cNvSpPr>
-          <p:nvPr>
-            <p:ph idx="1"/>
-          </p:nvPr>
-        </p:nvSpPr>
-        <p:spPr/>
-        <p:txBody>
-          <a:bodyPr/>
-          <a:lstStyle/>
-          <a:p>
-            <a:r>
-              <a:rPr lang="en-US"/>
-              <a:t>Create the directory structure</a:t>
-            </a:r>
-          </a:p>
-          <a:p>
-            <a:endParaRPr lang="en-US"/>
-          </a:p>
-          <a:p>
-            <a:r>
-              <a:rPr lang="en-US"/>
-              <a:t>Add a processor class to load the original question data</a:t>
-            </a:r>
-          </a:p>
-          <a:p>
-            <a:pPr lvl="1"/>
-            <a:r>
-              <a:rPr lang="en-US"/>
-              <a:t>Json_Processor.ipynb, or</a:t>
-            </a:r>
-          </a:p>
-          <a:p>
-            <a:pPr lvl="1"/>
-            <a:r>
-              <a:rPr lang="en-US"/>
-              <a:t>CSV_Processor.ipynb</a:t>
-            </a:r>
-          </a:p>
-          <a:p>
-            <a:pPr lvl="1"/>
-            <a:endParaRPr lang="en-US"/>
-          </a:p>
-          <a:p>
-            <a:r>
-              <a:rPr lang="en-US"/>
-              <a:t>Start with a copy of </a:t>
-            </a:r>
-            <a:r>
-              <a:rPr lang="en-US">
-                <a:latin typeface="Courier New" panose="02070309020205020404" pitchFamily="49" charset="0"/>
-                <a:cs typeface="Courier New" panose="02070309020205020404" pitchFamily="49" charset="0"/>
-              </a:rPr>
-              <a:t>Main Template.ipynb</a:t>
-            </a:r>
-          </a:p>
-          <a:p>
-            <a:pPr lvl="1"/>
-            <a:r>
-              <a:rPr lang="en-US"/>
-              <a:t>Follow the “ToDo”s in that notebook</a:t>
-            </a:r>
-          </a:p>
-          <a:p>
-            <a:pPr lvl="1"/>
-            <a:r>
-              <a:rPr lang="en-US"/>
-              <a:t>Run the notebook, look in the results folder</a:t>
-            </a:r>
-          </a:p>
-          <a:p>
-            <a:pPr lvl="1"/>
-            <a:endParaRPr lang="en-US"/>
-          </a:p>
-          <a:p>
-            <a:endParaRPr lang="en-US"/>
-          </a:p>
-        </p:txBody>
-      </p:sp>
-    </p:spTree>
-    <p:extLst>
-      <p:ext uri="{BB962C8B-B14F-4D97-AF65-F5344CB8AC3E}">
-        <p14:creationId xmlns:p14="http://schemas.microsoft.com/office/powerpoint/2010/main" val="2895837283"/>
-      </p:ext>
-    </p:extLst>
-  </p:cSld>
-  <p:clrMapOvr>
-    <a:masterClrMapping/>
-  </p:clrMapOvr>
-</p:sld>
-</file>
-
-<file path=ppt/slides/slide18.xml><?xml version="1.0" encoding="utf-8"?>
-<p:sld xmlns:a="http://schemas.openxmlformats.org/drawingml/2006/main" xmlns:r="http://schemas.openxmlformats.org/officeDocument/2006/relationships" xmlns:p="http://schemas.openxmlformats.org/presentationml/2006/main">
-  <p:cSld>
-    <p:spTree>
-      <p:nvGrpSpPr>
-        <p:cNvPr id="1" name=""/>
-        <p:cNvGrpSpPr/>
-        <p:nvPr/>
-      </p:nvGrpSpPr>
-      <p:grpSpPr>
-        <a:xfrm>
-          <a:off x="0" y="0"/>
-          <a:ext cx="0" cy="0"/>
-          <a:chOff x="0" y="0"/>
-          <a:chExt cx="0" cy="0"/>
-        </a:xfrm>
-      </p:grpSpPr>
-      <p:sp>
-        <p:nvSpPr>
-          <p:cNvPr id="2" name="Title 1">
-            <a:extLst>
-              <a:ext uri="{FF2B5EF4-FFF2-40B4-BE49-F238E27FC236}">
                 <a16:creationId xmlns:a16="http://schemas.microsoft.com/office/drawing/2014/main" id="{7E874946-7719-1DD4-36D2-C920E29DF743}"/>
               </a:ext>
             </a:extLst>
@@ -7230,7 +7000,7 @@
 </p:sld>
 </file>
 
-<file path=ppt/slides/slide19.xml><?xml version="1.0" encoding="utf-8"?>
+<file path=ppt/slides/slide18.xml><?xml version="1.0" encoding="utf-8"?>
 <p:sld xmlns:a="http://schemas.openxmlformats.org/drawingml/2006/main" xmlns:r="http://schemas.openxmlformats.org/officeDocument/2006/relationships" xmlns:p="http://schemas.openxmlformats.org/presentationml/2006/main">
   <p:cSld>
     <p:spTree>

</xml_diff>

<commit_message>
Added MMLU for future work, added some slides.
</commit_message>
<xml_diff>
--- a/CCSC-MW Fall 2024 Conference Tutorial.pptx
+++ b/CCSC-MW Fall 2024 Conference Tutorial.pptx
@@ -6,7 +6,7 @@
     <p:sldMasterId id="2147483664" r:id="rId2"/>
   </p:sldMasterIdLst>
   <p:notesMasterIdLst>
-    <p:notesMasterId r:id="rId21"/>
+    <p:notesMasterId r:id="rId29"/>
   </p:notesMasterIdLst>
   <p:sldIdLst>
     <p:sldId id="256" r:id="rId3"/>
@@ -21,12 +21,20 @@
     <p:sldId id="414" r:id="rId12"/>
     <p:sldId id="452" r:id="rId13"/>
     <p:sldId id="447" r:id="rId14"/>
-    <p:sldId id="454" r:id="rId15"/>
-    <p:sldId id="448" r:id="rId16"/>
-    <p:sldId id="450" r:id="rId17"/>
-    <p:sldId id="451" r:id="rId18"/>
-    <p:sldId id="449" r:id="rId19"/>
-    <p:sldId id="453" r:id="rId20"/>
+    <p:sldId id="455" r:id="rId15"/>
+    <p:sldId id="454" r:id="rId16"/>
+    <p:sldId id="448" r:id="rId17"/>
+    <p:sldId id="450" r:id="rId18"/>
+    <p:sldId id="451" r:id="rId19"/>
+    <p:sldId id="336" r:id="rId20"/>
+    <p:sldId id="340" r:id="rId21"/>
+    <p:sldId id="449" r:id="rId22"/>
+    <p:sldId id="349" r:id="rId23"/>
+    <p:sldId id="456" r:id="rId24"/>
+    <p:sldId id="341" r:id="rId25"/>
+    <p:sldId id="358" r:id="rId26"/>
+    <p:sldId id="378" r:id="rId27"/>
+    <p:sldId id="443" r:id="rId28"/>
   </p:sldIdLst>
   <p:sldSz cx="12192000" cy="6858000"/>
   <p:notesSz cx="6858000" cy="9144000"/>
@@ -142,18 +150,27 @@
             <p14:sldId id="414"/>
             <p14:sldId id="452"/>
             <p14:sldId id="447"/>
+            <p14:sldId id="455"/>
             <p14:sldId id="454"/>
             <p14:sldId id="448"/>
             <p14:sldId id="450"/>
             <p14:sldId id="451"/>
+            <p14:sldId id="336"/>
+            <p14:sldId id="340"/>
             <p14:sldId id="449"/>
-            <p14:sldId id="453"/>
+            <p14:sldId id="349"/>
+          </p14:sldIdLst>
+        </p14:section>
+        <p14:section name="Extra Content" id="{7B3EEE32-D6C6-4EDD-BCF7-20BDD03E5D6D}">
+          <p14:sldIdLst>
+            <p14:sldId id="456"/>
+            <p14:sldId id="341"/>
+            <p14:sldId id="358"/>
+            <p14:sldId id="378"/>
+            <p14:sldId id="443"/>
           </p14:sldIdLst>
         </p14:section>
         <p14:section name="Unused" id="{92A7A9F2-3786-4115-8420-00D575879BE6}">
-          <p14:sldIdLst/>
-        </p14:section>
-        <p14:section name="Extra Content" id="{7B3EEE32-D6C6-4EDD-BCF7-20BDD03E5D6D}">
           <p14:sldIdLst/>
         </p14:section>
       </p14:sectionLst>
@@ -169,8 +186,8 @@
 <pc:chgInfo xmlns:a="http://schemas.openxmlformats.org/drawingml/2006/main" xmlns:r="http://schemas.openxmlformats.org/officeDocument/2006/relationships" xmlns:ac="http://schemas.microsoft.com/office/drawing/2013/main/command" xmlns:pc="http://schemas.microsoft.com/office/powerpoint/2013/main/command">
   <pc:docChgLst>
     <pc:chgData name="Nicholson, Delmer (Bill) (nicholdw)" userId="b56c8833-ee42-4335-8085-70d597acedf2" providerId="ADAL" clId="{FB213E8F-52F0-4CAB-A62F-63FF4F093653}"/>
-    <pc:docChg chg="undo custSel addSld delSld modSld modSection">
-      <pc:chgData name="Nicholson, Delmer (Bill) (nicholdw)" userId="b56c8833-ee42-4335-8085-70d597acedf2" providerId="ADAL" clId="{FB213E8F-52F0-4CAB-A62F-63FF4F093653}" dt="2024-09-20T15:12:27.144" v="727" actId="1076"/>
+    <pc:docChg chg="undo custSel addSld delSld modSld sldOrd modSection">
+      <pc:chgData name="Nicholson, Delmer (Bill) (nicholdw)" userId="b56c8833-ee42-4335-8085-70d597acedf2" providerId="ADAL" clId="{FB213E8F-52F0-4CAB-A62F-63FF4F093653}" dt="2024-09-20T17:36:27.888" v="1306"/>
       <pc:docMkLst>
         <pc:docMk/>
       </pc:docMkLst>
@@ -219,6 +236,21 @@
           <pc:docMk/>
           <pc:sldMk cId="758616065" sldId="324"/>
         </pc:sldMkLst>
+      </pc:sldChg>
+      <pc:sldChg chg="modSp mod modAnim">
+        <pc:chgData name="Nicholson, Delmer (Bill) (nicholdw)" userId="b56c8833-ee42-4335-8085-70d597acedf2" providerId="ADAL" clId="{FB213E8F-52F0-4CAB-A62F-63FF4F093653}" dt="2024-09-20T16:54:52.326" v="1263" actId="20577"/>
+        <pc:sldMkLst>
+          <pc:docMk/>
+          <pc:sldMk cId="791857963" sldId="333"/>
+        </pc:sldMkLst>
+        <pc:spChg chg="mod">
+          <ac:chgData name="Nicholson, Delmer (Bill) (nicholdw)" userId="b56c8833-ee42-4335-8085-70d597acedf2" providerId="ADAL" clId="{FB213E8F-52F0-4CAB-A62F-63FF4F093653}" dt="2024-09-20T16:54:52.326" v="1263" actId="20577"/>
+          <ac:spMkLst>
+            <pc:docMk/>
+            <pc:sldMk cId="791857963" sldId="333"/>
+            <ac:spMk id="3" creationId="{A2BCAF2E-3B20-5255-0081-D4C44F6DD16C}"/>
+          </ac:spMkLst>
+        </pc:spChg>
       </pc:sldChg>
       <pc:sldChg chg="del">
         <pc:chgData name="Nicholson, Delmer (Bill) (nicholdw)" userId="b56c8833-ee42-4335-8085-70d597acedf2" providerId="ADAL" clId="{FB213E8F-52F0-4CAB-A62F-63FF4F093653}" dt="2024-09-16T16:27:07.265" v="705" actId="47"/>
@@ -511,14 +543,29 @@
           <pc:sldMk cId="1094644783" sldId="445"/>
         </pc:sldMkLst>
       </pc:sldChg>
+      <pc:sldChg chg="modSp">
+        <pc:chgData name="Nicholson, Delmer (Bill) (nicholdw)" userId="b56c8833-ee42-4335-8085-70d597acedf2" providerId="ADAL" clId="{FB213E8F-52F0-4CAB-A62F-63FF4F093653}" dt="2024-09-20T16:47:48.235" v="732" actId="20577"/>
+        <pc:sldMkLst>
+          <pc:docMk/>
+          <pc:sldMk cId="984744257" sldId="446"/>
+        </pc:sldMkLst>
+        <pc:spChg chg="mod">
+          <ac:chgData name="Nicholson, Delmer (Bill) (nicholdw)" userId="b56c8833-ee42-4335-8085-70d597acedf2" providerId="ADAL" clId="{FB213E8F-52F0-4CAB-A62F-63FF4F093653}" dt="2024-09-20T16:47:48.235" v="732" actId="20577"/>
+          <ac:spMkLst>
+            <pc:docMk/>
+            <pc:sldMk cId="984744257" sldId="446"/>
+            <ac:spMk id="3" creationId="{76AE0E94-496C-5E40-F0A4-B94E1746F7FB}"/>
+          </ac:spMkLst>
+        </pc:spChg>
+      </pc:sldChg>
       <pc:sldChg chg="modSp mod">
-        <pc:chgData name="Nicholson, Delmer (Bill) (nicholdw)" userId="b56c8833-ee42-4335-8085-70d597acedf2" providerId="ADAL" clId="{FB213E8F-52F0-4CAB-A62F-63FF4F093653}" dt="2024-09-16T16:04:58.651" v="678" actId="20577"/>
+        <pc:chgData name="Nicholson, Delmer (Bill) (nicholdw)" userId="b56c8833-ee42-4335-8085-70d597acedf2" providerId="ADAL" clId="{FB213E8F-52F0-4CAB-A62F-63FF4F093653}" dt="2024-09-20T16:48:33.569" v="749" actId="20577"/>
         <pc:sldMkLst>
           <pc:docMk/>
           <pc:sldMk cId="3623561811" sldId="447"/>
         </pc:sldMkLst>
         <pc:spChg chg="mod">
-          <ac:chgData name="Nicholson, Delmer (Bill) (nicholdw)" userId="b56c8833-ee42-4335-8085-70d597acedf2" providerId="ADAL" clId="{FB213E8F-52F0-4CAB-A62F-63FF4F093653}" dt="2024-09-16T16:04:58.651" v="678" actId="20577"/>
+          <ac:chgData name="Nicholson, Delmer (Bill) (nicholdw)" userId="b56c8833-ee42-4335-8085-70d597acedf2" providerId="ADAL" clId="{FB213E8F-52F0-4CAB-A62F-63FF4F093653}" dt="2024-09-20T16:48:33.569" v="749" actId="20577"/>
           <ac:spMkLst>
             <pc:docMk/>
             <pc:sldMk cId="3623561811" sldId="447"/>
@@ -565,13 +612,21 @@
         </pc:spChg>
       </pc:sldChg>
       <pc:sldChg chg="modSp mod">
-        <pc:chgData name="Nicholson, Delmer (Bill) (nicholdw)" userId="b56c8833-ee42-4335-8085-70d597acedf2" providerId="ADAL" clId="{FB213E8F-52F0-4CAB-A62F-63FF4F093653}" dt="2024-09-20T14:27:43.474" v="720" actId="20577"/>
+        <pc:chgData name="Nicholson, Delmer (Bill) (nicholdw)" userId="b56c8833-ee42-4335-8085-70d597acedf2" providerId="ADAL" clId="{FB213E8F-52F0-4CAB-A62F-63FF4F093653}" dt="2024-09-20T17:00:55.761" v="1304" actId="20577"/>
         <pc:sldMkLst>
           <pc:docMk/>
           <pc:sldMk cId="448040412" sldId="450"/>
         </pc:sldMkLst>
         <pc:spChg chg="mod">
-          <ac:chgData name="Nicholson, Delmer (Bill) (nicholdw)" userId="b56c8833-ee42-4335-8085-70d597acedf2" providerId="ADAL" clId="{FB213E8F-52F0-4CAB-A62F-63FF4F093653}" dt="2024-09-20T14:27:43.474" v="720" actId="20577"/>
+          <ac:chgData name="Nicholson, Delmer (Bill) (nicholdw)" userId="b56c8833-ee42-4335-8085-70d597acedf2" providerId="ADAL" clId="{FB213E8F-52F0-4CAB-A62F-63FF4F093653}" dt="2024-09-20T17:00:20.792" v="1274" actId="20577"/>
+          <ac:spMkLst>
+            <pc:docMk/>
+            <pc:sldMk cId="448040412" sldId="450"/>
+            <ac:spMk id="2" creationId="{78669370-A7BB-C18D-7C08-92128946698E}"/>
+          </ac:spMkLst>
+        </pc:spChg>
+        <pc:spChg chg="mod">
+          <ac:chgData name="Nicholson, Delmer (Bill) (nicholdw)" userId="b56c8833-ee42-4335-8085-70d597acedf2" providerId="ADAL" clId="{FB213E8F-52F0-4CAB-A62F-63FF4F093653}" dt="2024-09-20T17:00:55.761" v="1304" actId="20577"/>
           <ac:spMkLst>
             <pc:docMk/>
             <pc:sldMk cId="448040412" sldId="450"/>
@@ -595,7 +650,7 @@
         </pc:spChg>
       </pc:sldChg>
       <pc:sldChg chg="addSp delSp modSp new mod">
-        <pc:chgData name="Nicholson, Delmer (Bill) (nicholdw)" userId="b56c8833-ee42-4335-8085-70d597acedf2" providerId="ADAL" clId="{FB213E8F-52F0-4CAB-A62F-63FF4F093653}" dt="2024-09-16T16:04:03.919" v="653" actId="20577"/>
+        <pc:chgData name="Nicholson, Delmer (Bill) (nicholdw)" userId="b56c8833-ee42-4335-8085-70d597acedf2" providerId="ADAL" clId="{FB213E8F-52F0-4CAB-A62F-63FF4F093653}" dt="2024-09-20T16:59:42.485" v="1265" actId="113"/>
         <pc:sldMkLst>
           <pc:docMk/>
           <pc:sldMk cId="3049971536" sldId="452"/>
@@ -633,7 +688,7 @@
           </ac:spMkLst>
         </pc:spChg>
         <pc:spChg chg="add mod">
-          <ac:chgData name="Nicholson, Delmer (Bill) (nicholdw)" userId="b56c8833-ee42-4335-8085-70d597acedf2" providerId="ADAL" clId="{FB213E8F-52F0-4CAB-A62F-63FF4F093653}" dt="2024-09-16T16:04:03.919" v="653" actId="20577"/>
+          <ac:chgData name="Nicholson, Delmer (Bill) (nicholdw)" userId="b56c8833-ee42-4335-8085-70d597acedf2" providerId="ADAL" clId="{FB213E8F-52F0-4CAB-A62F-63FF4F093653}" dt="2024-09-20T16:59:42.485" v="1265" actId="113"/>
           <ac:spMkLst>
             <pc:docMk/>
             <pc:sldMk cId="3049971536" sldId="452"/>
@@ -657,8 +712,8 @@
           </ac:picMkLst>
         </pc:picChg>
       </pc:sldChg>
-      <pc:sldChg chg="delSp modSp new mod">
-        <pc:chgData name="Nicholson, Delmer (Bill) (nicholdw)" userId="b56c8833-ee42-4335-8085-70d597acedf2" providerId="ADAL" clId="{FB213E8F-52F0-4CAB-A62F-63FF4F093653}" dt="2024-09-16T15:50:18.369" v="478" actId="478"/>
+      <pc:sldChg chg="delSp modSp new del mod">
+        <pc:chgData name="Nicholson, Delmer (Bill) (nicholdw)" userId="b56c8833-ee42-4335-8085-70d597acedf2" providerId="ADAL" clId="{FB213E8F-52F0-4CAB-A62F-63FF4F093653}" dt="2024-09-20T17:34:40.876" v="1305" actId="47"/>
         <pc:sldMkLst>
           <pc:docMk/>
           <pc:sldMk cId="1269356600" sldId="453"/>
@@ -681,7 +736,7 @@
         </pc:spChg>
       </pc:sldChg>
       <pc:sldChg chg="addSp modSp new mod">
-        <pc:chgData name="Nicholson, Delmer (Bill) (nicholdw)" userId="b56c8833-ee42-4335-8085-70d597acedf2" providerId="ADAL" clId="{FB213E8F-52F0-4CAB-A62F-63FF4F093653}" dt="2024-09-17T18:38:42.024" v="709" actId="20577"/>
+        <pc:chgData name="Nicholson, Delmer (Bill) (nicholdw)" userId="b56c8833-ee42-4335-8085-70d597acedf2" providerId="ADAL" clId="{FB213E8F-52F0-4CAB-A62F-63FF4F093653}" dt="2024-09-20T16:51:59.814" v="1149" actId="20577"/>
         <pc:sldMkLst>
           <pc:docMk/>
           <pc:sldMk cId="1685030177" sldId="454"/>
@@ -695,7 +750,7 @@
           </ac:spMkLst>
         </pc:spChg>
         <pc:spChg chg="mod">
-          <ac:chgData name="Nicholson, Delmer (Bill) (nicholdw)" userId="b56c8833-ee42-4335-8085-70d597acedf2" providerId="ADAL" clId="{FB213E8F-52F0-4CAB-A62F-63FF4F093653}" dt="2024-09-17T18:38:42.024" v="709" actId="20577"/>
+          <ac:chgData name="Nicholson, Delmer (Bill) (nicholdw)" userId="b56c8833-ee42-4335-8085-70d597acedf2" providerId="ADAL" clId="{FB213E8F-52F0-4CAB-A62F-63FF4F093653}" dt="2024-09-20T16:51:59.814" v="1149" actId="20577"/>
           <ac:spMkLst>
             <pc:docMk/>
             <pc:sldMk cId="1685030177" sldId="454"/>
@@ -708,6 +763,29 @@
             <pc:docMk/>
             <pc:sldMk cId="1685030177" sldId="454"/>
             <ac:spMk id="5" creationId="{E029A906-BD24-EE68-017C-5809292F9FD5}"/>
+          </ac:spMkLst>
+        </pc:spChg>
+      </pc:sldChg>
+      <pc:sldChg chg="modSp new mod">
+        <pc:chgData name="Nicholson, Delmer (Bill) (nicholdw)" userId="b56c8833-ee42-4335-8085-70d597acedf2" providerId="ADAL" clId="{FB213E8F-52F0-4CAB-A62F-63FF4F093653}" dt="2024-09-20T16:51:36.506" v="1139" actId="14100"/>
+        <pc:sldMkLst>
+          <pc:docMk/>
+          <pc:sldMk cId="741648780" sldId="455"/>
+        </pc:sldMkLst>
+        <pc:spChg chg="mod">
+          <ac:chgData name="Nicholson, Delmer (Bill) (nicholdw)" userId="b56c8833-ee42-4335-8085-70d597acedf2" providerId="ADAL" clId="{FB213E8F-52F0-4CAB-A62F-63FF4F093653}" dt="2024-09-20T16:50:51.058" v="1081" actId="20577"/>
+          <ac:spMkLst>
+            <pc:docMk/>
+            <pc:sldMk cId="741648780" sldId="455"/>
+            <ac:spMk id="2" creationId="{05DBE747-EEA5-776C-5A88-2052C5B8408D}"/>
+          </ac:spMkLst>
+        </pc:spChg>
+        <pc:spChg chg="mod">
+          <ac:chgData name="Nicholson, Delmer (Bill) (nicholdw)" userId="b56c8833-ee42-4335-8085-70d597acedf2" providerId="ADAL" clId="{FB213E8F-52F0-4CAB-A62F-63FF4F093653}" dt="2024-09-20T16:51:36.506" v="1139" actId="14100"/>
+          <ac:spMkLst>
+            <pc:docMk/>
+            <pc:sldMk cId="741648780" sldId="455"/>
+            <ac:spMk id="3" creationId="{71BEDC64-EC5E-438B-BE91-C53F283B6AB5}"/>
           </ac:spMkLst>
         </pc:spChg>
       </pc:sldChg>
@@ -6118,7 +6196,15 @@
           <a:p>
             <a:r>
               <a:rPr lang="en-US"/>
-              <a:t>{"input": "Here is a table where the first line is a header and each subsequent line is a penguin:  name, age, height (cm), weight (kg) Louis, 7, 50, 11 Bernard, 5, 80, 13 Vincent, 9, 60, 11 Gwen, 8, 70, 15  For example: the age of Louis is 7, the weight of Gwen is 15 kg, the height of Bernard is 80 cm.  We now add a penguin to the table:\nJames, 12, 90, 12\nHow many penguins are less than 8 years old and weight less than 12 kg?\nOptions:\n(A) 1\n(B) 2\n(C) 3\n(D) 4\n(E) 5", </a:t>
+              <a:t>{"</a:t>
+            </a:r>
+            <a:r>
+              <a:rPr lang="en-US" b="1"/>
+              <a:t>input</a:t>
+            </a:r>
+            <a:r>
+              <a:rPr lang="en-US"/>
+              <a:t>": "Here is a table where the first line is a header and each subsequent line is a penguin:  name, age, height (cm), weight (kg) Louis, 7, 50, 11 Bernard, 5, 80, 13 Vincent, 9, 60, 11 Gwen, 8, 70, 15  For example: the age of Louis is 7, the weight of Gwen is 15 kg, the height of Bernard is 80 cm.  We now add a penguin to the table:\nJames, 12, 90, 12\nHow many penguins are less than 8 years old and weight less than 12 kg?\nOptions:\n(A) 1\n(B) 2\n(C) 3\n(D) 4\n(E) 5", </a:t>
             </a:r>
           </a:p>
           <a:p>
@@ -6127,7 +6213,15 @@
           <a:p>
             <a:r>
               <a:rPr lang="en-US"/>
-              <a:t>"target": "(A)"},</a:t>
+              <a:t>"</a:t>
+            </a:r>
+            <a:r>
+              <a:rPr lang="en-US" b="1"/>
+              <a:t>target</a:t>
+            </a:r>
+            <a:r>
+              <a:rPr lang="en-US"/>
+              <a:t>": "(A)"},</a:t>
             </a:r>
           </a:p>
         </p:txBody>
@@ -6219,7 +6313,7 @@
           <a:p>
             <a:r>
               <a:rPr lang="en-US"/>
-              <a:t>Load the questions into a list of dictionaries and a big text string.</a:t>
+              <a:t>Load the questions into a list of dictionaries and also a big text string.</a:t>
             </a:r>
           </a:p>
           <a:p>
@@ -6310,7 +6404,7 @@
           <p:cNvPr id="2" name="Title 1">
             <a:extLst>
               <a:ext uri="{FF2B5EF4-FFF2-40B4-BE49-F238E27FC236}">
-                <a16:creationId xmlns:a16="http://schemas.microsoft.com/office/drawing/2014/main" id="{F687EE5D-8588-E4E9-8CDA-40ED9372917C}"/>
+                <a16:creationId xmlns:a16="http://schemas.microsoft.com/office/drawing/2014/main" id="{05DBE747-EEA5-776C-5A88-2052C5B8408D}"/>
               </a:ext>
             </a:extLst>
           </p:cNvPr>
@@ -6328,7 +6422,7 @@
           <a:p>
             <a:r>
               <a:rPr lang="en-US"/>
-              <a:t>We don’t care about</a:t>
+              <a:t>Terminology </a:t>
             </a:r>
           </a:p>
         </p:txBody>
@@ -6338,7 +6432,7 @@
           <p:cNvPr id="3" name="Content Placeholder 2">
             <a:extLst>
               <a:ext uri="{FF2B5EF4-FFF2-40B4-BE49-F238E27FC236}">
-                <a16:creationId xmlns:a16="http://schemas.microsoft.com/office/drawing/2014/main" id="{CD2CF0FF-A79B-9D50-C9A0-BF17A4C8A8F6}"/>
+                <a16:creationId xmlns:a16="http://schemas.microsoft.com/office/drawing/2014/main" id="{71BEDC64-EC5E-438B-BE91-C53F283B6AB5}"/>
               </a:ext>
             </a:extLst>
           </p:cNvPr>
@@ -6352,7 +6446,7 @@
         <p:spPr>
           <a:xfrm>
             <a:off x="838200" y="1825625"/>
-            <a:ext cx="10515600" cy="1895475"/>
+            <a:ext cx="11162288" cy="4351338"/>
           </a:xfrm>
         </p:spPr>
         <p:txBody>
@@ -6361,65 +6455,30 @@
           <a:p>
             <a:r>
               <a:rPr lang="en-US"/>
-              <a:t>Validity of questions*</a:t>
-            </a:r>
+              <a:t>“Question” = generically, the prompt along with the possible responses.</a:t>
+            </a:r>
+          </a:p>
+          <a:p>
+            <a:endParaRPr lang="en-US"/>
           </a:p>
           <a:p>
             <a:r>
               <a:rPr lang="en-US"/>
-              <a:t>Correct answers</a:t>
-            </a:r>
-          </a:p>
-          <a:p>
-            <a:endParaRPr lang="en-US"/>
-          </a:p>
-          <a:p>
-            <a:endParaRPr lang="en-US"/>
-          </a:p>
-        </p:txBody>
-      </p:sp>
-      <p:sp>
-        <p:nvSpPr>
-          <p:cNvPr id="5" name="TextBox 4">
-            <a:extLst>
-              <a:ext uri="{FF2B5EF4-FFF2-40B4-BE49-F238E27FC236}">
-                <a16:creationId xmlns:a16="http://schemas.microsoft.com/office/drawing/2014/main" id="{E029A906-BD24-EE68-017C-5809292F9FD5}"/>
-              </a:ext>
-            </a:extLst>
-          </p:cNvPr>
-          <p:cNvSpPr txBox="1"/>
-          <p:nvPr/>
-        </p:nvSpPr>
-        <p:spPr>
-          <a:xfrm>
-            <a:off x="406400" y="5988734"/>
-            <a:ext cx="10617200" cy="369332"/>
-          </a:xfrm>
-          <a:prstGeom prst="rect">
-            <a:avLst/>
-          </a:prstGeom>
-          <a:noFill/>
-        </p:spPr>
-        <p:txBody>
-          <a:bodyPr wrap="square">
-            <a:spAutoFit/>
-          </a:bodyPr>
-          <a:lstStyle/>
-          <a:p>
-            <a:r>
-              <a:rPr lang="en-US">
-                <a:hlinkClick r:id="rId2"/>
-              </a:rPr>
-              <a:t>* https://www.surgehq.ai/blog/hellaswag-or-hellabad-36-of-this-popular-llm-benchmark-contains-errors</a:t>
-            </a:r>
-            <a:endParaRPr lang="en-US"/>
+              <a:t>“Input” = the prompt</a:t>
+            </a:r>
+          </a:p>
+          <a:p>
+            <a:r>
+              <a:rPr lang="en-US"/>
+              <a:t>“Target” = the possible responses for the input</a:t>
+            </a:r>
           </a:p>
         </p:txBody>
       </p:sp>
     </p:spTree>
     <p:extLst>
       <p:ext uri="{BB962C8B-B14F-4D97-AF65-F5344CB8AC3E}">
-        <p14:creationId xmlns:p14="http://schemas.microsoft.com/office/powerpoint/2010/main" val="1685030177"/>
+        <p14:creationId xmlns:p14="http://schemas.microsoft.com/office/powerpoint/2010/main" val="741648780"/>
       </p:ext>
     </p:extLst>
   </p:cSld>
@@ -6451,7 +6510,7 @@
           <p:cNvPr id="2" name="Title 1">
             <a:extLst>
               <a:ext uri="{FF2B5EF4-FFF2-40B4-BE49-F238E27FC236}">
-                <a16:creationId xmlns:a16="http://schemas.microsoft.com/office/drawing/2014/main" id="{FDFA3455-CC54-1858-F6E1-9D1E9F367A9C}"/>
+                <a16:creationId xmlns:a16="http://schemas.microsoft.com/office/drawing/2014/main" id="{F687EE5D-8588-E4E9-8CDA-40ED9372917C}"/>
               </a:ext>
             </a:extLst>
           </p:cNvPr>
@@ -6469,7 +6528,7 @@
           <a:p>
             <a:r>
               <a:rPr lang="en-US"/>
-              <a:t>Our Software Architecture</a:t>
+              <a:t>We don’t care about</a:t>
             </a:r>
           </a:p>
         </p:txBody>
@@ -6479,7 +6538,7 @@
           <p:cNvPr id="3" name="Content Placeholder 2">
             <a:extLst>
               <a:ext uri="{FF2B5EF4-FFF2-40B4-BE49-F238E27FC236}">
-                <a16:creationId xmlns:a16="http://schemas.microsoft.com/office/drawing/2014/main" id="{8A9B0413-47E3-6CF1-E675-81423FE2363C}"/>
+                <a16:creationId xmlns:a16="http://schemas.microsoft.com/office/drawing/2014/main" id="{CD2CF0FF-A79B-9D50-C9A0-BF17A4C8A8F6}"/>
               </a:ext>
             </a:extLst>
           </p:cNvPr>
@@ -6492,8 +6551,8 @@
         </p:nvSpPr>
         <p:spPr>
           <a:xfrm>
-            <a:off x="294968" y="1825625"/>
-            <a:ext cx="11749548" cy="4351338"/>
+            <a:off x="838200" y="1825625"/>
+            <a:ext cx="10515600" cy="1895475"/>
           </a:xfrm>
         </p:spPr>
         <p:txBody>
@@ -6502,114 +6561,39 @@
           <a:p>
             <a:r>
               <a:rPr lang="en-US"/>
-              <a:t>Jupyter Notebooks</a:t>
+              <a:t>Validity of questions*</a:t>
+            </a:r>
+          </a:p>
+          <a:p>
+            <a:r>
+              <a:rPr lang="en-US"/>
+              <a:t>Correct/Incorrect answers</a:t>
             </a:r>
           </a:p>
           <a:p>
             <a:endParaRPr lang="en-US"/>
           </a:p>
           <a:p>
-            <a:r>
-              <a:rPr lang="en-US"/>
-              <a:t>Each benchmark has an entry point module: </a:t>
-            </a:r>
-            <a:r>
-              <a:rPr lang="en-US" b="1"/>
-              <a:t>Main {benchmark}.ipynb</a:t>
-            </a:r>
-          </a:p>
-          <a:p>
             <a:endParaRPr lang="en-US"/>
           </a:p>
-          <a:p>
-            <a:r>
-              <a:rPr lang="en-US"/>
-              <a:t>Each benchmark has a directory structure</a:t>
-            </a:r>
-          </a:p>
-          <a:p>
-            <a:pPr lvl="1"/>
-            <a:r>
-              <a:rPr lang="en-US"/>
-              <a:t>A folder with the benchmark name, containing</a:t>
-            </a:r>
-          </a:p>
-          <a:p>
-            <a:pPr lvl="2"/>
-            <a:r>
-              <a:rPr lang="en-US"/>
-              <a:t>Questions in a folder called </a:t>
-            </a:r>
-            <a:r>
-              <a:rPr lang="en-US" b="1"/>
-              <a:t>data</a:t>
-            </a:r>
-          </a:p>
-          <a:p>
-            <a:pPr lvl="2"/>
-            <a:r>
-              <a:rPr lang="en-US"/>
-              <a:t>Results in a folder called </a:t>
-            </a:r>
-            <a:r>
-              <a:rPr lang="en-US" b="1"/>
-              <a:t>results</a:t>
-            </a:r>
-          </a:p>
-          <a:p>
-            <a:endParaRPr lang="en-US"/>
-          </a:p>
-          <a:p>
-            <a:endParaRPr lang="en-US"/>
-          </a:p>
-        </p:txBody>
-      </p:sp>
-      <p:pic>
-        <p:nvPicPr>
-          <p:cNvPr id="4" name="Picture 3">
-            <a:extLst>
-              <a:ext uri="{FF2B5EF4-FFF2-40B4-BE49-F238E27FC236}">
-                <a16:creationId xmlns:a16="http://schemas.microsoft.com/office/drawing/2014/main" id="{DE257DB7-0D50-E363-DB4B-041D54EE95A0}"/>
-              </a:ext>
-            </a:extLst>
-          </p:cNvPr>
-          <p:cNvPicPr>
-            <a:picLocks noChangeAspect="1"/>
-          </p:cNvPicPr>
+        </p:txBody>
+      </p:sp>
+      <p:sp>
+        <p:nvSpPr>
+          <p:cNvPr id="5" name="TextBox 4">
+            <a:extLst>
+              <a:ext uri="{FF2B5EF4-FFF2-40B4-BE49-F238E27FC236}">
+                <a16:creationId xmlns:a16="http://schemas.microsoft.com/office/drawing/2014/main" id="{E029A906-BD24-EE68-017C-5809292F9FD5}"/>
+              </a:ext>
+            </a:extLst>
+          </p:cNvPr>
+          <p:cNvSpPr txBox="1"/>
           <p:nvPr/>
-        </p:nvPicPr>
-        <p:blipFill>
-          <a:blip r:embed="rId2"/>
-          <a:stretch>
-            <a:fillRect/>
-          </a:stretch>
-        </p:blipFill>
+        </p:nvSpPr>
         <p:spPr>
           <a:xfrm>
-            <a:off x="8974067" y="3968495"/>
-            <a:ext cx="2476143" cy="2524380"/>
-          </a:xfrm>
-          <a:prstGeom prst="rect">
-            <a:avLst/>
-          </a:prstGeom>
-        </p:spPr>
-      </p:pic>
-      <p:sp>
-        <p:nvSpPr>
-          <p:cNvPr id="5" name="TextBox 4">
-            <a:extLst>
-              <a:ext uri="{FF2B5EF4-FFF2-40B4-BE49-F238E27FC236}">
-                <a16:creationId xmlns:a16="http://schemas.microsoft.com/office/drawing/2014/main" id="{0F461CCD-FDE2-3D60-A9BD-253BFDA14B52}"/>
-              </a:ext>
-            </a:extLst>
-          </p:cNvPr>
-          <p:cNvSpPr txBox="1"/>
-          <p:nvPr/>
-        </p:nvSpPr>
-        <p:spPr>
-          <a:xfrm>
-            <a:off x="7841200" y="6363471"/>
-            <a:ext cx="4454311" cy="369332"/>
+            <a:off x="406400" y="5988734"/>
+            <a:ext cx="10617200" cy="369332"/>
           </a:xfrm>
           <a:prstGeom prst="rect">
             <a:avLst/>
@@ -6624,9 +6608,9 @@
           <a:p>
             <a:r>
               <a:rPr lang="en-US">
-                <a:hlinkClick r:id="rId3"/>
+                <a:hlinkClick r:id="rId2"/>
               </a:rPr>
-              <a:t>https://github.com/nicomp42/CCSCMW2024</a:t>
+              <a:t>* https://www.surgehq.ai/blog/hellaswag-or-hellabad-36-of-this-popular-llm-benchmark-contains-errors</a:t>
             </a:r>
             <a:endParaRPr lang="en-US"/>
           </a:p>
@@ -6635,7 +6619,7 @@
     </p:spTree>
     <p:extLst>
       <p:ext uri="{BB962C8B-B14F-4D97-AF65-F5344CB8AC3E}">
-        <p14:creationId xmlns:p14="http://schemas.microsoft.com/office/powerpoint/2010/main" val="2534863046"/>
+        <p14:creationId xmlns:p14="http://schemas.microsoft.com/office/powerpoint/2010/main" val="1685030177"/>
       </p:ext>
     </p:extLst>
   </p:cSld>
@@ -6667,7 +6651,7 @@
           <p:cNvPr id="2" name="Title 1">
             <a:extLst>
               <a:ext uri="{FF2B5EF4-FFF2-40B4-BE49-F238E27FC236}">
-                <a16:creationId xmlns:a16="http://schemas.microsoft.com/office/drawing/2014/main" id="{78669370-A7BB-C18D-7C08-92128946698E}"/>
+                <a16:creationId xmlns:a16="http://schemas.microsoft.com/office/drawing/2014/main" id="{FDFA3455-CC54-1858-F6E1-9D1E9F367A9C}"/>
               </a:ext>
             </a:extLst>
           </p:cNvPr>
@@ -6685,7 +6669,7 @@
           <a:p>
             <a:r>
               <a:rPr lang="en-US"/>
-              <a:t>Consuming questions in different formats, from different sources.</a:t>
+              <a:t>Our Software Architecture</a:t>
             </a:r>
           </a:p>
         </p:txBody>
@@ -6695,7 +6679,7 @@
           <p:cNvPr id="3" name="Content Placeholder 2">
             <a:extLst>
               <a:ext uri="{FF2B5EF4-FFF2-40B4-BE49-F238E27FC236}">
-                <a16:creationId xmlns:a16="http://schemas.microsoft.com/office/drawing/2014/main" id="{D3CD48A2-3AE9-F3E5-DCCB-7FF4CA79883C}"/>
+                <a16:creationId xmlns:a16="http://schemas.microsoft.com/office/drawing/2014/main" id="{8A9B0413-47E3-6CF1-E675-81423FE2363C}"/>
               </a:ext>
             </a:extLst>
           </p:cNvPr>
@@ -6708,86 +6692,150 @@
         </p:nvSpPr>
         <p:spPr>
           <a:xfrm>
-            <a:off x="838200" y="2573106"/>
-            <a:ext cx="10515600" cy="3286279"/>
+            <a:off x="294968" y="1825625"/>
+            <a:ext cx="11749548" cy="4351338"/>
           </a:xfrm>
         </p:spPr>
         <p:txBody>
           <a:bodyPr/>
           <a:lstStyle/>
           <a:p>
-            <a:pPr marL="0" indent="0">
-              <a:buNone/>
-            </a:pPr>
             <a:r>
               <a:rPr lang="en-US"/>
-              <a:t>In our code, we end up with:</a:t>
+              <a:t>Jupyter Notebooks</a:t>
+            </a:r>
+          </a:p>
+          <a:p>
+            <a:endParaRPr lang="en-US"/>
+          </a:p>
+          <a:p>
+            <a:r>
+              <a:rPr lang="en-US"/>
+              <a:t>Each benchmark has an entry point module: </a:t>
+            </a:r>
+            <a:r>
+              <a:rPr lang="en-US" b="1"/>
+              <a:t>Main {benchmark}.ipynb</a:t>
+            </a:r>
+          </a:p>
+          <a:p>
+            <a:endParaRPr lang="en-US"/>
+          </a:p>
+          <a:p>
+            <a:r>
+              <a:rPr lang="en-US"/>
+              <a:t>Each benchmark has a directory structure</a:t>
             </a:r>
           </a:p>
           <a:p>
             <a:pPr lvl="1"/>
             <a:r>
               <a:rPr lang="en-US"/>
-              <a:t>A dictionary called </a:t>
-            </a:r>
-            <a:r>
-              <a:rPr lang="en-US" i="1"/>
-              <a:t>questions</a:t>
-            </a:r>
+              <a:t>A folder with the benchmark name, containing</a:t>
+            </a:r>
+          </a:p>
+          <a:p>
+            <a:pPr lvl="2"/>
             <a:r>
               <a:rPr lang="en-US"/>
-              <a:t> with at least 2 keys:</a:t>
+              <a:t>Questions in a folder called </a:t>
+            </a:r>
+            <a:r>
+              <a:rPr lang="en-US" b="1"/>
+              <a:t>data</a:t>
             </a:r>
           </a:p>
           <a:p>
             <a:pPr lvl="2"/>
             <a:r>
               <a:rPr lang="en-US"/>
-              <a:t>Key “input”-&gt; the text of the question</a:t>
-            </a:r>
-          </a:p>
-          <a:p>
-            <a:pPr lvl="2"/>
-            <a:r>
-              <a:rPr lang="en-US"/>
-              <a:t>Key “target” -&gt; the text of the possible answers</a:t>
-            </a:r>
-          </a:p>
-          <a:p>
-            <a:pPr lvl="2"/>
+              <a:t>Results in a folder called </a:t>
+            </a:r>
+            <a:r>
+              <a:rPr lang="en-US" b="1"/>
+              <a:t>results</a:t>
+            </a:r>
+          </a:p>
+          <a:p>
             <a:endParaRPr lang="en-US"/>
           </a:p>
           <a:p>
-            <a:pPr lvl="1"/>
-            <a:r>
-              <a:rPr lang="en-US"/>
-              <a:t>A humongous string called </a:t>
-            </a:r>
-            <a:r>
-              <a:rPr lang="en-US" i="1"/>
-              <a:t>text</a:t>
-            </a:r>
-          </a:p>
-          <a:p>
-            <a:pPr lvl="2"/>
-            <a:r>
-              <a:rPr lang="en-US"/>
-              <a:t>All the questions and answers appended together. </a:t>
-            </a:r>
-          </a:p>
-          <a:p>
-            <a:pPr lvl="2"/>
-            <a:r>
-              <a:rPr lang="en-US"/>
-              <a:t>Some cleanup, but not much. </a:t>
-            </a:r>
+            <a:endParaRPr lang="en-US"/>
+          </a:p>
+        </p:txBody>
+      </p:sp>
+      <p:pic>
+        <p:nvPicPr>
+          <p:cNvPr id="4" name="Picture 3">
+            <a:extLst>
+              <a:ext uri="{FF2B5EF4-FFF2-40B4-BE49-F238E27FC236}">
+                <a16:creationId xmlns:a16="http://schemas.microsoft.com/office/drawing/2014/main" id="{DE257DB7-0D50-E363-DB4B-041D54EE95A0}"/>
+              </a:ext>
+            </a:extLst>
+          </p:cNvPr>
+          <p:cNvPicPr>
+            <a:picLocks noChangeAspect="1"/>
+          </p:cNvPicPr>
+          <p:nvPr/>
+        </p:nvPicPr>
+        <p:blipFill>
+          <a:blip r:embed="rId2"/>
+          <a:stretch>
+            <a:fillRect/>
+          </a:stretch>
+        </p:blipFill>
+        <p:spPr>
+          <a:xfrm>
+            <a:off x="8974067" y="3968495"/>
+            <a:ext cx="2476143" cy="2524380"/>
+          </a:xfrm>
+          <a:prstGeom prst="rect">
+            <a:avLst/>
+          </a:prstGeom>
+        </p:spPr>
+      </p:pic>
+      <p:sp>
+        <p:nvSpPr>
+          <p:cNvPr id="5" name="TextBox 4">
+            <a:extLst>
+              <a:ext uri="{FF2B5EF4-FFF2-40B4-BE49-F238E27FC236}">
+                <a16:creationId xmlns:a16="http://schemas.microsoft.com/office/drawing/2014/main" id="{0F461CCD-FDE2-3D60-A9BD-253BFDA14B52}"/>
+              </a:ext>
+            </a:extLst>
+          </p:cNvPr>
+          <p:cNvSpPr txBox="1"/>
+          <p:nvPr/>
+        </p:nvSpPr>
+        <p:spPr>
+          <a:xfrm>
+            <a:off x="7841200" y="6363471"/>
+            <a:ext cx="4454311" cy="369332"/>
+          </a:xfrm>
+          <a:prstGeom prst="rect">
+            <a:avLst/>
+          </a:prstGeom>
+          <a:noFill/>
+        </p:spPr>
+        <p:txBody>
+          <a:bodyPr wrap="square">
+            <a:spAutoFit/>
+          </a:bodyPr>
+          <a:lstStyle/>
+          <a:p>
+            <a:r>
+              <a:rPr lang="en-US">
+                <a:hlinkClick r:id="rId3"/>
+              </a:rPr>
+              <a:t>https://github.com/nicomp42/CCSCMW2024</a:t>
+            </a:r>
+            <a:endParaRPr lang="en-US"/>
           </a:p>
         </p:txBody>
       </p:sp>
     </p:spTree>
     <p:extLst>
       <p:ext uri="{BB962C8B-B14F-4D97-AF65-F5344CB8AC3E}">
-        <p14:creationId xmlns:p14="http://schemas.microsoft.com/office/powerpoint/2010/main" val="448040412"/>
+        <p14:creationId xmlns:p14="http://schemas.microsoft.com/office/powerpoint/2010/main" val="2534863046"/>
       </p:ext>
     </p:extLst>
   </p:cSld>
@@ -6819,7 +6867,7 @@
           <p:cNvPr id="2" name="Title 1">
             <a:extLst>
               <a:ext uri="{FF2B5EF4-FFF2-40B4-BE49-F238E27FC236}">
-                <a16:creationId xmlns:a16="http://schemas.microsoft.com/office/drawing/2014/main" id="{9FB0CD49-94D2-C9E8-85C5-5645D8D67B5A}"/>
+                <a16:creationId xmlns:a16="http://schemas.microsoft.com/office/drawing/2014/main" id="{78669370-A7BB-C18D-7C08-92128946698E}"/>
               </a:ext>
             </a:extLst>
           </p:cNvPr>
@@ -6837,7 +6885,7 @@
           <a:p>
             <a:r>
               <a:rPr lang="en-US"/>
-              <a:t>Build your own benchmark processor</a:t>
+              <a:t>Consuming questions in different formats, from disparate sources.</a:t>
             </a:r>
           </a:p>
         </p:txBody>
@@ -6847,7 +6895,7 @@
           <p:cNvPr id="3" name="Content Placeholder 2">
             <a:extLst>
               <a:ext uri="{FF2B5EF4-FFF2-40B4-BE49-F238E27FC236}">
-                <a16:creationId xmlns:a16="http://schemas.microsoft.com/office/drawing/2014/main" id="{9BD455EE-60DD-B6F0-9D8D-AB7CB705677E}"/>
+                <a16:creationId xmlns:a16="http://schemas.microsoft.com/office/drawing/2014/main" id="{D3CD48A2-3AE9-F3E5-DCCB-7FF4CA79883C}"/>
               </a:ext>
             </a:extLst>
           </p:cNvPr>
@@ -6858,83 +6906,88 @@
             <p:ph idx="1"/>
           </p:nvPr>
         </p:nvSpPr>
-        <p:spPr/>
+        <p:spPr>
+          <a:xfrm>
+            <a:off x="838200" y="2573106"/>
+            <a:ext cx="10515600" cy="3286279"/>
+          </a:xfrm>
+        </p:spPr>
         <p:txBody>
           <a:bodyPr/>
           <a:lstStyle/>
           <a:p>
+            <a:pPr marL="0" indent="0">
+              <a:buNone/>
+            </a:pPr>
             <a:r>
               <a:rPr lang="en-US"/>
-              <a:t>Create the directory structure</a:t>
-            </a:r>
-          </a:p>
-          <a:p>
+              <a:t>In our code, we end up with:</a:t>
+            </a:r>
+          </a:p>
+          <a:p>
+            <a:pPr lvl="1"/>
+            <a:r>
+              <a:rPr lang="en-US"/>
+              <a:t>A list of dictionaries called </a:t>
+            </a:r>
+            <a:r>
+              <a:rPr lang="en-US" i="1"/>
+              <a:t>questions</a:t>
+            </a:r>
+            <a:r>
+              <a:rPr lang="en-US"/>
+              <a:t> with at least 2 keys:</a:t>
+            </a:r>
+          </a:p>
+          <a:p>
+            <a:pPr lvl="2"/>
+            <a:r>
+              <a:rPr lang="en-US"/>
+              <a:t>Key “input”-&gt; the text of the prompt</a:t>
+            </a:r>
+          </a:p>
+          <a:p>
+            <a:pPr lvl="2"/>
+            <a:r>
+              <a:rPr lang="en-US"/>
+              <a:t>Key “target” -&gt; the text of the possible responses</a:t>
+            </a:r>
+          </a:p>
+          <a:p>
+            <a:pPr lvl="2"/>
             <a:endParaRPr lang="en-US"/>
           </a:p>
           <a:p>
+            <a:pPr lvl="1"/>
             <a:r>
               <a:rPr lang="en-US"/>
-              <a:t>Add a processor class to load the original data</a:t>
-            </a:r>
-          </a:p>
-          <a:p>
-            <a:pPr lvl="1"/>
+              <a:t>A humongous string called </a:t>
+            </a:r>
+            <a:r>
+              <a:rPr lang="en-US" i="1"/>
+              <a:t>text</a:t>
+            </a:r>
+          </a:p>
+          <a:p>
+            <a:pPr lvl="2"/>
             <a:r>
               <a:rPr lang="en-US"/>
-              <a:t>Json_Processor.ipynb, or</a:t>
-            </a:r>
-          </a:p>
-          <a:p>
-            <a:pPr lvl="1"/>
+              <a:t>All the questions appended together. </a:t>
+            </a:r>
+          </a:p>
+          <a:p>
+            <a:pPr lvl="2"/>
             <a:r>
               <a:rPr lang="en-US"/>
-              <a:t>CSV_Processor.ipynb</a:t>
-            </a:r>
-          </a:p>
-          <a:p>
-            <a:pPr lvl="1"/>
-            <a:endParaRPr lang="en-US"/>
-          </a:p>
-          <a:p>
-            <a:r>
-              <a:rPr lang="en-US"/>
-              <a:t>Start with a copy of </a:t>
-            </a:r>
-            <a:r>
-              <a:rPr lang="en-US">
-                <a:latin typeface="Courier New" panose="02070309020205020404" pitchFamily="49" charset="0"/>
-                <a:cs typeface="Courier New" panose="02070309020205020404" pitchFamily="49" charset="0"/>
-              </a:rPr>
-              <a:t>Main Template.ipynb</a:t>
-            </a:r>
-          </a:p>
-          <a:p>
-            <a:pPr lvl="1"/>
-            <a:r>
-              <a:rPr lang="en-US"/>
-              <a:t>Follow the “ToDo”s in that notebook</a:t>
-            </a:r>
-          </a:p>
-          <a:p>
-            <a:pPr lvl="1"/>
-            <a:r>
-              <a:rPr lang="en-US"/>
-              <a:t>Run the notebook, look in the results folder</a:t>
-            </a:r>
-          </a:p>
-          <a:p>
-            <a:pPr lvl="1"/>
-            <a:endParaRPr lang="en-US"/>
-          </a:p>
-          <a:p>
-            <a:endParaRPr lang="en-US"/>
+              <a:t>Some cleanup, but not much. </a:t>
+            </a:r>
           </a:p>
         </p:txBody>
       </p:sp>
     </p:spTree>
     <p:extLst>
       <p:ext uri="{BB962C8B-B14F-4D97-AF65-F5344CB8AC3E}">
-        <p14:creationId xmlns:p14="http://schemas.microsoft.com/office/powerpoint/2010/main" val="2895837283"/>
+        <p14:creationId xmlns:p14="http://schemas.microsoft.com/office/powerpoint/2010/main" val="448040412"/>
       </p:ext>
     </p:extLst>
   </p:cSld>
@@ -6966,7 +7019,7 @@
           <p:cNvPr id="2" name="Title 1">
             <a:extLst>
               <a:ext uri="{FF2B5EF4-FFF2-40B4-BE49-F238E27FC236}">
-                <a16:creationId xmlns:a16="http://schemas.microsoft.com/office/drawing/2014/main" id="{7E874946-7719-1DD4-36D2-C920E29DF743}"/>
+                <a16:creationId xmlns:a16="http://schemas.microsoft.com/office/drawing/2014/main" id="{9FB0CD49-94D2-C9E8-85C5-5645D8D67B5A}"/>
               </a:ext>
             </a:extLst>
           </p:cNvPr>
@@ -6984,7 +7037,7 @@
           <a:p>
             <a:r>
               <a:rPr lang="en-US"/>
-              <a:t>Future Work</a:t>
+              <a:t>Build your own benchmark processor</a:t>
             </a:r>
           </a:p>
         </p:txBody>
@@ -6994,7 +7047,7 @@
           <p:cNvPr id="3" name="Content Placeholder 2">
             <a:extLst>
               <a:ext uri="{FF2B5EF4-FFF2-40B4-BE49-F238E27FC236}">
-                <a16:creationId xmlns:a16="http://schemas.microsoft.com/office/drawing/2014/main" id="{BCC2C7A4-E93D-9443-A93E-F0165815152E}"/>
+                <a16:creationId xmlns:a16="http://schemas.microsoft.com/office/drawing/2014/main" id="{9BD455EE-60DD-B6F0-9D8D-AB7CB705677E}"/>
               </a:ext>
             </a:extLst>
           </p:cNvPr>
@@ -7005,98 +7058,83 @@
             <p:ph idx="1"/>
           </p:nvPr>
         </p:nvSpPr>
-        <p:spPr>
-          <a:xfrm>
-            <a:off x="838200" y="1825625"/>
-            <a:ext cx="11176000" cy="4351338"/>
-          </a:xfrm>
-        </p:spPr>
-        <p:txBody>
-          <a:bodyPr>
-            <a:normAutofit fontScale="92500" lnSpcReduction="10000"/>
-          </a:bodyPr>
+        <p:spPr/>
+        <p:txBody>
+          <a:bodyPr/>
           <a:lstStyle/>
           <a:p>
             <a:r>
               <a:rPr lang="en-US"/>
-              <a:t>Filter out common words prior to analysis</a:t>
+              <a:t>Create the directory structure</a:t>
+            </a:r>
+          </a:p>
+          <a:p>
+            <a:endParaRPr lang="en-US"/>
+          </a:p>
+          <a:p>
+            <a:r>
+              <a:rPr lang="en-US"/>
+              <a:t>Add a processor class to load the original data</a:t>
             </a:r>
           </a:p>
           <a:p>
             <a:pPr lvl="1"/>
             <a:r>
               <a:rPr lang="en-US"/>
-              <a:t>See function </a:t>
+              <a:t>Json_Processor.ipynb, or</a:t>
+            </a:r>
+          </a:p>
+          <a:p>
+            <a:pPr lvl="1"/>
+            <a:r>
+              <a:rPr lang="en-US"/>
+              <a:t>CSV_Processor.ipynb</a:t>
+            </a:r>
+          </a:p>
+          <a:p>
+            <a:pPr lvl="1"/>
+            <a:endParaRPr lang="en-US"/>
+          </a:p>
+          <a:p>
+            <a:r>
+              <a:rPr lang="en-US"/>
+              <a:t>Start with a copy of </a:t>
             </a:r>
             <a:r>
               <a:rPr lang="en-US">
                 <a:latin typeface="Courier New" panose="02070309020205020404" pitchFamily="49" charset="0"/>
                 <a:cs typeface="Courier New" panose="02070309020205020404" pitchFamily="49" charset="0"/>
               </a:rPr>
-              <a:t>build_text_from_questions</a:t>
+              <a:t>Main Template.ipynb</a:t>
             </a:r>
           </a:p>
           <a:p>
             <a:pPr lvl="1"/>
-            <a:endParaRPr lang="en-US">
-              <a:latin typeface="Courier New" panose="02070309020205020404" pitchFamily="49" charset="0"/>
-              <a:cs typeface="Courier New" panose="02070309020205020404" pitchFamily="49" charset="0"/>
-            </a:endParaRPr>
-          </a:p>
-          <a:p>
             <a:r>
               <a:rPr lang="en-US"/>
-              <a:t>Implement Sentiment Analysis</a:t>
-            </a:r>
-          </a:p>
-          <a:p>
+              <a:t>Follow the “ToDo”s in that notebook</a:t>
+            </a:r>
+          </a:p>
+          <a:p>
+            <a:pPr lvl="1"/>
+            <a:r>
+              <a:rPr lang="en-US"/>
+              <a:t>Run the notebook, look in the results folder</a:t>
+            </a:r>
+          </a:p>
+          <a:p>
+            <a:pPr lvl="1"/>
             <a:endParaRPr lang="en-US"/>
           </a:p>
           <a:p>
-            <a:r>
-              <a:rPr lang="en-US"/>
-              <a:t>Read up on Word Clouds (what value do they provide?)</a:t>
-            </a:r>
-          </a:p>
-          <a:p>
             <a:endParaRPr lang="en-US"/>
-          </a:p>
-          <a:p>
-            <a:r>
-              <a:rPr lang="en-US"/>
-              <a:t>Investigate the impact on leaderboards from subtle changes to the questions.</a:t>
-            </a:r>
-          </a:p>
-          <a:p>
-            <a:endParaRPr lang="en-US"/>
-          </a:p>
-          <a:p>
-            <a:r>
-              <a:rPr lang="en-US"/>
-              <a:t>Investigate grammar issues in questions </a:t>
-            </a:r>
-          </a:p>
-          <a:p>
-            <a:endParaRPr lang="en-US"/>
-          </a:p>
-          <a:p>
-            <a:endParaRPr lang="en-US">
-              <a:latin typeface="Courier New" panose="02070309020205020404" pitchFamily="49" charset="0"/>
-              <a:cs typeface="Courier New" panose="02070309020205020404" pitchFamily="49" charset="0"/>
-            </a:endParaRPr>
-          </a:p>
-          <a:p>
-            <a:endParaRPr lang="en-US">
-              <a:latin typeface="Courier New" panose="02070309020205020404" pitchFamily="49" charset="0"/>
-              <a:cs typeface="Courier New" panose="02070309020205020404" pitchFamily="49" charset="0"/>
-            </a:endParaRPr>
           </a:p>
         </p:txBody>
       </p:sp>
     </p:spTree>
     <p:extLst>
       <p:ext uri="{BB962C8B-B14F-4D97-AF65-F5344CB8AC3E}">
-        <p14:creationId xmlns:p14="http://schemas.microsoft.com/office/powerpoint/2010/main" val="3186923783"/>
+        <p14:creationId xmlns:p14="http://schemas.microsoft.com/office/powerpoint/2010/main" val="2895837283"/>
       </p:ext>
     </p:extLst>
   </p:cSld>
@@ -7128,7 +7166,7 @@
           <p:cNvPr id="2" name="Title 1">
             <a:extLst>
               <a:ext uri="{FF2B5EF4-FFF2-40B4-BE49-F238E27FC236}">
-                <a16:creationId xmlns:a16="http://schemas.microsoft.com/office/drawing/2014/main" id="{28AA1E5E-B80B-A889-1772-8A5260B7C376}"/>
+                <a16:creationId xmlns:a16="http://schemas.microsoft.com/office/drawing/2014/main" id="{9DC7FC3B-F43C-BC0E-3F1F-92131A74B2C0}"/>
               </a:ext>
             </a:extLst>
           </p:cNvPr>
@@ -7139,22 +7177,1799 @@
             <p:ph type="title"/>
           </p:nvPr>
         </p:nvSpPr>
-        <p:spPr/>
+        <p:spPr>
+          <a:xfrm>
+            <a:off x="838200" y="365126"/>
+            <a:ext cx="10515600" cy="761546"/>
+          </a:xfrm>
+        </p:spPr>
         <p:txBody>
           <a:bodyPr/>
           <a:lstStyle/>
           <a:p>
             <a:r>
-              <a:rPr lang="en-US"/>
-              <a:t>Questions?</a:t>
-            </a:r>
-          </a:p>
-        </p:txBody>
-      </p:sp>
+              <a:rPr lang="en-US" dirty="0"/>
+              <a:t>Language Analysis of Benchmark Questions</a:t>
+            </a:r>
+          </a:p>
+        </p:txBody>
+      </p:sp>
+      <p:graphicFrame>
+        <p:nvGraphicFramePr>
+          <p:cNvPr id="4" name="Table 3">
+            <a:extLst>
+              <a:ext uri="{FF2B5EF4-FFF2-40B4-BE49-F238E27FC236}">
+                <a16:creationId xmlns:a16="http://schemas.microsoft.com/office/drawing/2014/main" id="{53BB48AC-4A02-C13B-FA79-EB2BD9D8A318}"/>
+              </a:ext>
+            </a:extLst>
+          </p:cNvPr>
+          <p:cNvGraphicFramePr>
+            <a:graphicFrameLocks noGrp="1"/>
+          </p:cNvGraphicFramePr>
+          <p:nvPr/>
+        </p:nvGraphicFramePr>
+        <p:xfrm>
+          <a:off x="1152473" y="1733513"/>
+          <a:ext cx="9887053" cy="3999841"/>
+        </p:xfrm>
+        <a:graphic>
+          <a:graphicData uri="http://schemas.openxmlformats.org/drawingml/2006/table">
+            <a:tbl>
+              <a:tblPr firstRow="1" bandRow="1">
+                <a:tableStyleId>{073A0DAA-6AF3-43AB-8588-CEC1D06C72B9}</a:tableStyleId>
+              </a:tblPr>
+              <a:tblGrid>
+                <a:gridCol w="1916450">
+                  <a:extLst>
+                    <a:ext uri="{9D8B030D-6E8A-4147-A177-3AD203B41FA5}">
+                      <a16:colId xmlns:a16="http://schemas.microsoft.com/office/drawing/2014/main" val="3976707372"/>
+                    </a:ext>
+                  </a:extLst>
+                </a:gridCol>
+                <a:gridCol w="1916450">
+                  <a:extLst>
+                    <a:ext uri="{9D8B030D-6E8A-4147-A177-3AD203B41FA5}">
+                      <a16:colId xmlns:a16="http://schemas.microsoft.com/office/drawing/2014/main" val="210508298"/>
+                    </a:ext>
+                  </a:extLst>
+                </a:gridCol>
+                <a:gridCol w="2416297">
+                  <a:extLst>
+                    <a:ext uri="{9D8B030D-6E8A-4147-A177-3AD203B41FA5}">
+                      <a16:colId xmlns:a16="http://schemas.microsoft.com/office/drawing/2014/main" val="2828519578"/>
+                    </a:ext>
+                  </a:extLst>
+                </a:gridCol>
+                <a:gridCol w="1817613">
+                  <a:extLst>
+                    <a:ext uri="{9D8B030D-6E8A-4147-A177-3AD203B41FA5}">
+                      <a16:colId xmlns:a16="http://schemas.microsoft.com/office/drawing/2014/main" val="3762947871"/>
+                    </a:ext>
+                  </a:extLst>
+                </a:gridCol>
+                <a:gridCol w="1820243">
+                  <a:extLst>
+                    <a:ext uri="{9D8B030D-6E8A-4147-A177-3AD203B41FA5}">
+                      <a16:colId xmlns:a16="http://schemas.microsoft.com/office/drawing/2014/main" val="1060645426"/>
+                    </a:ext>
+                  </a:extLst>
+                </a:gridCol>
+              </a:tblGrid>
+              <a:tr h="720946">
+                <a:tc>
+                  <a:txBody>
+                    <a:bodyPr/>
+                    <a:lstStyle/>
+                    <a:p>
+                      <a:r>
+                        <a:rPr lang="en-US" b="0" dirty="0">
+                          <a:solidFill>
+                            <a:schemeClr val="bg1"/>
+                          </a:solidFill>
+                        </a:rPr>
+                        <a:t>Benchmark</a:t>
+                      </a:r>
+                    </a:p>
+                  </a:txBody>
+                  <a:tcPr/>
+                </a:tc>
+                <a:tc>
+                  <a:txBody>
+                    <a:bodyPr/>
+                    <a:lstStyle/>
+                    <a:p>
+                      <a:r>
+                        <a:rPr lang="en-US" b="0" dirty="0">
+                          <a:solidFill>
+                            <a:schemeClr val="bg1"/>
+                          </a:solidFill>
+                        </a:rPr>
+                        <a:t>Gunning FOG</a:t>
+                      </a:r>
+                      <a:br>
+                        <a:rPr lang="en-US" b="0" dirty="0">
+                          <a:solidFill>
+                            <a:schemeClr val="bg1"/>
+                          </a:solidFill>
+                        </a:rPr>
+                      </a:br>
+                      <a:r>
+                        <a:rPr lang="en-US" b="0" dirty="0">
+                          <a:solidFill>
+                            <a:schemeClr val="bg1"/>
+                          </a:solidFill>
+                        </a:rPr>
+                        <a:t>Grade Level</a:t>
+                      </a:r>
+                    </a:p>
+                  </a:txBody>
+                  <a:tcPr/>
+                </a:tc>
+                <a:tc>
+                  <a:txBody>
+                    <a:bodyPr/>
+                    <a:lstStyle/>
+                    <a:p>
+                      <a:r>
+                        <a:rPr lang="en-US" sz="1800" b="0" dirty="0">
+                          <a:solidFill>
+                            <a:schemeClr val="bg1"/>
+                          </a:solidFill>
+                        </a:rPr>
+                        <a:t>Flesch Reading Ease </a:t>
+                      </a:r>
+                      <a:br>
+                        <a:rPr lang="en-US" sz="1800" b="0" dirty="0">
+                          <a:solidFill>
+                            <a:schemeClr val="bg1"/>
+                          </a:solidFill>
+                        </a:rPr>
+                      </a:br>
+                      <a:r>
+                        <a:rPr lang="en-US" sz="1800" b="0" dirty="0">
+                          <a:solidFill>
+                            <a:schemeClr val="bg1"/>
+                          </a:solidFill>
+                        </a:rPr>
+                        <a:t>Grade Level</a:t>
+                      </a:r>
+                      <a:endParaRPr lang="en-US" b="0" dirty="0">
+                        <a:solidFill>
+                          <a:schemeClr val="bg1"/>
+                        </a:solidFill>
+                      </a:endParaRPr>
+                    </a:p>
+                  </a:txBody>
+                  <a:tcPr/>
+                </a:tc>
+                <a:tc>
+                  <a:txBody>
+                    <a:bodyPr/>
+                    <a:lstStyle/>
+                    <a:p>
+                      <a:r>
+                        <a:rPr lang="en-US" sz="1800" b="0" dirty="0">
+                          <a:solidFill>
+                            <a:schemeClr val="bg1"/>
+                          </a:solidFill>
+                        </a:rPr>
+                        <a:t>Flesh-Kincaid Grade Level</a:t>
+                      </a:r>
+                      <a:endParaRPr lang="en-US" b="0" dirty="0">
+                        <a:solidFill>
+                          <a:schemeClr val="bg1"/>
+                        </a:solidFill>
+                      </a:endParaRPr>
+                    </a:p>
+                  </a:txBody>
+                  <a:tcPr/>
+                </a:tc>
+                <a:tc>
+                  <a:txBody>
+                    <a:bodyPr/>
+                    <a:lstStyle/>
+                    <a:p>
+                      <a:r>
+                        <a:rPr lang="en-US" b="0" dirty="0">
+                          <a:solidFill>
+                            <a:schemeClr val="bg1"/>
+                          </a:solidFill>
+                        </a:rPr>
+                        <a:t>Author’s Claim</a:t>
+                      </a:r>
+                    </a:p>
+                  </a:txBody>
+                  <a:tcPr/>
+                </a:tc>
+                <a:extLst>
+                  <a:ext uri="{0D108BD9-81ED-4DB2-BD59-A6C34878D82A}">
+                    <a16:rowId xmlns:a16="http://schemas.microsoft.com/office/drawing/2014/main" val="4016362568"/>
+                  </a:ext>
+                </a:extLst>
+              </a:tr>
+              <a:tr h="527763">
+                <a:tc>
+                  <a:txBody>
+                    <a:bodyPr/>
+                    <a:lstStyle/>
+                    <a:p>
+                      <a:r>
+                        <a:rPr lang="en-US" b="1" dirty="0"/>
+                        <a:t>ARC</a:t>
+                      </a:r>
+                      <a:endParaRPr lang="en-US" dirty="0"/>
+                    </a:p>
+                  </a:txBody>
+                  <a:tcPr/>
+                </a:tc>
+                <a:tc>
+                  <a:txBody>
+                    <a:bodyPr/>
+                    <a:lstStyle/>
+                    <a:p>
+                      <a:pPr algn="ctr"/>
+                      <a:r>
+                        <a:rPr lang="en-US" dirty="0"/>
+                        <a:t>7</a:t>
+                      </a:r>
+                      <a:r>
+                        <a:rPr lang="en-US" baseline="30000" dirty="0"/>
+                        <a:t>th</a:t>
+                      </a:r>
+                      <a:endParaRPr lang="en-US" dirty="0"/>
+                    </a:p>
+                  </a:txBody>
+                  <a:tcPr/>
+                </a:tc>
+                <a:tc>
+                  <a:txBody>
+                    <a:bodyPr/>
+                    <a:lstStyle/>
+                    <a:p>
+                      <a:pPr algn="ctr"/>
+                      <a:r>
+                        <a:rPr lang="en-US" dirty="0"/>
+                        <a:t>8</a:t>
+                      </a:r>
+                      <a:r>
+                        <a:rPr lang="en-US" baseline="30000" dirty="0"/>
+                        <a:t>th</a:t>
+                      </a:r>
+                      <a:endParaRPr lang="en-US" dirty="0"/>
+                    </a:p>
+                  </a:txBody>
+                  <a:tcPr/>
+                </a:tc>
+                <a:tc>
+                  <a:txBody>
+                    <a:bodyPr/>
+                    <a:lstStyle/>
+                    <a:p>
+                      <a:pPr algn="ctr"/>
+                      <a:r>
+                        <a:rPr lang="en-US" dirty="0"/>
+                        <a:t>7.3</a:t>
+                      </a:r>
+                    </a:p>
+                  </a:txBody>
+                  <a:tcPr/>
+                </a:tc>
+                <a:tc>
+                  <a:txBody>
+                    <a:bodyPr/>
+                    <a:lstStyle/>
+                    <a:p>
+                      <a:r>
+                        <a:rPr lang="en-US" dirty="0"/>
+                        <a:t>3</a:t>
+                      </a:r>
+                      <a:r>
+                        <a:rPr lang="en-US" baseline="30000" dirty="0"/>
+                        <a:t>rd</a:t>
+                      </a:r>
+                      <a:r>
+                        <a:rPr lang="en-US" dirty="0"/>
+                        <a:t> to 9</a:t>
+                      </a:r>
+                      <a:r>
+                        <a:rPr lang="en-US" baseline="30000" dirty="0"/>
+                        <a:t>th</a:t>
+                      </a:r>
+                      <a:r>
+                        <a:rPr lang="en-US" dirty="0"/>
+                        <a:t> Grade</a:t>
+                      </a:r>
+                    </a:p>
+                  </a:txBody>
+                  <a:tcPr/>
+                </a:tc>
+                <a:extLst>
+                  <a:ext uri="{0D108BD9-81ED-4DB2-BD59-A6C34878D82A}">
+                    <a16:rowId xmlns:a16="http://schemas.microsoft.com/office/drawing/2014/main" val="3013987212"/>
+                  </a:ext>
+                </a:extLst>
+              </a:tr>
+              <a:tr h="527763">
+                <a:tc>
+                  <a:txBody>
+                    <a:bodyPr/>
+                    <a:lstStyle/>
+                    <a:p>
+                      <a:r>
+                        <a:rPr lang="en-US" b="1" dirty="0"/>
+                        <a:t>GSM8K</a:t>
+                      </a:r>
+                      <a:endParaRPr lang="en-US" dirty="0"/>
+                    </a:p>
+                  </a:txBody>
+                  <a:tcPr/>
+                </a:tc>
+                <a:tc>
+                  <a:txBody>
+                    <a:bodyPr/>
+                    <a:lstStyle/>
+                    <a:p>
+                      <a:pPr algn="ctr"/>
+                      <a:r>
+                        <a:rPr lang="en-US" dirty="0"/>
+                        <a:t>&lt; 6</a:t>
+                      </a:r>
+                      <a:r>
+                        <a:rPr lang="en-US" baseline="30000" dirty="0"/>
+                        <a:t>th</a:t>
+                      </a:r>
+                      <a:r>
+                        <a:rPr lang="en-US" dirty="0"/>
+                        <a:t> </a:t>
+                      </a:r>
+                    </a:p>
+                  </a:txBody>
+                  <a:tcPr/>
+                </a:tc>
+                <a:tc>
+                  <a:txBody>
+                    <a:bodyPr/>
+                    <a:lstStyle/>
+                    <a:p>
+                      <a:pPr algn="ctr"/>
+                      <a:r>
+                        <a:rPr lang="en-US" dirty="0"/>
+                        <a:t>6th</a:t>
+                      </a:r>
+                    </a:p>
+                  </a:txBody>
+                  <a:tcPr/>
+                </a:tc>
+                <a:tc>
+                  <a:txBody>
+                    <a:bodyPr/>
+                    <a:lstStyle/>
+                    <a:p>
+                      <a:pPr algn="ctr"/>
+                      <a:r>
+                        <a:rPr lang="en-US" dirty="0"/>
+                        <a:t>3.5</a:t>
+                      </a:r>
+                    </a:p>
+                  </a:txBody>
+                  <a:tcPr/>
+                </a:tc>
+                <a:tc>
+                  <a:txBody>
+                    <a:bodyPr/>
+                    <a:lstStyle/>
+                    <a:p>
+                      <a:r>
+                        <a:rPr lang="en-US" dirty="0"/>
+                        <a:t>Grade school math problems</a:t>
+                      </a:r>
+                    </a:p>
+                  </a:txBody>
+                  <a:tcPr/>
+                </a:tc>
+                <a:extLst>
+                  <a:ext uri="{0D108BD9-81ED-4DB2-BD59-A6C34878D82A}">
+                    <a16:rowId xmlns:a16="http://schemas.microsoft.com/office/drawing/2014/main" val="2537115920"/>
+                  </a:ext>
+                </a:extLst>
+              </a:tr>
+              <a:tr h="527763">
+                <a:tc>
+                  <a:txBody>
+                    <a:bodyPr/>
+                    <a:lstStyle/>
+                    <a:p>
+                      <a:r>
+                        <a:rPr lang="en-US" b="1" dirty="0"/>
+                        <a:t>HellaSwag</a:t>
+                      </a:r>
+                      <a:endParaRPr lang="en-US" dirty="0"/>
+                    </a:p>
+                  </a:txBody>
+                  <a:tcPr/>
+                </a:tc>
+                <a:tc>
+                  <a:txBody>
+                    <a:bodyPr/>
+                    <a:lstStyle/>
+                    <a:p>
+                      <a:pPr algn="ctr"/>
+                      <a:r>
+                        <a:rPr lang="en-US" dirty="0"/>
+                        <a:t>6</a:t>
+                      </a:r>
+                      <a:r>
+                        <a:rPr lang="en-US" baseline="30000" dirty="0"/>
+                        <a:t>th</a:t>
+                      </a:r>
+                      <a:endParaRPr lang="en-US" dirty="0"/>
+                    </a:p>
+                  </a:txBody>
+                  <a:tcPr/>
+                </a:tc>
+                <a:tc>
+                  <a:txBody>
+                    <a:bodyPr/>
+                    <a:lstStyle/>
+                    <a:p>
+                      <a:pPr algn="ctr"/>
+                      <a:r>
+                        <a:rPr lang="en-US" dirty="0"/>
+                        <a:t>7</a:t>
+                      </a:r>
+                      <a:r>
+                        <a:rPr lang="en-US" baseline="30000" dirty="0"/>
+                        <a:t>th</a:t>
+                      </a:r>
+                      <a:endParaRPr lang="en-US" dirty="0"/>
+                    </a:p>
+                  </a:txBody>
+                  <a:tcPr/>
+                </a:tc>
+                <a:tc>
+                  <a:txBody>
+                    <a:bodyPr/>
+                    <a:lstStyle/>
+                    <a:p>
+                      <a:pPr algn="ctr"/>
+                      <a:r>
+                        <a:rPr lang="en-US" dirty="0"/>
+                        <a:t>6.9</a:t>
+                      </a:r>
+                    </a:p>
+                  </a:txBody>
+                  <a:tcPr/>
+                </a:tc>
+                <a:tc>
+                  <a:txBody>
+                    <a:bodyPr/>
+                    <a:lstStyle/>
+                    <a:p>
+                      <a:r>
+                        <a:rPr lang="en-US" dirty="0"/>
+                        <a:t>Not addressed</a:t>
+                      </a:r>
+                    </a:p>
+                  </a:txBody>
+                  <a:tcPr/>
+                </a:tc>
+                <a:extLst>
+                  <a:ext uri="{0D108BD9-81ED-4DB2-BD59-A6C34878D82A}">
+                    <a16:rowId xmlns:a16="http://schemas.microsoft.com/office/drawing/2014/main" val="3449423532"/>
+                  </a:ext>
+                </a:extLst>
+              </a:tr>
+              <a:tr h="527763">
+                <a:tc>
+                  <a:txBody>
+                    <a:bodyPr/>
+                    <a:lstStyle/>
+                    <a:p>
+                      <a:pPr marL="0" marR="0" lvl="0" indent="0" algn="l" defTabSz="914400" rtl="0" eaLnBrk="1" fontAlgn="auto" latinLnBrk="0" hangingPunct="1">
+                        <a:lnSpc>
+                          <a:spcPct val="100000"/>
+                        </a:lnSpc>
+                        <a:spcBef>
+                          <a:spcPts val="0"/>
+                        </a:spcBef>
+                        <a:spcAft>
+                          <a:spcPts val="0"/>
+                        </a:spcAft>
+                        <a:buClrTx/>
+                        <a:buSzTx/>
+                        <a:buFontTx/>
+                        <a:buNone/>
+                        <a:tabLst/>
+                        <a:defRPr/>
+                      </a:pPr>
+                      <a:r>
+                        <a:rPr lang="en-US" b="1" dirty="0"/>
+                        <a:t>TruthfulQA</a:t>
+                      </a:r>
+                      <a:endParaRPr lang="en-US" dirty="0"/>
+                    </a:p>
+                  </a:txBody>
+                  <a:tcPr/>
+                </a:tc>
+                <a:tc>
+                  <a:txBody>
+                    <a:bodyPr/>
+                    <a:lstStyle/>
+                    <a:p>
+                      <a:pPr algn="ctr"/>
+                      <a:r>
+                        <a:rPr lang="en-US" dirty="0"/>
+                        <a:t>&lt; 6</a:t>
+                      </a:r>
+                      <a:r>
+                        <a:rPr lang="en-US" baseline="30000" dirty="0"/>
+                        <a:t>th</a:t>
+                      </a:r>
+                      <a:endParaRPr lang="en-US" dirty="0"/>
+                    </a:p>
+                  </a:txBody>
+                  <a:tcPr/>
+                </a:tc>
+                <a:tc>
+                  <a:txBody>
+                    <a:bodyPr/>
+                    <a:lstStyle/>
+                    <a:p>
+                      <a:pPr algn="ctr"/>
+                      <a:r>
+                        <a:rPr lang="en-US" dirty="0"/>
+                        <a:t>7</a:t>
+                      </a:r>
+                      <a:r>
+                        <a:rPr lang="en-US" baseline="30000" dirty="0"/>
+                        <a:t>th</a:t>
+                      </a:r>
+                      <a:endParaRPr lang="en-US" dirty="0"/>
+                    </a:p>
+                  </a:txBody>
+                  <a:tcPr/>
+                </a:tc>
+                <a:tc>
+                  <a:txBody>
+                    <a:bodyPr/>
+                    <a:lstStyle/>
+                    <a:p>
+                      <a:pPr algn="ctr"/>
+                      <a:r>
+                        <a:rPr lang="en-US" dirty="0"/>
+                        <a:t>4.7</a:t>
+                      </a:r>
+                    </a:p>
+                  </a:txBody>
+                  <a:tcPr/>
+                </a:tc>
+                <a:tc>
+                  <a:txBody>
+                    <a:bodyPr/>
+                    <a:lstStyle/>
+                    <a:p>
+                      <a:r>
+                        <a:rPr lang="en-US" dirty="0"/>
+                        <a:t>Not addressed</a:t>
+                      </a:r>
+                    </a:p>
+                  </a:txBody>
+                  <a:tcPr/>
+                </a:tc>
+                <a:extLst>
+                  <a:ext uri="{0D108BD9-81ED-4DB2-BD59-A6C34878D82A}">
+                    <a16:rowId xmlns:a16="http://schemas.microsoft.com/office/drawing/2014/main" val="2415504552"/>
+                  </a:ext>
+                </a:extLst>
+              </a:tr>
+              <a:tr h="527763">
+                <a:tc>
+                  <a:txBody>
+                    <a:bodyPr/>
+                    <a:lstStyle/>
+                    <a:p>
+                      <a:pPr marL="0" marR="0" lvl="0" indent="0" algn="l" defTabSz="914400" rtl="0" eaLnBrk="1" fontAlgn="auto" latinLnBrk="0" hangingPunct="1">
+                        <a:lnSpc>
+                          <a:spcPct val="100000"/>
+                        </a:lnSpc>
+                        <a:spcBef>
+                          <a:spcPts val="0"/>
+                        </a:spcBef>
+                        <a:spcAft>
+                          <a:spcPts val="0"/>
+                        </a:spcAft>
+                        <a:buClrTx/>
+                        <a:buSzTx/>
+                        <a:buFontTx/>
+                        <a:buNone/>
+                        <a:tabLst/>
+                        <a:defRPr/>
+                      </a:pPr>
+                      <a:r>
+                        <a:rPr lang="en-US" b="1" dirty="0"/>
+                        <a:t>Big-Bench Hard</a:t>
+                      </a:r>
+                    </a:p>
+                  </a:txBody>
+                  <a:tcPr/>
+                </a:tc>
+                <a:tc>
+                  <a:txBody>
+                    <a:bodyPr/>
+                    <a:lstStyle/>
+                    <a:p>
+                      <a:pPr algn="ctr"/>
+                      <a:r>
+                        <a:rPr lang="en-US" dirty="0"/>
+                        <a:t>6</a:t>
+                      </a:r>
+                      <a:r>
+                        <a:rPr lang="en-US" baseline="30000" dirty="0"/>
+                        <a:t>th</a:t>
+                      </a:r>
+                      <a:endParaRPr lang="en-US" dirty="0"/>
+                    </a:p>
+                  </a:txBody>
+                  <a:tcPr/>
+                </a:tc>
+                <a:tc>
+                  <a:txBody>
+                    <a:bodyPr/>
+                    <a:lstStyle/>
+                    <a:p>
+                      <a:pPr algn="ctr"/>
+                      <a:r>
+                        <a:rPr lang="en-US" dirty="0"/>
+                        <a:t>7</a:t>
+                      </a:r>
+                      <a:r>
+                        <a:rPr lang="en-US" baseline="30000" dirty="0"/>
+                        <a:t>th</a:t>
+                      </a:r>
+                      <a:endParaRPr lang="en-US" dirty="0"/>
+                    </a:p>
+                  </a:txBody>
+                  <a:tcPr/>
+                </a:tc>
+                <a:tc>
+                  <a:txBody>
+                    <a:bodyPr/>
+                    <a:lstStyle/>
+                    <a:p>
+                      <a:pPr algn="ctr"/>
+                      <a:r>
+                        <a:rPr lang="en-US" dirty="0"/>
+                        <a:t>7</a:t>
+                      </a:r>
+                    </a:p>
+                  </a:txBody>
+                  <a:tcPr/>
+                </a:tc>
+                <a:tc>
+                  <a:txBody>
+                    <a:bodyPr/>
+                    <a:lstStyle/>
+                    <a:p>
+                      <a:r>
+                        <a:rPr lang="en-US" dirty="0"/>
+                        <a:t>Not addressed</a:t>
+                      </a:r>
+                    </a:p>
+                  </a:txBody>
+                  <a:tcPr/>
+                </a:tc>
+                <a:extLst>
+                  <a:ext uri="{0D108BD9-81ED-4DB2-BD59-A6C34878D82A}">
+                    <a16:rowId xmlns:a16="http://schemas.microsoft.com/office/drawing/2014/main" val="370172682"/>
+                  </a:ext>
+                </a:extLst>
+              </a:tr>
+              <a:tr h="527763">
+                <a:tc>
+                  <a:txBody>
+                    <a:bodyPr/>
+                    <a:lstStyle/>
+                    <a:p>
+                      <a:pPr marL="0" marR="0" lvl="0" indent="0" algn="l" defTabSz="914400" rtl="0" eaLnBrk="1" fontAlgn="auto" latinLnBrk="0" hangingPunct="1">
+                        <a:lnSpc>
+                          <a:spcPct val="100000"/>
+                        </a:lnSpc>
+                        <a:spcBef>
+                          <a:spcPts val="0"/>
+                        </a:spcBef>
+                        <a:spcAft>
+                          <a:spcPts val="0"/>
+                        </a:spcAft>
+                        <a:buClrTx/>
+                        <a:buSzTx/>
+                        <a:buFontTx/>
+                        <a:buNone/>
+                        <a:tabLst/>
+                        <a:defRPr/>
+                      </a:pPr>
+                      <a:r>
+                        <a:rPr lang="en-US" b="1" dirty="0"/>
+                        <a:t>MMLU</a:t>
+                      </a:r>
+                    </a:p>
+                  </a:txBody>
+                  <a:tcPr/>
+                </a:tc>
+                <a:tc>
+                  <a:txBody>
+                    <a:bodyPr/>
+                    <a:lstStyle/>
+                    <a:p>
+                      <a:pPr algn="ctr"/>
+                      <a:r>
+                        <a:rPr lang="en-US" dirty="0"/>
+                        <a:t>8</a:t>
+                      </a:r>
+                    </a:p>
+                  </a:txBody>
+                  <a:tcPr/>
+                </a:tc>
+                <a:tc>
+                  <a:txBody>
+                    <a:bodyPr/>
+                    <a:lstStyle/>
+                    <a:p>
+                      <a:pPr algn="ctr"/>
+                      <a:r>
+                        <a:rPr lang="en-US" dirty="0"/>
+                        <a:t>8</a:t>
+                      </a:r>
+                    </a:p>
+                  </a:txBody>
+                  <a:tcPr/>
+                </a:tc>
+                <a:tc>
+                  <a:txBody>
+                    <a:bodyPr/>
+                    <a:lstStyle/>
+                    <a:p>
+                      <a:pPr algn="ctr"/>
+                      <a:r>
+                        <a:rPr lang="en-US" dirty="0"/>
+                        <a:t>9.5</a:t>
+                      </a:r>
+                    </a:p>
+                  </a:txBody>
+                  <a:tcPr/>
+                </a:tc>
+                <a:tc>
+                  <a:txBody>
+                    <a:bodyPr/>
+                    <a:lstStyle/>
+                    <a:p>
+                      <a:r>
+                        <a:rPr lang="en-US" dirty="0"/>
+                        <a:t>Not addressed</a:t>
+                      </a:r>
+                    </a:p>
+                  </a:txBody>
+                  <a:tcPr/>
+                </a:tc>
+                <a:extLst>
+                  <a:ext uri="{0D108BD9-81ED-4DB2-BD59-A6C34878D82A}">
+                    <a16:rowId xmlns:a16="http://schemas.microsoft.com/office/drawing/2014/main" val="3140050854"/>
+                  </a:ext>
+                </a:extLst>
+              </a:tr>
+            </a:tbl>
+          </a:graphicData>
+        </a:graphic>
+      </p:graphicFrame>
     </p:spTree>
     <p:extLst>
       <p:ext uri="{BB962C8B-B14F-4D97-AF65-F5344CB8AC3E}">
-        <p14:creationId xmlns:p14="http://schemas.microsoft.com/office/powerpoint/2010/main" val="1269356600"/>
+        <p14:creationId xmlns:p14="http://schemas.microsoft.com/office/powerpoint/2010/main" val="3486657736"/>
+      </p:ext>
+    </p:extLst>
+  </p:cSld>
+  <p:clrMapOvr>
+    <a:masterClrMapping/>
+  </p:clrMapOvr>
+</p:sld>
+</file>
+
+<file path=ppt/slides/slide19.xml><?xml version="1.0" encoding="utf-8"?>
+<p:sld xmlns:a="http://schemas.openxmlformats.org/drawingml/2006/main" xmlns:r="http://schemas.openxmlformats.org/officeDocument/2006/relationships" xmlns:p="http://schemas.openxmlformats.org/presentationml/2006/main">
+  <p:cSld>
+    <p:spTree>
+      <p:nvGrpSpPr>
+        <p:cNvPr id="1" name=""/>
+        <p:cNvGrpSpPr/>
+        <p:nvPr/>
+      </p:nvGrpSpPr>
+      <p:grpSpPr>
+        <a:xfrm>
+          <a:off x="0" y="0"/>
+          <a:ext cx="0" cy="0"/>
+          <a:chOff x="0" y="0"/>
+          <a:chExt cx="0" cy="0"/>
+        </a:xfrm>
+      </p:grpSpPr>
+      <p:sp>
+        <p:nvSpPr>
+          <p:cNvPr id="2" name="Title 1">
+            <a:extLst>
+              <a:ext uri="{FF2B5EF4-FFF2-40B4-BE49-F238E27FC236}">
+                <a16:creationId xmlns:a16="http://schemas.microsoft.com/office/drawing/2014/main" id="{7FC4BA3F-8E8A-75A1-1AE3-C46B0CA3930E}"/>
+              </a:ext>
+            </a:extLst>
+          </p:cNvPr>
+          <p:cNvSpPr>
+            <a:spLocks noGrp="1"/>
+          </p:cNvSpPr>
+          <p:nvPr>
+            <p:ph type="title"/>
+          </p:nvPr>
+        </p:nvSpPr>
+        <p:spPr/>
+        <p:txBody>
+          <a:bodyPr/>
+          <a:lstStyle/>
+          <a:p>
+            <a:r>
+              <a:rPr lang="en-US" dirty="0"/>
+              <a:t>Readability Scales</a:t>
+            </a:r>
+          </a:p>
+        </p:txBody>
+      </p:sp>
+      <p:graphicFrame>
+        <p:nvGraphicFramePr>
+          <p:cNvPr id="4" name="Table 3">
+            <a:extLst>
+              <a:ext uri="{FF2B5EF4-FFF2-40B4-BE49-F238E27FC236}">
+                <a16:creationId xmlns:a16="http://schemas.microsoft.com/office/drawing/2014/main" id="{84F072E1-0892-DFE6-7C31-8FECEC2C6C8C}"/>
+              </a:ext>
+            </a:extLst>
+          </p:cNvPr>
+          <p:cNvGraphicFramePr>
+            <a:graphicFrameLocks noGrp="1"/>
+          </p:cNvGraphicFramePr>
+          <p:nvPr/>
+        </p:nvGraphicFramePr>
+        <p:xfrm>
+          <a:off x="5778141" y="1560578"/>
+          <a:ext cx="6245854" cy="4772973"/>
+        </p:xfrm>
+        <a:graphic>
+          <a:graphicData uri="http://schemas.openxmlformats.org/drawingml/2006/table">
+            <a:tbl>
+              <a:tblPr>
+                <a:tableStyleId>{35758FB7-9AC5-4552-8A53-C91805E547FA}</a:tableStyleId>
+              </a:tblPr>
+              <a:tblGrid>
+                <a:gridCol w="1425091">
+                  <a:extLst>
+                    <a:ext uri="{9D8B030D-6E8A-4147-A177-3AD203B41FA5}">
+                      <a16:colId xmlns:a16="http://schemas.microsoft.com/office/drawing/2014/main" val="3169450384"/>
+                    </a:ext>
+                  </a:extLst>
+                </a:gridCol>
+                <a:gridCol w="1803454">
+                  <a:extLst>
+                    <a:ext uri="{9D8B030D-6E8A-4147-A177-3AD203B41FA5}">
+                      <a16:colId xmlns:a16="http://schemas.microsoft.com/office/drawing/2014/main" val="2001046711"/>
+                    </a:ext>
+                  </a:extLst>
+                </a:gridCol>
+                <a:gridCol w="3017309">
+                  <a:extLst>
+                    <a:ext uri="{9D8B030D-6E8A-4147-A177-3AD203B41FA5}">
+                      <a16:colId xmlns:a16="http://schemas.microsoft.com/office/drawing/2014/main" val="2573239623"/>
+                    </a:ext>
+                  </a:extLst>
+                </a:gridCol>
+              </a:tblGrid>
+              <a:tr h="301731">
+                <a:tc>
+                  <a:txBody>
+                    <a:bodyPr/>
+                    <a:lstStyle/>
+                    <a:p>
+                      <a:r>
+                        <a:rPr lang="en-US" sz="1500" b="1" dirty="0"/>
+                        <a:t>Reading Ease Score</a:t>
+                      </a:r>
+                    </a:p>
+                  </a:txBody>
+                  <a:tcPr marL="75433" marR="75433" marT="37716" marB="37716" anchor="ctr"/>
+                </a:tc>
+                <a:tc>
+                  <a:txBody>
+                    <a:bodyPr/>
+                    <a:lstStyle/>
+                    <a:p>
+                      <a:r>
+                        <a:rPr lang="en-US" sz="1500" b="1" dirty="0"/>
+                        <a:t>School level (</a:t>
+                      </a:r>
+                      <a:r>
+                        <a:rPr lang="en-US" sz="1500" b="1" dirty="0">
+                          <a:hlinkClick r:id="rId2" tooltip="Education in the United States"/>
+                        </a:rPr>
+                        <a:t>US</a:t>
+                      </a:r>
+                      <a:r>
+                        <a:rPr lang="en-US" sz="1500" b="1" dirty="0"/>
+                        <a:t>) </a:t>
+                      </a:r>
+                    </a:p>
+                  </a:txBody>
+                  <a:tcPr marL="75433" marR="75433" marT="37716" marB="37716" anchor="ctr"/>
+                </a:tc>
+                <a:tc>
+                  <a:txBody>
+                    <a:bodyPr/>
+                    <a:lstStyle/>
+                    <a:p>
+                      <a:r>
+                        <a:rPr lang="en-US" sz="1500" b="1" dirty="0"/>
+                        <a:t>Notes </a:t>
+                      </a:r>
+                    </a:p>
+                  </a:txBody>
+                  <a:tcPr marL="75433" marR="75433" marT="37716" marB="37716" anchor="ctr"/>
+                </a:tc>
+                <a:extLst>
+                  <a:ext uri="{0D108BD9-81ED-4DB2-BD59-A6C34878D82A}">
+                    <a16:rowId xmlns:a16="http://schemas.microsoft.com/office/drawing/2014/main" val="2925940049"/>
+                  </a:ext>
+                </a:extLst>
+              </a:tr>
+              <a:tr h="754327">
+                <a:tc>
+                  <a:txBody>
+                    <a:bodyPr/>
+                    <a:lstStyle/>
+                    <a:p>
+                      <a:r>
+                        <a:rPr lang="en-US" sz="1500" dirty="0"/>
+                        <a:t>100.00–90.00 </a:t>
+                      </a:r>
+                    </a:p>
+                  </a:txBody>
+                  <a:tcPr marL="75433" marR="75433" marT="37716" marB="37716" anchor="ctr"/>
+                </a:tc>
+                <a:tc>
+                  <a:txBody>
+                    <a:bodyPr/>
+                    <a:lstStyle/>
+                    <a:p>
+                      <a:r>
+                        <a:rPr lang="en-US" sz="1500" dirty="0"/>
+                        <a:t>5th grade </a:t>
+                      </a:r>
+                    </a:p>
+                  </a:txBody>
+                  <a:tcPr marL="75433" marR="75433" marT="37716" marB="37716" anchor="ctr"/>
+                </a:tc>
+                <a:tc>
+                  <a:txBody>
+                    <a:bodyPr/>
+                    <a:lstStyle/>
+                    <a:p>
+                      <a:r>
+                        <a:rPr lang="en-US" sz="1500" dirty="0"/>
+                        <a:t>Very easy to read. Easily understood by an average 11-year-old student. </a:t>
+                      </a:r>
+                    </a:p>
+                  </a:txBody>
+                  <a:tcPr marL="75433" marR="75433" marT="37716" marB="37716" anchor="ctr"/>
+                </a:tc>
+                <a:extLst>
+                  <a:ext uri="{0D108BD9-81ED-4DB2-BD59-A6C34878D82A}">
+                    <a16:rowId xmlns:a16="http://schemas.microsoft.com/office/drawing/2014/main" val="885162690"/>
+                  </a:ext>
+                </a:extLst>
+              </a:tr>
+              <a:tr h="528029">
+                <a:tc>
+                  <a:txBody>
+                    <a:bodyPr/>
+                    <a:lstStyle/>
+                    <a:p>
+                      <a:r>
+                        <a:rPr lang="en-US" sz="1500" dirty="0"/>
+                        <a:t>90.0–80.0 </a:t>
+                      </a:r>
+                    </a:p>
+                  </a:txBody>
+                  <a:tcPr marL="75433" marR="75433" marT="37716" marB="37716" anchor="ctr"/>
+                </a:tc>
+                <a:tc>
+                  <a:txBody>
+                    <a:bodyPr/>
+                    <a:lstStyle/>
+                    <a:p>
+                      <a:r>
+                        <a:rPr lang="en-US" sz="1500" dirty="0"/>
+                        <a:t>6th grade </a:t>
+                      </a:r>
+                    </a:p>
+                  </a:txBody>
+                  <a:tcPr marL="75433" marR="75433" marT="37716" marB="37716" anchor="ctr"/>
+                </a:tc>
+                <a:tc>
+                  <a:txBody>
+                    <a:bodyPr/>
+                    <a:lstStyle/>
+                    <a:p>
+                      <a:r>
+                        <a:rPr lang="en-US" sz="1500" dirty="0"/>
+                        <a:t>Easy to read. Conversational English for consumers. </a:t>
+                      </a:r>
+                    </a:p>
+                  </a:txBody>
+                  <a:tcPr marL="75433" marR="75433" marT="37716" marB="37716" anchor="ctr"/>
+                </a:tc>
+                <a:extLst>
+                  <a:ext uri="{0D108BD9-81ED-4DB2-BD59-A6C34878D82A}">
+                    <a16:rowId xmlns:a16="http://schemas.microsoft.com/office/drawing/2014/main" val="2568418743"/>
+                  </a:ext>
+                </a:extLst>
+              </a:tr>
+              <a:tr h="301731">
+                <a:tc>
+                  <a:txBody>
+                    <a:bodyPr/>
+                    <a:lstStyle/>
+                    <a:p>
+                      <a:r>
+                        <a:rPr lang="en-US" sz="1500" dirty="0"/>
+                        <a:t>80.0–70.0 </a:t>
+                      </a:r>
+                    </a:p>
+                  </a:txBody>
+                  <a:tcPr marL="75433" marR="75433" marT="37716" marB="37716" anchor="ctr"/>
+                </a:tc>
+                <a:tc>
+                  <a:txBody>
+                    <a:bodyPr/>
+                    <a:lstStyle/>
+                    <a:p>
+                      <a:r>
+                        <a:rPr lang="en-US" sz="1500" dirty="0"/>
+                        <a:t>7th grade </a:t>
+                      </a:r>
+                    </a:p>
+                  </a:txBody>
+                  <a:tcPr marL="75433" marR="75433" marT="37716" marB="37716" anchor="ctr"/>
+                </a:tc>
+                <a:tc>
+                  <a:txBody>
+                    <a:bodyPr/>
+                    <a:lstStyle/>
+                    <a:p>
+                      <a:r>
+                        <a:rPr lang="en-US" sz="1500" dirty="0"/>
+                        <a:t>Fairly easy to read. </a:t>
+                      </a:r>
+                    </a:p>
+                  </a:txBody>
+                  <a:tcPr marL="75433" marR="75433" marT="37716" marB="37716" anchor="ctr"/>
+                </a:tc>
+                <a:extLst>
+                  <a:ext uri="{0D108BD9-81ED-4DB2-BD59-A6C34878D82A}">
+                    <a16:rowId xmlns:a16="http://schemas.microsoft.com/office/drawing/2014/main" val="4208801245"/>
+                  </a:ext>
+                </a:extLst>
+              </a:tr>
+              <a:tr h="528029">
+                <a:tc>
+                  <a:txBody>
+                    <a:bodyPr/>
+                    <a:lstStyle/>
+                    <a:p>
+                      <a:r>
+                        <a:rPr lang="en-US" sz="1500" dirty="0"/>
+                        <a:t>70.0–60.0 </a:t>
+                      </a:r>
+                    </a:p>
+                  </a:txBody>
+                  <a:tcPr marL="75433" marR="75433" marT="37716" marB="37716" anchor="ctr"/>
+                </a:tc>
+                <a:tc>
+                  <a:txBody>
+                    <a:bodyPr/>
+                    <a:lstStyle/>
+                    <a:p>
+                      <a:r>
+                        <a:rPr lang="en-US" sz="1500" dirty="0"/>
+                        <a:t>8th &amp; 9th grade </a:t>
+                      </a:r>
+                    </a:p>
+                  </a:txBody>
+                  <a:tcPr marL="75433" marR="75433" marT="37716" marB="37716" anchor="ctr"/>
+                </a:tc>
+                <a:tc>
+                  <a:txBody>
+                    <a:bodyPr/>
+                    <a:lstStyle/>
+                    <a:p>
+                      <a:r>
+                        <a:rPr lang="en-US" sz="1500" dirty="0"/>
+                        <a:t>Plain English. Easily understood by 13- to 15-year-old students. </a:t>
+                      </a:r>
+                    </a:p>
+                  </a:txBody>
+                  <a:tcPr marL="75433" marR="75433" marT="37716" marB="37716" anchor="ctr"/>
+                </a:tc>
+                <a:extLst>
+                  <a:ext uri="{0D108BD9-81ED-4DB2-BD59-A6C34878D82A}">
+                    <a16:rowId xmlns:a16="http://schemas.microsoft.com/office/drawing/2014/main" val="423005508"/>
+                  </a:ext>
+                </a:extLst>
+              </a:tr>
+              <a:tr h="301731">
+                <a:tc>
+                  <a:txBody>
+                    <a:bodyPr/>
+                    <a:lstStyle/>
+                    <a:p>
+                      <a:r>
+                        <a:rPr lang="en-US" sz="1500" dirty="0"/>
+                        <a:t>60.0–50.0 </a:t>
+                      </a:r>
+                    </a:p>
+                  </a:txBody>
+                  <a:tcPr marL="75433" marR="75433" marT="37716" marB="37716" anchor="ctr"/>
+                </a:tc>
+                <a:tc>
+                  <a:txBody>
+                    <a:bodyPr/>
+                    <a:lstStyle/>
+                    <a:p>
+                      <a:r>
+                        <a:rPr lang="en-US" sz="1500" dirty="0"/>
+                        <a:t>10th to 12th grade </a:t>
+                      </a:r>
+                    </a:p>
+                  </a:txBody>
+                  <a:tcPr marL="75433" marR="75433" marT="37716" marB="37716" anchor="ctr"/>
+                </a:tc>
+                <a:tc>
+                  <a:txBody>
+                    <a:bodyPr/>
+                    <a:lstStyle/>
+                    <a:p>
+                      <a:r>
+                        <a:rPr lang="en-US" sz="1500" dirty="0"/>
+                        <a:t>Fairly difficult to read. </a:t>
+                      </a:r>
+                    </a:p>
+                  </a:txBody>
+                  <a:tcPr marL="75433" marR="75433" marT="37716" marB="37716" anchor="ctr"/>
+                </a:tc>
+                <a:extLst>
+                  <a:ext uri="{0D108BD9-81ED-4DB2-BD59-A6C34878D82A}">
+                    <a16:rowId xmlns:a16="http://schemas.microsoft.com/office/drawing/2014/main" val="3699592417"/>
+                  </a:ext>
+                </a:extLst>
+              </a:tr>
+              <a:tr h="301731">
+                <a:tc>
+                  <a:txBody>
+                    <a:bodyPr/>
+                    <a:lstStyle/>
+                    <a:p>
+                      <a:r>
+                        <a:rPr lang="en-US" sz="1500" dirty="0"/>
+                        <a:t>50.0–30.0 </a:t>
+                      </a:r>
+                    </a:p>
+                  </a:txBody>
+                  <a:tcPr marL="75433" marR="75433" marT="37716" marB="37716" anchor="ctr"/>
+                </a:tc>
+                <a:tc>
+                  <a:txBody>
+                    <a:bodyPr/>
+                    <a:lstStyle/>
+                    <a:p>
+                      <a:r>
+                        <a:rPr lang="en-US" sz="1500" dirty="0"/>
+                        <a:t>College </a:t>
+                      </a:r>
+                    </a:p>
+                  </a:txBody>
+                  <a:tcPr marL="75433" marR="75433" marT="37716" marB="37716" anchor="ctr"/>
+                </a:tc>
+                <a:tc>
+                  <a:txBody>
+                    <a:bodyPr/>
+                    <a:lstStyle/>
+                    <a:p>
+                      <a:r>
+                        <a:rPr lang="en-US" sz="1500" dirty="0"/>
+                        <a:t>Difficult to read. </a:t>
+                      </a:r>
+                    </a:p>
+                  </a:txBody>
+                  <a:tcPr marL="75433" marR="75433" marT="37716" marB="37716" anchor="ctr"/>
+                </a:tc>
+                <a:extLst>
+                  <a:ext uri="{0D108BD9-81ED-4DB2-BD59-A6C34878D82A}">
+                    <a16:rowId xmlns:a16="http://schemas.microsoft.com/office/drawing/2014/main" val="1130416816"/>
+                  </a:ext>
+                </a:extLst>
+              </a:tr>
+              <a:tr h="754327">
+                <a:tc>
+                  <a:txBody>
+                    <a:bodyPr/>
+                    <a:lstStyle/>
+                    <a:p>
+                      <a:r>
+                        <a:rPr lang="en-US" sz="1500" dirty="0"/>
+                        <a:t>30.0–10.0 </a:t>
+                      </a:r>
+                    </a:p>
+                  </a:txBody>
+                  <a:tcPr marL="75433" marR="75433" marT="37716" marB="37716" anchor="ctr"/>
+                </a:tc>
+                <a:tc>
+                  <a:txBody>
+                    <a:bodyPr/>
+                    <a:lstStyle/>
+                    <a:p>
+                      <a:r>
+                        <a:rPr lang="en-US" sz="1500" dirty="0"/>
+                        <a:t>College graduate </a:t>
+                      </a:r>
+                    </a:p>
+                  </a:txBody>
+                  <a:tcPr marL="75433" marR="75433" marT="37716" marB="37716" anchor="ctr"/>
+                </a:tc>
+                <a:tc>
+                  <a:txBody>
+                    <a:bodyPr/>
+                    <a:lstStyle/>
+                    <a:p>
+                      <a:r>
+                        <a:rPr lang="en-US" sz="1500" dirty="0"/>
+                        <a:t>Very difficult to read. Best understood by university graduates. </a:t>
+                      </a:r>
+                    </a:p>
+                  </a:txBody>
+                  <a:tcPr marL="75433" marR="75433" marT="37716" marB="37716" anchor="ctr"/>
+                </a:tc>
+                <a:extLst>
+                  <a:ext uri="{0D108BD9-81ED-4DB2-BD59-A6C34878D82A}">
+                    <a16:rowId xmlns:a16="http://schemas.microsoft.com/office/drawing/2014/main" val="2467181569"/>
+                  </a:ext>
+                </a:extLst>
+              </a:tr>
+              <a:tr h="754327">
+                <a:tc>
+                  <a:txBody>
+                    <a:bodyPr/>
+                    <a:lstStyle/>
+                    <a:p>
+                      <a:r>
+                        <a:rPr lang="en-US" sz="1500" dirty="0"/>
+                        <a:t>10.0–0.0 </a:t>
+                      </a:r>
+                    </a:p>
+                  </a:txBody>
+                  <a:tcPr marL="75433" marR="75433" marT="37716" marB="37716" anchor="ctr"/>
+                </a:tc>
+                <a:tc>
+                  <a:txBody>
+                    <a:bodyPr/>
+                    <a:lstStyle/>
+                    <a:p>
+                      <a:r>
+                        <a:rPr lang="en-US" sz="1500" dirty="0"/>
+                        <a:t>Professional </a:t>
+                      </a:r>
+                    </a:p>
+                  </a:txBody>
+                  <a:tcPr marL="75433" marR="75433" marT="37716" marB="37716" anchor="ctr"/>
+                </a:tc>
+                <a:tc>
+                  <a:txBody>
+                    <a:bodyPr/>
+                    <a:lstStyle/>
+                    <a:p>
+                      <a:r>
+                        <a:rPr lang="en-US" sz="1500" dirty="0"/>
+                        <a:t>Extremely difficult to read. Best understood by university graduates. </a:t>
+                      </a:r>
+                    </a:p>
+                  </a:txBody>
+                  <a:tcPr marL="75433" marR="75433" marT="37716" marB="37716" anchor="ctr"/>
+                </a:tc>
+                <a:extLst>
+                  <a:ext uri="{0D108BD9-81ED-4DB2-BD59-A6C34878D82A}">
+                    <a16:rowId xmlns:a16="http://schemas.microsoft.com/office/drawing/2014/main" val="1559757902"/>
+                  </a:ext>
+                </a:extLst>
+              </a:tr>
+            </a:tbl>
+          </a:graphicData>
+        </a:graphic>
+      </p:graphicFrame>
+      <p:graphicFrame>
+        <p:nvGraphicFramePr>
+          <p:cNvPr id="5" name="Table 4">
+            <a:extLst>
+              <a:ext uri="{FF2B5EF4-FFF2-40B4-BE49-F238E27FC236}">
+                <a16:creationId xmlns:a16="http://schemas.microsoft.com/office/drawing/2014/main" id="{787D5ABB-A1C5-60F0-7516-2E4213E4B0A0}"/>
+              </a:ext>
+            </a:extLst>
+          </p:cNvPr>
+          <p:cNvGraphicFramePr>
+            <a:graphicFrameLocks noGrp="1"/>
+          </p:cNvGraphicFramePr>
+          <p:nvPr/>
+        </p:nvGraphicFramePr>
+        <p:xfrm>
+          <a:off x="1287624" y="1560578"/>
+          <a:ext cx="3676494" cy="4691570"/>
+        </p:xfrm>
+        <a:graphic>
+          <a:graphicData uri="http://schemas.openxmlformats.org/drawingml/2006/table">
+            <a:tbl>
+              <a:tblPr>
+                <a:tableStyleId>{35758FB7-9AC5-4552-8A53-C91805E547FA}</a:tableStyleId>
+              </a:tblPr>
+              <a:tblGrid>
+                <a:gridCol w="1838247">
+                  <a:extLst>
+                    <a:ext uri="{9D8B030D-6E8A-4147-A177-3AD203B41FA5}">
+                      <a16:colId xmlns:a16="http://schemas.microsoft.com/office/drawing/2014/main" val="1589223220"/>
+                    </a:ext>
+                  </a:extLst>
+                </a:gridCol>
+                <a:gridCol w="1838247">
+                  <a:extLst>
+                    <a:ext uri="{9D8B030D-6E8A-4147-A177-3AD203B41FA5}">
+                      <a16:colId xmlns:a16="http://schemas.microsoft.com/office/drawing/2014/main" val="3996938289"/>
+                    </a:ext>
+                  </a:extLst>
+                </a:gridCol>
+              </a:tblGrid>
+              <a:tr h="348151">
+                <a:tc>
+                  <a:txBody>
+                    <a:bodyPr/>
+                    <a:lstStyle/>
+                    <a:p>
+                      <a:r>
+                        <a:rPr lang="en-US" sz="1400" b="1" dirty="0"/>
+                        <a:t>Fog Index </a:t>
+                      </a:r>
+                    </a:p>
+                  </a:txBody>
+                  <a:tcPr marL="87038" marR="87038" marT="43519" marB="43519" anchor="ctr"/>
+                </a:tc>
+                <a:tc>
+                  <a:txBody>
+                    <a:bodyPr/>
+                    <a:lstStyle/>
+                    <a:p>
+                      <a:r>
+                        <a:rPr lang="en-US" sz="1400" b="1" dirty="0"/>
+                        <a:t>Reading level by grade </a:t>
+                      </a:r>
+                    </a:p>
+                  </a:txBody>
+                  <a:tcPr marL="87038" marR="87038" marT="43519" marB="43519" anchor="ctr"/>
+                </a:tc>
+                <a:extLst>
+                  <a:ext uri="{0D108BD9-81ED-4DB2-BD59-A6C34878D82A}">
+                    <a16:rowId xmlns:a16="http://schemas.microsoft.com/office/drawing/2014/main" val="3211775314"/>
+                  </a:ext>
+                </a:extLst>
+              </a:tr>
+              <a:tr h="348151">
+                <a:tc>
+                  <a:txBody>
+                    <a:bodyPr/>
+                    <a:lstStyle/>
+                    <a:p>
+                      <a:r>
+                        <a:rPr lang="en-US" sz="1400" dirty="0"/>
+                        <a:t>17 </a:t>
+                      </a:r>
+                    </a:p>
+                  </a:txBody>
+                  <a:tcPr marL="87038" marR="87038" marT="43519" marB="43519" anchor="ctr"/>
+                </a:tc>
+                <a:tc>
+                  <a:txBody>
+                    <a:bodyPr/>
+                    <a:lstStyle/>
+                    <a:p>
+                      <a:r>
+                        <a:rPr lang="en-US" sz="1400" dirty="0"/>
+                        <a:t>College graduate </a:t>
+                      </a:r>
+                    </a:p>
+                  </a:txBody>
+                  <a:tcPr marL="87038" marR="87038" marT="43519" marB="43519" anchor="ctr"/>
+                </a:tc>
+                <a:extLst>
+                  <a:ext uri="{0D108BD9-81ED-4DB2-BD59-A6C34878D82A}">
+                    <a16:rowId xmlns:a16="http://schemas.microsoft.com/office/drawing/2014/main" val="638640121"/>
+                  </a:ext>
+                </a:extLst>
+              </a:tr>
+              <a:tr h="348151">
+                <a:tc>
+                  <a:txBody>
+                    <a:bodyPr/>
+                    <a:lstStyle/>
+                    <a:p>
+                      <a:r>
+                        <a:rPr lang="en-US" sz="1400" dirty="0"/>
+                        <a:t>16 </a:t>
+                      </a:r>
+                    </a:p>
+                  </a:txBody>
+                  <a:tcPr marL="87038" marR="87038" marT="43519" marB="43519" anchor="ctr"/>
+                </a:tc>
+                <a:tc>
+                  <a:txBody>
+                    <a:bodyPr/>
+                    <a:lstStyle/>
+                    <a:p>
+                      <a:r>
+                        <a:rPr lang="en-US" sz="1400" dirty="0"/>
+                        <a:t>College senior </a:t>
+                      </a:r>
+                    </a:p>
+                  </a:txBody>
+                  <a:tcPr marL="87038" marR="87038" marT="43519" marB="43519" anchor="ctr"/>
+                </a:tc>
+                <a:extLst>
+                  <a:ext uri="{0D108BD9-81ED-4DB2-BD59-A6C34878D82A}">
+                    <a16:rowId xmlns:a16="http://schemas.microsoft.com/office/drawing/2014/main" val="1507627664"/>
+                  </a:ext>
+                </a:extLst>
+              </a:tr>
+              <a:tr h="348151">
+                <a:tc>
+                  <a:txBody>
+                    <a:bodyPr/>
+                    <a:lstStyle/>
+                    <a:p>
+                      <a:r>
+                        <a:rPr lang="en-US" sz="1400" dirty="0"/>
+                        <a:t>15 </a:t>
+                      </a:r>
+                    </a:p>
+                  </a:txBody>
+                  <a:tcPr marL="87038" marR="87038" marT="43519" marB="43519" anchor="ctr"/>
+                </a:tc>
+                <a:tc>
+                  <a:txBody>
+                    <a:bodyPr/>
+                    <a:lstStyle/>
+                    <a:p>
+                      <a:r>
+                        <a:rPr lang="en-US" sz="1400" dirty="0"/>
+                        <a:t>College junior </a:t>
+                      </a:r>
+                    </a:p>
+                  </a:txBody>
+                  <a:tcPr marL="87038" marR="87038" marT="43519" marB="43519" anchor="ctr"/>
+                </a:tc>
+                <a:extLst>
+                  <a:ext uri="{0D108BD9-81ED-4DB2-BD59-A6C34878D82A}">
+                    <a16:rowId xmlns:a16="http://schemas.microsoft.com/office/drawing/2014/main" val="3116803420"/>
+                  </a:ext>
+                </a:extLst>
+              </a:tr>
+              <a:tr h="348151">
+                <a:tc>
+                  <a:txBody>
+                    <a:bodyPr/>
+                    <a:lstStyle/>
+                    <a:p>
+                      <a:r>
+                        <a:rPr lang="en-US" sz="1400" dirty="0"/>
+                        <a:t>14 </a:t>
+                      </a:r>
+                    </a:p>
+                  </a:txBody>
+                  <a:tcPr marL="87038" marR="87038" marT="43519" marB="43519" anchor="ctr"/>
+                </a:tc>
+                <a:tc>
+                  <a:txBody>
+                    <a:bodyPr/>
+                    <a:lstStyle/>
+                    <a:p>
+                      <a:r>
+                        <a:rPr lang="en-US" sz="1400" dirty="0"/>
+                        <a:t>College sophomore </a:t>
+                      </a:r>
+                    </a:p>
+                  </a:txBody>
+                  <a:tcPr marL="87038" marR="87038" marT="43519" marB="43519" anchor="ctr"/>
+                </a:tc>
+                <a:extLst>
+                  <a:ext uri="{0D108BD9-81ED-4DB2-BD59-A6C34878D82A}">
+                    <a16:rowId xmlns:a16="http://schemas.microsoft.com/office/drawing/2014/main" val="1639898189"/>
+                  </a:ext>
+                </a:extLst>
+              </a:tr>
+              <a:tr h="348151">
+                <a:tc>
+                  <a:txBody>
+                    <a:bodyPr/>
+                    <a:lstStyle/>
+                    <a:p>
+                      <a:r>
+                        <a:rPr lang="en-US" sz="1400" dirty="0"/>
+                        <a:t>13 </a:t>
+                      </a:r>
+                    </a:p>
+                  </a:txBody>
+                  <a:tcPr marL="87038" marR="87038" marT="43519" marB="43519" anchor="ctr"/>
+                </a:tc>
+                <a:tc>
+                  <a:txBody>
+                    <a:bodyPr/>
+                    <a:lstStyle/>
+                    <a:p>
+                      <a:r>
+                        <a:rPr lang="en-US" sz="1400" dirty="0"/>
+                        <a:t>College freshman </a:t>
+                      </a:r>
+                    </a:p>
+                  </a:txBody>
+                  <a:tcPr marL="87038" marR="87038" marT="43519" marB="43519" anchor="ctr"/>
+                </a:tc>
+                <a:extLst>
+                  <a:ext uri="{0D108BD9-81ED-4DB2-BD59-A6C34878D82A}">
+                    <a16:rowId xmlns:a16="http://schemas.microsoft.com/office/drawing/2014/main" val="2224060300"/>
+                  </a:ext>
+                </a:extLst>
+              </a:tr>
+              <a:tr h="348151">
+                <a:tc>
+                  <a:txBody>
+                    <a:bodyPr/>
+                    <a:lstStyle/>
+                    <a:p>
+                      <a:r>
+                        <a:rPr lang="en-US" sz="1400" dirty="0"/>
+                        <a:t>12 </a:t>
+                      </a:r>
+                    </a:p>
+                  </a:txBody>
+                  <a:tcPr marL="87038" marR="87038" marT="43519" marB="43519" anchor="ctr"/>
+                </a:tc>
+                <a:tc>
+                  <a:txBody>
+                    <a:bodyPr/>
+                    <a:lstStyle/>
+                    <a:p>
+                      <a:r>
+                        <a:rPr lang="en-US" sz="1400" dirty="0"/>
+                        <a:t>High school senior </a:t>
+                      </a:r>
+                    </a:p>
+                  </a:txBody>
+                  <a:tcPr marL="87038" marR="87038" marT="43519" marB="43519" anchor="ctr"/>
+                </a:tc>
+                <a:extLst>
+                  <a:ext uri="{0D108BD9-81ED-4DB2-BD59-A6C34878D82A}">
+                    <a16:rowId xmlns:a16="http://schemas.microsoft.com/office/drawing/2014/main" val="2115046621"/>
+                  </a:ext>
+                </a:extLst>
+              </a:tr>
+              <a:tr h="348151">
+                <a:tc>
+                  <a:txBody>
+                    <a:bodyPr/>
+                    <a:lstStyle/>
+                    <a:p>
+                      <a:r>
+                        <a:rPr lang="en-US" sz="1400" dirty="0"/>
+                        <a:t>11 </a:t>
+                      </a:r>
+                    </a:p>
+                  </a:txBody>
+                  <a:tcPr marL="87038" marR="87038" marT="43519" marB="43519" anchor="ctr"/>
+                </a:tc>
+                <a:tc>
+                  <a:txBody>
+                    <a:bodyPr/>
+                    <a:lstStyle/>
+                    <a:p>
+                      <a:r>
+                        <a:rPr lang="en-US" sz="1400" dirty="0"/>
+                        <a:t>High school junior </a:t>
+                      </a:r>
+                    </a:p>
+                  </a:txBody>
+                  <a:tcPr marL="87038" marR="87038" marT="43519" marB="43519" anchor="ctr"/>
+                </a:tc>
+                <a:extLst>
+                  <a:ext uri="{0D108BD9-81ED-4DB2-BD59-A6C34878D82A}">
+                    <a16:rowId xmlns:a16="http://schemas.microsoft.com/office/drawing/2014/main" val="1468757217"/>
+                  </a:ext>
+                </a:extLst>
+              </a:tr>
+              <a:tr h="348151">
+                <a:tc>
+                  <a:txBody>
+                    <a:bodyPr/>
+                    <a:lstStyle/>
+                    <a:p>
+                      <a:r>
+                        <a:rPr lang="en-US" sz="1400" dirty="0"/>
+                        <a:t>10 </a:t>
+                      </a:r>
+                    </a:p>
+                  </a:txBody>
+                  <a:tcPr marL="87038" marR="87038" marT="43519" marB="43519" anchor="ctr"/>
+                </a:tc>
+                <a:tc>
+                  <a:txBody>
+                    <a:bodyPr/>
+                    <a:lstStyle/>
+                    <a:p>
+                      <a:r>
+                        <a:rPr lang="en-US" sz="1400" dirty="0"/>
+                        <a:t>High school sophomore </a:t>
+                      </a:r>
+                    </a:p>
+                  </a:txBody>
+                  <a:tcPr marL="87038" marR="87038" marT="43519" marB="43519" anchor="ctr"/>
+                </a:tc>
+                <a:extLst>
+                  <a:ext uri="{0D108BD9-81ED-4DB2-BD59-A6C34878D82A}">
+                    <a16:rowId xmlns:a16="http://schemas.microsoft.com/office/drawing/2014/main" val="1298296553"/>
+                  </a:ext>
+                </a:extLst>
+              </a:tr>
+              <a:tr h="348151">
+                <a:tc>
+                  <a:txBody>
+                    <a:bodyPr/>
+                    <a:lstStyle/>
+                    <a:p>
+                      <a:r>
+                        <a:rPr lang="en-US" sz="1400" dirty="0"/>
+                        <a:t>9 </a:t>
+                      </a:r>
+                    </a:p>
+                  </a:txBody>
+                  <a:tcPr marL="87038" marR="87038" marT="43519" marB="43519" anchor="ctr"/>
+                </a:tc>
+                <a:tc>
+                  <a:txBody>
+                    <a:bodyPr/>
+                    <a:lstStyle/>
+                    <a:p>
+                      <a:r>
+                        <a:rPr lang="en-US" sz="1400" dirty="0"/>
+                        <a:t>High school freshman </a:t>
+                      </a:r>
+                    </a:p>
+                  </a:txBody>
+                  <a:tcPr marL="87038" marR="87038" marT="43519" marB="43519" anchor="ctr"/>
+                </a:tc>
+                <a:extLst>
+                  <a:ext uri="{0D108BD9-81ED-4DB2-BD59-A6C34878D82A}">
+                    <a16:rowId xmlns:a16="http://schemas.microsoft.com/office/drawing/2014/main" val="3082200959"/>
+                  </a:ext>
+                </a:extLst>
+              </a:tr>
+              <a:tr h="348151">
+                <a:tc>
+                  <a:txBody>
+                    <a:bodyPr/>
+                    <a:lstStyle/>
+                    <a:p>
+                      <a:r>
+                        <a:rPr lang="en-US" sz="1400" dirty="0"/>
+                        <a:t>8 </a:t>
+                      </a:r>
+                    </a:p>
+                  </a:txBody>
+                  <a:tcPr marL="87038" marR="87038" marT="43519" marB="43519" anchor="ctr"/>
+                </a:tc>
+                <a:tc>
+                  <a:txBody>
+                    <a:bodyPr/>
+                    <a:lstStyle/>
+                    <a:p>
+                      <a:r>
+                        <a:rPr lang="en-US" sz="1400" dirty="0"/>
+                        <a:t>Eighth grade </a:t>
+                      </a:r>
+                    </a:p>
+                  </a:txBody>
+                  <a:tcPr marL="87038" marR="87038" marT="43519" marB="43519" anchor="ctr"/>
+                </a:tc>
+                <a:extLst>
+                  <a:ext uri="{0D108BD9-81ED-4DB2-BD59-A6C34878D82A}">
+                    <a16:rowId xmlns:a16="http://schemas.microsoft.com/office/drawing/2014/main" val="3402349979"/>
+                  </a:ext>
+                </a:extLst>
+              </a:tr>
+              <a:tr h="348151">
+                <a:tc>
+                  <a:txBody>
+                    <a:bodyPr/>
+                    <a:lstStyle/>
+                    <a:p>
+                      <a:r>
+                        <a:rPr lang="en-US" sz="1400" dirty="0"/>
+                        <a:t>7 </a:t>
+                      </a:r>
+                    </a:p>
+                  </a:txBody>
+                  <a:tcPr marL="87038" marR="87038" marT="43519" marB="43519" anchor="ctr"/>
+                </a:tc>
+                <a:tc>
+                  <a:txBody>
+                    <a:bodyPr/>
+                    <a:lstStyle/>
+                    <a:p>
+                      <a:r>
+                        <a:rPr lang="en-US" sz="1400" dirty="0"/>
+                        <a:t>Seventh grade </a:t>
+                      </a:r>
+                    </a:p>
+                  </a:txBody>
+                  <a:tcPr marL="87038" marR="87038" marT="43519" marB="43519" anchor="ctr"/>
+                </a:tc>
+                <a:extLst>
+                  <a:ext uri="{0D108BD9-81ED-4DB2-BD59-A6C34878D82A}">
+                    <a16:rowId xmlns:a16="http://schemas.microsoft.com/office/drawing/2014/main" val="2719569234"/>
+                  </a:ext>
+                </a:extLst>
+              </a:tr>
+              <a:tr h="348151">
+                <a:tc>
+                  <a:txBody>
+                    <a:bodyPr/>
+                    <a:lstStyle/>
+                    <a:p>
+                      <a:r>
+                        <a:rPr lang="en-US" sz="1400" dirty="0"/>
+                        <a:t>6 </a:t>
+                      </a:r>
+                    </a:p>
+                  </a:txBody>
+                  <a:tcPr marL="87038" marR="87038" marT="43519" marB="43519" anchor="ctr"/>
+                </a:tc>
+                <a:tc>
+                  <a:txBody>
+                    <a:bodyPr/>
+                    <a:lstStyle/>
+                    <a:p>
+                      <a:r>
+                        <a:rPr lang="en-US" sz="1400" dirty="0"/>
+                        <a:t>Sixth grade </a:t>
+                      </a:r>
+                    </a:p>
+                  </a:txBody>
+                  <a:tcPr marL="87038" marR="87038" marT="43519" marB="43519" anchor="ctr"/>
+                </a:tc>
+                <a:extLst>
+                  <a:ext uri="{0D108BD9-81ED-4DB2-BD59-A6C34878D82A}">
+                    <a16:rowId xmlns:a16="http://schemas.microsoft.com/office/drawing/2014/main" val="1717405559"/>
+                  </a:ext>
+                </a:extLst>
+              </a:tr>
+            </a:tbl>
+          </a:graphicData>
+        </a:graphic>
+      </p:graphicFrame>
+    </p:spTree>
+    <p:extLst>
+      <p:ext uri="{BB962C8B-B14F-4D97-AF65-F5344CB8AC3E}">
+        <p14:creationId xmlns:p14="http://schemas.microsoft.com/office/powerpoint/2010/main" val="3267530534"/>
       </p:ext>
     </p:extLst>
   </p:cSld>
@@ -7227,13 +9042,13 @@
         </p:nvSpPr>
         <p:spPr>
           <a:xfrm>
-            <a:off x="1856509" y="1827128"/>
-            <a:ext cx="9302185" cy="2175705"/>
+            <a:off x="838201" y="1827128"/>
+            <a:ext cx="10377360" cy="2175705"/>
           </a:xfrm>
         </p:spPr>
         <p:txBody>
           <a:bodyPr>
-            <a:normAutofit fontScale="92500" lnSpcReduction="20000"/>
+            <a:normAutofit fontScale="70000" lnSpcReduction="20000"/>
           </a:bodyPr>
           <a:lstStyle/>
           <a:p>
@@ -7253,12 +9068,15 @@
             </a:r>
             <a:r>
               <a:rPr lang="en-US" sz="3900"/>
-              <a:t>of some </a:t>
-            </a:r>
-            <a:r>
-              <a:rPr lang="en-US" sz="3900" dirty="0"/>
-              <a:t>benchmarks</a:t>
-            </a:r>
+              <a:t>of some benchmarks</a:t>
+            </a:r>
+          </a:p>
+          <a:p>
+            <a:r>
+              <a:rPr lang="en-US" sz="3900"/>
+              <a:t>More detailed examination of one specific benchmark</a:t>
+            </a:r>
+            <a:endParaRPr lang="en-US" sz="3900" dirty="0"/>
           </a:p>
           <a:p>
             <a:r>
@@ -7537,6 +9355,67 @@
                       </p:childTnLst>
                     </p:cTn>
                   </p:par>
+                  <p:par>
+                    <p:cTn id="23" fill="hold">
+                      <p:stCondLst>
+                        <p:cond delay="indefinite"/>
+                      </p:stCondLst>
+                      <p:childTnLst>
+                        <p:par>
+                          <p:cTn id="24" fill="hold">
+                            <p:stCondLst>
+                              <p:cond delay="0"/>
+                            </p:stCondLst>
+                            <p:childTnLst>
+                              <p:par>
+                                <p:cTn id="25" presetID="10" presetClass="entr" presetSubtype="0" fill="hold" grpId="0" nodeType="clickEffect">
+                                  <p:stCondLst>
+                                    <p:cond delay="0"/>
+                                  </p:stCondLst>
+                                  <p:childTnLst>
+                                    <p:set>
+                                      <p:cBhvr>
+                                        <p:cTn id="26" dur="1" fill="hold">
+                                          <p:stCondLst>
+                                            <p:cond delay="0"/>
+                                          </p:stCondLst>
+                                        </p:cTn>
+                                        <p:tgtEl>
+                                          <p:spTgt spid="3">
+                                            <p:txEl>
+                                              <p:pRg st="4" end="4"/>
+                                            </p:txEl>
+                                          </p:spTgt>
+                                        </p:tgtEl>
+                                        <p:attrNameLst>
+                                          <p:attrName>style.visibility</p:attrName>
+                                        </p:attrNameLst>
+                                      </p:cBhvr>
+                                      <p:to>
+                                        <p:strVal val="visible"/>
+                                      </p:to>
+                                    </p:set>
+                                    <p:animEffect transition="in" filter="fade">
+                                      <p:cBhvr>
+                                        <p:cTn id="27" dur="500"/>
+                                        <p:tgtEl>
+                                          <p:spTgt spid="3">
+                                            <p:txEl>
+                                              <p:pRg st="4" end="4"/>
+                                            </p:txEl>
+                                          </p:spTgt>
+                                        </p:tgtEl>
+                                      </p:cBhvr>
+                                    </p:animEffect>
+                                  </p:childTnLst>
+                                </p:cTn>
+                              </p:par>
+                            </p:childTnLst>
+                          </p:cTn>
+                        </p:par>
+                      </p:childTnLst>
+                    </p:cTn>
+                  </p:par>
                 </p:childTnLst>
               </p:cTn>
               <p:prevCondLst>
@@ -7562,6 +9441,1722 @@
       <p:bldP spid="3" grpId="0" build="p"/>
     </p:bldLst>
   </p:timing>
+</p:sld>
+</file>
+
+<file path=ppt/slides/slide20.xml><?xml version="1.0" encoding="utf-8"?>
+<p:sld xmlns:a="http://schemas.openxmlformats.org/drawingml/2006/main" xmlns:r="http://schemas.openxmlformats.org/officeDocument/2006/relationships" xmlns:p="http://schemas.openxmlformats.org/presentationml/2006/main">
+  <p:cSld>
+    <p:spTree>
+      <p:nvGrpSpPr>
+        <p:cNvPr id="1" name=""/>
+        <p:cNvGrpSpPr/>
+        <p:nvPr/>
+      </p:nvGrpSpPr>
+      <p:grpSpPr>
+        <a:xfrm>
+          <a:off x="0" y="0"/>
+          <a:ext cx="0" cy="0"/>
+          <a:chOff x="0" y="0"/>
+          <a:chExt cx="0" cy="0"/>
+        </a:xfrm>
+      </p:grpSpPr>
+      <p:sp>
+        <p:nvSpPr>
+          <p:cNvPr id="2" name="Title 1">
+            <a:extLst>
+              <a:ext uri="{FF2B5EF4-FFF2-40B4-BE49-F238E27FC236}">
+                <a16:creationId xmlns:a16="http://schemas.microsoft.com/office/drawing/2014/main" id="{7E874946-7719-1DD4-36D2-C920E29DF743}"/>
+              </a:ext>
+            </a:extLst>
+          </p:cNvPr>
+          <p:cNvSpPr>
+            <a:spLocks noGrp="1"/>
+          </p:cNvSpPr>
+          <p:nvPr>
+            <p:ph type="title"/>
+          </p:nvPr>
+        </p:nvSpPr>
+        <p:spPr/>
+        <p:txBody>
+          <a:bodyPr/>
+          <a:lstStyle/>
+          <a:p>
+            <a:r>
+              <a:rPr lang="en-US"/>
+              <a:t>Future Work</a:t>
+            </a:r>
+          </a:p>
+        </p:txBody>
+      </p:sp>
+      <p:sp>
+        <p:nvSpPr>
+          <p:cNvPr id="3" name="Content Placeholder 2">
+            <a:extLst>
+              <a:ext uri="{FF2B5EF4-FFF2-40B4-BE49-F238E27FC236}">
+                <a16:creationId xmlns:a16="http://schemas.microsoft.com/office/drawing/2014/main" id="{BCC2C7A4-E93D-9443-A93E-F0165815152E}"/>
+              </a:ext>
+            </a:extLst>
+          </p:cNvPr>
+          <p:cNvSpPr>
+            <a:spLocks noGrp="1"/>
+          </p:cNvSpPr>
+          <p:nvPr>
+            <p:ph idx="1"/>
+          </p:nvPr>
+        </p:nvSpPr>
+        <p:spPr>
+          <a:xfrm>
+            <a:off x="838200" y="1825625"/>
+            <a:ext cx="11176000" cy="4351338"/>
+          </a:xfrm>
+        </p:spPr>
+        <p:txBody>
+          <a:bodyPr>
+            <a:normAutofit fontScale="92500" lnSpcReduction="10000"/>
+          </a:bodyPr>
+          <a:lstStyle/>
+          <a:p>
+            <a:r>
+              <a:rPr lang="en-US"/>
+              <a:t>Filter out common words prior to analysis</a:t>
+            </a:r>
+          </a:p>
+          <a:p>
+            <a:pPr lvl="1"/>
+            <a:r>
+              <a:rPr lang="en-US"/>
+              <a:t>See function </a:t>
+            </a:r>
+            <a:r>
+              <a:rPr lang="en-US">
+                <a:latin typeface="Courier New" panose="02070309020205020404" pitchFamily="49" charset="0"/>
+                <a:cs typeface="Courier New" panose="02070309020205020404" pitchFamily="49" charset="0"/>
+              </a:rPr>
+              <a:t>build_text_from_questions</a:t>
+            </a:r>
+          </a:p>
+          <a:p>
+            <a:pPr lvl="1"/>
+            <a:endParaRPr lang="en-US">
+              <a:latin typeface="Courier New" panose="02070309020205020404" pitchFamily="49" charset="0"/>
+              <a:cs typeface="Courier New" panose="02070309020205020404" pitchFamily="49" charset="0"/>
+            </a:endParaRPr>
+          </a:p>
+          <a:p>
+            <a:r>
+              <a:rPr lang="en-US"/>
+              <a:t>Implement Sentiment Analysis</a:t>
+            </a:r>
+          </a:p>
+          <a:p>
+            <a:endParaRPr lang="en-US"/>
+          </a:p>
+          <a:p>
+            <a:r>
+              <a:rPr lang="en-US"/>
+              <a:t>Read up on Word Clouds (what value do they provide?)</a:t>
+            </a:r>
+          </a:p>
+          <a:p>
+            <a:endParaRPr lang="en-US"/>
+          </a:p>
+          <a:p>
+            <a:r>
+              <a:rPr lang="en-US"/>
+              <a:t>Investigate the impact on leaderboards from subtle changes to the questions.</a:t>
+            </a:r>
+          </a:p>
+          <a:p>
+            <a:endParaRPr lang="en-US"/>
+          </a:p>
+          <a:p>
+            <a:r>
+              <a:rPr lang="en-US"/>
+              <a:t>Investigate grammar issues in questions </a:t>
+            </a:r>
+          </a:p>
+          <a:p>
+            <a:endParaRPr lang="en-US"/>
+          </a:p>
+          <a:p>
+            <a:endParaRPr lang="en-US">
+              <a:latin typeface="Courier New" panose="02070309020205020404" pitchFamily="49" charset="0"/>
+              <a:cs typeface="Courier New" panose="02070309020205020404" pitchFamily="49" charset="0"/>
+            </a:endParaRPr>
+          </a:p>
+          <a:p>
+            <a:endParaRPr lang="en-US">
+              <a:latin typeface="Courier New" panose="02070309020205020404" pitchFamily="49" charset="0"/>
+              <a:cs typeface="Courier New" panose="02070309020205020404" pitchFamily="49" charset="0"/>
+            </a:endParaRPr>
+          </a:p>
+        </p:txBody>
+      </p:sp>
+    </p:spTree>
+    <p:extLst>
+      <p:ext uri="{BB962C8B-B14F-4D97-AF65-F5344CB8AC3E}">
+        <p14:creationId xmlns:p14="http://schemas.microsoft.com/office/powerpoint/2010/main" val="3186923783"/>
+      </p:ext>
+    </p:extLst>
+  </p:cSld>
+  <p:clrMapOvr>
+    <a:masterClrMapping/>
+  </p:clrMapOvr>
+</p:sld>
+</file>
+
+<file path=ppt/slides/slide21.xml><?xml version="1.0" encoding="utf-8"?>
+<p:sld xmlns:a="http://schemas.openxmlformats.org/drawingml/2006/main" xmlns:r="http://schemas.openxmlformats.org/officeDocument/2006/relationships" xmlns:p="http://schemas.openxmlformats.org/presentationml/2006/main">
+  <p:cSld>
+    <p:spTree>
+      <p:nvGrpSpPr>
+        <p:cNvPr id="1" name=""/>
+        <p:cNvGrpSpPr/>
+        <p:nvPr/>
+      </p:nvGrpSpPr>
+      <p:grpSpPr>
+        <a:xfrm>
+          <a:off x="0" y="0"/>
+          <a:ext cx="0" cy="0"/>
+          <a:chOff x="0" y="0"/>
+          <a:chExt cx="0" cy="0"/>
+        </a:xfrm>
+      </p:grpSpPr>
+      <p:pic>
+        <p:nvPicPr>
+          <p:cNvPr id="5" name="Picture 4" descr="&quot;Questions&quot; prompt">
+            <a:extLst>
+              <a:ext uri="{FF2B5EF4-FFF2-40B4-BE49-F238E27FC236}">
+                <a16:creationId xmlns:a16="http://schemas.microsoft.com/office/drawing/2014/main" id="{28CA2802-6022-99A1-9DE0-D83F0CD0EF54}"/>
+              </a:ext>
+            </a:extLst>
+          </p:cNvPr>
+          <p:cNvPicPr>
+            <a:picLocks noChangeAspect="1"/>
+          </p:cNvPicPr>
+          <p:nvPr/>
+        </p:nvPicPr>
+        <p:blipFill>
+          <a:blip r:embed="rId2">
+            <a:extLst>
+              <a:ext uri="{28A0092B-C50C-407E-A947-70E740481C1C}">
+                <a14:useLocalDpi xmlns:a14="http://schemas.microsoft.com/office/drawing/2010/main" val="0"/>
+              </a:ext>
+            </a:extLst>
+          </a:blip>
+          <a:stretch>
+            <a:fillRect/>
+          </a:stretch>
+        </p:blipFill>
+        <p:spPr>
+          <a:xfrm>
+            <a:off x="3657600" y="990600"/>
+            <a:ext cx="4876800" cy="4876800"/>
+          </a:xfrm>
+          <a:prstGeom prst="rect">
+            <a:avLst/>
+          </a:prstGeom>
+          <a:effectLst>
+            <a:outerShdw blurRad="50800" dist="38100" dir="8100000" algn="tr" rotWithShape="0">
+              <a:prstClr val="black">
+                <a:alpha val="40000"/>
+              </a:prstClr>
+            </a:outerShdw>
+          </a:effectLst>
+        </p:spPr>
+      </p:pic>
+      <p:sp>
+        <p:nvSpPr>
+          <p:cNvPr id="8" name="TextBox 7">
+            <a:extLst>
+              <a:ext uri="{FF2B5EF4-FFF2-40B4-BE49-F238E27FC236}">
+                <a16:creationId xmlns:a16="http://schemas.microsoft.com/office/drawing/2014/main" id="{8BF95A34-8A6D-ACA0-BFF4-D30F29D19A24}"/>
+              </a:ext>
+            </a:extLst>
+          </p:cNvPr>
+          <p:cNvSpPr txBox="1"/>
+          <p:nvPr/>
+        </p:nvSpPr>
+        <p:spPr>
+          <a:xfrm>
+            <a:off x="1043942" y="6058642"/>
+            <a:ext cx="10908571" cy="369332"/>
+          </a:xfrm>
+          <a:prstGeom prst="rect">
+            <a:avLst/>
+          </a:prstGeom>
+          <a:noFill/>
+        </p:spPr>
+        <p:txBody>
+          <a:bodyPr wrap="square" rtlCol="0">
+            <a:spAutoFit/>
+          </a:bodyPr>
+          <a:lstStyle/>
+          <a:p>
+            <a:r>
+              <a:rPr lang="en-US" dirty="0"/>
+              <a:t>Gemini.google.com “</a:t>
+            </a:r>
+            <a:r>
+              <a:rPr lang="en-US" b="1" dirty="0"/>
+              <a:t>Generate an image for the "questions" slide at the end of a powerpoint presentation</a:t>
+            </a:r>
+            <a:r>
+              <a:rPr lang="en-US" dirty="0"/>
+              <a:t>”</a:t>
+            </a:r>
+          </a:p>
+        </p:txBody>
+      </p:sp>
+    </p:spTree>
+    <p:extLst>
+      <p:ext uri="{BB962C8B-B14F-4D97-AF65-F5344CB8AC3E}">
+        <p14:creationId xmlns:p14="http://schemas.microsoft.com/office/powerpoint/2010/main" val="3453522789"/>
+      </p:ext>
+    </p:extLst>
+  </p:cSld>
+  <p:clrMapOvr>
+    <a:masterClrMapping/>
+  </p:clrMapOvr>
+</p:sld>
+</file>
+
+<file path=ppt/slides/slide22.xml><?xml version="1.0" encoding="utf-8"?>
+<p:sld xmlns:a="http://schemas.openxmlformats.org/drawingml/2006/main" xmlns:r="http://schemas.openxmlformats.org/officeDocument/2006/relationships" xmlns:p="http://schemas.openxmlformats.org/presentationml/2006/main">
+  <p:cSld>
+    <p:spTree>
+      <p:nvGrpSpPr>
+        <p:cNvPr id="1" name=""/>
+        <p:cNvGrpSpPr/>
+        <p:nvPr/>
+      </p:nvGrpSpPr>
+      <p:grpSpPr>
+        <a:xfrm>
+          <a:off x="0" y="0"/>
+          <a:ext cx="0" cy="0"/>
+          <a:chOff x="0" y="0"/>
+          <a:chExt cx="0" cy="0"/>
+        </a:xfrm>
+      </p:grpSpPr>
+      <p:sp>
+        <p:nvSpPr>
+          <p:cNvPr id="4" name="Title 3">
+            <a:extLst>
+              <a:ext uri="{FF2B5EF4-FFF2-40B4-BE49-F238E27FC236}">
+                <a16:creationId xmlns:a16="http://schemas.microsoft.com/office/drawing/2014/main" id="{7B32F22B-B99E-E5EB-4AB3-45FA40E423F9}"/>
+              </a:ext>
+            </a:extLst>
+          </p:cNvPr>
+          <p:cNvSpPr>
+            <a:spLocks noGrp="1"/>
+          </p:cNvSpPr>
+          <p:nvPr>
+            <p:ph type="title"/>
+          </p:nvPr>
+        </p:nvSpPr>
+        <p:spPr>
+          <a:xfrm>
+            <a:off x="190501" y="132315"/>
+            <a:ext cx="6443212" cy="741692"/>
+          </a:xfrm>
+          <a:solidFill>
+            <a:schemeClr val="bg1"/>
+          </a:solidFill>
+          <a:effectLst>
+            <a:outerShdw blurRad="50800" dist="38100" dir="8100000" algn="tr" rotWithShape="0">
+              <a:prstClr val="black">
+                <a:alpha val="40000"/>
+              </a:prstClr>
+            </a:outerShdw>
+          </a:effectLst>
+        </p:spPr>
+        <p:txBody>
+          <a:bodyPr/>
+          <a:lstStyle/>
+          <a:p>
+            <a:r>
+              <a:rPr lang="en-US" dirty="0"/>
+              <a:t>Big-Bench Hard Benchmark</a:t>
+            </a:r>
+          </a:p>
+        </p:txBody>
+      </p:sp>
+      <p:sp>
+        <p:nvSpPr>
+          <p:cNvPr id="5" name="Content Placeholder 4">
+            <a:extLst>
+              <a:ext uri="{FF2B5EF4-FFF2-40B4-BE49-F238E27FC236}">
+                <a16:creationId xmlns:a16="http://schemas.microsoft.com/office/drawing/2014/main" id="{C0329D24-9711-C54F-6123-3CFB19A68259}"/>
+              </a:ext>
+            </a:extLst>
+          </p:cNvPr>
+          <p:cNvSpPr>
+            <a:spLocks noGrp="1"/>
+          </p:cNvSpPr>
+          <p:nvPr>
+            <p:ph idx="1"/>
+          </p:nvPr>
+        </p:nvSpPr>
+        <p:spPr>
+          <a:xfrm>
+            <a:off x="609600" y="1828802"/>
+            <a:ext cx="10972800" cy="508881"/>
+          </a:xfrm>
+        </p:spPr>
+        <p:txBody>
+          <a:bodyPr/>
+          <a:lstStyle/>
+          <a:p>
+            <a:pPr marL="0" indent="0" algn="ctr">
+              <a:buNone/>
+            </a:pPr>
+            <a:r>
+              <a:rPr lang="en-US" dirty="0"/>
+              <a:t>“Questions wherein humans outperformed LLMs  ”</a:t>
+            </a:r>
+          </a:p>
+        </p:txBody>
+      </p:sp>
+      <p:sp>
+        <p:nvSpPr>
+          <p:cNvPr id="2" name="TextBox 1">
+            <a:extLst>
+              <a:ext uri="{FF2B5EF4-FFF2-40B4-BE49-F238E27FC236}">
+                <a16:creationId xmlns:a16="http://schemas.microsoft.com/office/drawing/2014/main" id="{5E0C1892-362C-BD71-52FE-8172DB655640}"/>
+              </a:ext>
+            </a:extLst>
+          </p:cNvPr>
+          <p:cNvSpPr txBox="1"/>
+          <p:nvPr/>
+        </p:nvSpPr>
+        <p:spPr>
+          <a:xfrm>
+            <a:off x="11625942" y="6082396"/>
+            <a:ext cx="441146" cy="369332"/>
+          </a:xfrm>
+          <a:prstGeom prst="rect">
+            <a:avLst/>
+          </a:prstGeom>
+          <a:noFill/>
+        </p:spPr>
+        <p:txBody>
+          <a:bodyPr wrap="none" rtlCol="0">
+            <a:spAutoFit/>
+          </a:bodyPr>
+          <a:lstStyle/>
+          <a:p>
+            <a:r>
+              <a:rPr lang="en-US" dirty="0"/>
+              <a:t>[1]</a:t>
+            </a:r>
+          </a:p>
+        </p:txBody>
+      </p:sp>
+      <p:sp>
+        <p:nvSpPr>
+          <p:cNvPr id="7" name="TextBox 6">
+            <a:extLst>
+              <a:ext uri="{FF2B5EF4-FFF2-40B4-BE49-F238E27FC236}">
+                <a16:creationId xmlns:a16="http://schemas.microsoft.com/office/drawing/2014/main" id="{A20F660F-7DB6-5697-27F6-367166EE85F4}"/>
+              </a:ext>
+            </a:extLst>
+          </p:cNvPr>
+          <p:cNvSpPr txBox="1"/>
+          <p:nvPr/>
+        </p:nvSpPr>
+        <p:spPr>
+          <a:xfrm>
+            <a:off x="1721962" y="3059668"/>
+            <a:ext cx="9631837" cy="369332"/>
+          </a:xfrm>
+          <a:prstGeom prst="rect">
+            <a:avLst/>
+          </a:prstGeom>
+          <a:noFill/>
+        </p:spPr>
+        <p:txBody>
+          <a:bodyPr wrap="square">
+            <a:spAutoFit/>
+          </a:bodyPr>
+          <a:lstStyle/>
+          <a:p>
+            <a:r>
+              <a:rPr lang="en-US" dirty="0"/>
+              <a:t>6761 questions spanning 23 categories</a:t>
+            </a:r>
+          </a:p>
+        </p:txBody>
+      </p:sp>
+      <p:sp>
+        <p:nvSpPr>
+          <p:cNvPr id="3" name="TextBox 2">
+            <a:extLst>
+              <a:ext uri="{FF2B5EF4-FFF2-40B4-BE49-F238E27FC236}">
+                <a16:creationId xmlns:a16="http://schemas.microsoft.com/office/drawing/2014/main" id="{62B60440-AC94-6914-A8E5-1543E3442213}"/>
+              </a:ext>
+            </a:extLst>
+          </p:cNvPr>
+          <p:cNvSpPr txBox="1"/>
+          <p:nvPr/>
+        </p:nvSpPr>
+        <p:spPr>
+          <a:xfrm>
+            <a:off x="6633712" y="5852994"/>
+            <a:ext cx="4060792" cy="369332"/>
+          </a:xfrm>
+          <a:prstGeom prst="rect">
+            <a:avLst/>
+          </a:prstGeom>
+          <a:noFill/>
+        </p:spPr>
+        <p:txBody>
+          <a:bodyPr wrap="square" rtlCol="0">
+            <a:spAutoFit/>
+          </a:bodyPr>
+          <a:lstStyle/>
+          <a:p>
+            <a:r>
+              <a:rPr lang="en-US" dirty="0"/>
+              <a:t>Google Research, Stanford University</a:t>
+            </a:r>
+          </a:p>
+        </p:txBody>
+      </p:sp>
+      <p:sp>
+        <p:nvSpPr>
+          <p:cNvPr id="8" name="TextBox 7">
+            <a:extLst>
+              <a:ext uri="{FF2B5EF4-FFF2-40B4-BE49-F238E27FC236}">
+                <a16:creationId xmlns:a16="http://schemas.microsoft.com/office/drawing/2014/main" id="{CD3BDD26-A76D-6575-73C0-E363E826E709}"/>
+              </a:ext>
+            </a:extLst>
+          </p:cNvPr>
+          <p:cNvSpPr txBox="1"/>
+          <p:nvPr/>
+        </p:nvSpPr>
+        <p:spPr>
+          <a:xfrm>
+            <a:off x="10276" y="6502811"/>
+            <a:ext cx="7678972" cy="369332"/>
+          </a:xfrm>
+          <a:prstGeom prst="rect">
+            <a:avLst/>
+          </a:prstGeom>
+          <a:noFill/>
+        </p:spPr>
+        <p:txBody>
+          <a:bodyPr wrap="square">
+            <a:spAutoFit/>
+          </a:bodyPr>
+          <a:lstStyle/>
+          <a:p>
+            <a:r>
+              <a:rPr lang="en-US" dirty="0">
+                <a:hlinkClick r:id="rId2"/>
+              </a:rPr>
+              <a:t>https://github.com/suzgunmirac/BIG-Bench-Hard/blob/main/bbh/README.md</a:t>
+            </a:r>
+            <a:endParaRPr lang="en-US" dirty="0"/>
+          </a:p>
+        </p:txBody>
+      </p:sp>
+    </p:spTree>
+    <p:extLst>
+      <p:ext uri="{BB962C8B-B14F-4D97-AF65-F5344CB8AC3E}">
+        <p14:creationId xmlns:p14="http://schemas.microsoft.com/office/powerpoint/2010/main" val="1861941251"/>
+      </p:ext>
+    </p:extLst>
+  </p:cSld>
+  <p:clrMapOvr>
+    <a:masterClrMapping/>
+  </p:clrMapOvr>
+</p:sld>
+</file>
+
+<file path=ppt/slides/slide23.xml><?xml version="1.0" encoding="utf-8"?>
+<p:sld xmlns:a="http://schemas.openxmlformats.org/drawingml/2006/main" xmlns:r="http://schemas.openxmlformats.org/officeDocument/2006/relationships" xmlns:p="http://schemas.openxmlformats.org/presentationml/2006/main">
+  <p:cSld>
+    <p:spTree>
+      <p:nvGrpSpPr>
+        <p:cNvPr id="1" name=""/>
+        <p:cNvGrpSpPr/>
+        <p:nvPr/>
+      </p:nvGrpSpPr>
+      <p:grpSpPr>
+        <a:xfrm>
+          <a:off x="0" y="0"/>
+          <a:ext cx="0" cy="0"/>
+          <a:chOff x="0" y="0"/>
+          <a:chExt cx="0" cy="0"/>
+        </a:xfrm>
+      </p:grpSpPr>
+      <p:sp>
+        <p:nvSpPr>
+          <p:cNvPr id="4" name="Title 3">
+            <a:extLst>
+              <a:ext uri="{FF2B5EF4-FFF2-40B4-BE49-F238E27FC236}">
+                <a16:creationId xmlns:a16="http://schemas.microsoft.com/office/drawing/2014/main" id="{7B32F22B-B99E-E5EB-4AB3-45FA40E423F9}"/>
+              </a:ext>
+            </a:extLst>
+          </p:cNvPr>
+          <p:cNvSpPr>
+            <a:spLocks noGrp="1"/>
+          </p:cNvSpPr>
+          <p:nvPr>
+            <p:ph type="title"/>
+          </p:nvPr>
+        </p:nvSpPr>
+        <p:spPr>
+          <a:xfrm>
+            <a:off x="320616" y="248989"/>
+            <a:ext cx="3796341" cy="656786"/>
+          </a:xfrm>
+          <a:solidFill>
+            <a:schemeClr val="bg1"/>
+          </a:solidFill>
+          <a:effectLst>
+            <a:outerShdw blurRad="50800" dist="38100" dir="8100000" algn="tr" rotWithShape="0">
+              <a:prstClr val="black">
+                <a:alpha val="40000"/>
+              </a:prstClr>
+            </a:outerShdw>
+          </a:effectLst>
+        </p:spPr>
+        <p:txBody>
+          <a:bodyPr>
+            <a:normAutofit fontScale="90000"/>
+          </a:bodyPr>
+          <a:lstStyle/>
+          <a:p>
+            <a:r>
+              <a:rPr lang="en-US" dirty="0"/>
+              <a:t>ARC Benchmark</a:t>
+            </a:r>
+          </a:p>
+        </p:txBody>
+      </p:sp>
+      <p:sp>
+        <p:nvSpPr>
+          <p:cNvPr id="5" name="Content Placeholder 4">
+            <a:extLst>
+              <a:ext uri="{FF2B5EF4-FFF2-40B4-BE49-F238E27FC236}">
+                <a16:creationId xmlns:a16="http://schemas.microsoft.com/office/drawing/2014/main" id="{C0329D24-9711-C54F-6123-3CFB19A68259}"/>
+              </a:ext>
+            </a:extLst>
+          </p:cNvPr>
+          <p:cNvSpPr>
+            <a:spLocks noGrp="1"/>
+          </p:cNvSpPr>
+          <p:nvPr>
+            <p:ph idx="1"/>
+          </p:nvPr>
+        </p:nvSpPr>
+        <p:spPr>
+          <a:xfrm>
+            <a:off x="609600" y="2022019"/>
+            <a:ext cx="10972800" cy="475486"/>
+          </a:xfrm>
+        </p:spPr>
+        <p:txBody>
+          <a:bodyPr/>
+          <a:lstStyle/>
+          <a:p>
+            <a:pPr marL="0" indent="0" algn="ctr">
+              <a:buNone/>
+            </a:pPr>
+            <a:r>
+              <a:rPr lang="en-US" sz="2400" dirty="0"/>
+              <a:t>“AI2 Reasoning Challenge</a:t>
+            </a:r>
+            <a:r>
+              <a:rPr lang="en-US" sz="2000" dirty="0"/>
+              <a:t>”</a:t>
+            </a:r>
+          </a:p>
+        </p:txBody>
+      </p:sp>
+      <p:sp>
+        <p:nvSpPr>
+          <p:cNvPr id="2" name="TextBox 1">
+            <a:extLst>
+              <a:ext uri="{FF2B5EF4-FFF2-40B4-BE49-F238E27FC236}">
+                <a16:creationId xmlns:a16="http://schemas.microsoft.com/office/drawing/2014/main" id="{5E0C1892-362C-BD71-52FE-8172DB655640}"/>
+              </a:ext>
+            </a:extLst>
+          </p:cNvPr>
+          <p:cNvSpPr txBox="1"/>
+          <p:nvPr/>
+        </p:nvSpPr>
+        <p:spPr>
+          <a:xfrm>
+            <a:off x="11625942" y="6082396"/>
+            <a:ext cx="441146" cy="369332"/>
+          </a:xfrm>
+          <a:prstGeom prst="rect">
+            <a:avLst/>
+          </a:prstGeom>
+          <a:noFill/>
+        </p:spPr>
+        <p:txBody>
+          <a:bodyPr wrap="none" rtlCol="0">
+            <a:spAutoFit/>
+          </a:bodyPr>
+          <a:lstStyle/>
+          <a:p>
+            <a:r>
+              <a:rPr lang="en-US" dirty="0"/>
+              <a:t>[2]</a:t>
+            </a:r>
+          </a:p>
+        </p:txBody>
+      </p:sp>
+      <p:sp>
+        <p:nvSpPr>
+          <p:cNvPr id="6" name="TextBox 5">
+            <a:extLst>
+              <a:ext uri="{FF2B5EF4-FFF2-40B4-BE49-F238E27FC236}">
+                <a16:creationId xmlns:a16="http://schemas.microsoft.com/office/drawing/2014/main" id="{40897FB0-5A0C-AE2C-9A86-DD163840A87B}"/>
+              </a:ext>
+            </a:extLst>
+          </p:cNvPr>
+          <p:cNvSpPr txBox="1"/>
+          <p:nvPr/>
+        </p:nvSpPr>
+        <p:spPr>
+          <a:xfrm>
+            <a:off x="1338943" y="2828836"/>
+            <a:ext cx="9617527" cy="707886"/>
+          </a:xfrm>
+          <a:prstGeom prst="rect">
+            <a:avLst/>
+          </a:prstGeom>
+          <a:noFill/>
+        </p:spPr>
+        <p:txBody>
+          <a:bodyPr wrap="square">
+            <a:spAutoFit/>
+          </a:bodyPr>
+          <a:lstStyle/>
+          <a:p>
+            <a:pPr algn="ctr"/>
+            <a:r>
+              <a:rPr lang="en-US" sz="2000" dirty="0"/>
+              <a:t>“7,787 authentic, </a:t>
+            </a:r>
+            <a:r>
+              <a:rPr lang="en-US" sz="2000" dirty="0">
+                <a:highlight>
+                  <a:srgbClr val="FFFF00"/>
+                </a:highlight>
+              </a:rPr>
+              <a:t>grade-school level</a:t>
+            </a:r>
+            <a:r>
+              <a:rPr lang="en-US" sz="2000" dirty="0"/>
+              <a:t>, multiple-choice science questions</a:t>
+            </a:r>
+          </a:p>
+          <a:p>
+            <a:pPr algn="ctr"/>
+            <a:r>
+              <a:rPr lang="en-US" sz="2000" dirty="0"/>
+              <a:t> that are intended for question-answering.“</a:t>
+            </a:r>
+          </a:p>
+        </p:txBody>
+      </p:sp>
+      <p:sp>
+        <p:nvSpPr>
+          <p:cNvPr id="7" name="TextBox 6">
+            <a:extLst>
+              <a:ext uri="{FF2B5EF4-FFF2-40B4-BE49-F238E27FC236}">
+                <a16:creationId xmlns:a16="http://schemas.microsoft.com/office/drawing/2014/main" id="{F800609D-7FAB-56A2-F6A7-C4AC86F1348F}"/>
+              </a:ext>
+            </a:extLst>
+          </p:cNvPr>
+          <p:cNvSpPr txBox="1"/>
+          <p:nvPr/>
+        </p:nvSpPr>
+        <p:spPr>
+          <a:xfrm>
+            <a:off x="4634541" y="4888466"/>
+            <a:ext cx="6094562" cy="369332"/>
+          </a:xfrm>
+          <a:prstGeom prst="rect">
+            <a:avLst/>
+          </a:prstGeom>
+          <a:noFill/>
+        </p:spPr>
+        <p:txBody>
+          <a:bodyPr wrap="square">
+            <a:spAutoFit/>
+          </a:bodyPr>
+          <a:lstStyle/>
+          <a:p>
+            <a:r>
+              <a:rPr lang="en-US" sz="1800" b="0" i="0" u="none" strike="noStrike" baseline="0" dirty="0">
+                <a:latin typeface="NimbusRomNo9L-Regu"/>
+              </a:rPr>
+              <a:t>Allen Institute for Artificial Intelligence, Seattle, WA, U.S.A.</a:t>
+            </a:r>
+            <a:endParaRPr lang="en-US" dirty="0"/>
+          </a:p>
+        </p:txBody>
+      </p:sp>
+    </p:spTree>
+    <p:extLst>
+      <p:ext uri="{BB962C8B-B14F-4D97-AF65-F5344CB8AC3E}">
+        <p14:creationId xmlns:p14="http://schemas.microsoft.com/office/powerpoint/2010/main" val="3195113342"/>
+      </p:ext>
+    </p:extLst>
+  </p:cSld>
+  <p:clrMapOvr>
+    <a:masterClrMapping/>
+  </p:clrMapOvr>
+</p:sld>
+</file>
+
+<file path=ppt/slides/slide24.xml><?xml version="1.0" encoding="utf-8"?>
+<p:sld xmlns:a="http://schemas.openxmlformats.org/drawingml/2006/main" xmlns:r="http://schemas.openxmlformats.org/officeDocument/2006/relationships" xmlns:p="http://schemas.openxmlformats.org/presentationml/2006/main">
+  <p:cSld>
+    <p:spTree>
+      <p:nvGrpSpPr>
+        <p:cNvPr id="1" name=""/>
+        <p:cNvGrpSpPr/>
+        <p:nvPr/>
+      </p:nvGrpSpPr>
+      <p:grpSpPr>
+        <a:xfrm>
+          <a:off x="0" y="0"/>
+          <a:ext cx="0" cy="0"/>
+          <a:chOff x="0" y="0"/>
+          <a:chExt cx="0" cy="0"/>
+        </a:xfrm>
+      </p:grpSpPr>
+      <p:sp>
+        <p:nvSpPr>
+          <p:cNvPr id="4" name="Title 3">
+            <a:extLst>
+              <a:ext uri="{FF2B5EF4-FFF2-40B4-BE49-F238E27FC236}">
+                <a16:creationId xmlns:a16="http://schemas.microsoft.com/office/drawing/2014/main" id="{7B32F22B-B99E-E5EB-4AB3-45FA40E423F9}"/>
+              </a:ext>
+            </a:extLst>
+          </p:cNvPr>
+          <p:cNvSpPr>
+            <a:spLocks noGrp="1"/>
+          </p:cNvSpPr>
+          <p:nvPr>
+            <p:ph type="title"/>
+          </p:nvPr>
+        </p:nvSpPr>
+        <p:spPr>
+          <a:xfrm>
+            <a:off x="180975" y="198247"/>
+            <a:ext cx="5189376" cy="755623"/>
+          </a:xfrm>
+          <a:solidFill>
+            <a:schemeClr val="bg1"/>
+          </a:solidFill>
+          <a:effectLst>
+            <a:outerShdw blurRad="50800" dist="38100" dir="8100000" algn="tr" rotWithShape="0">
+              <a:prstClr val="black">
+                <a:alpha val="40000"/>
+              </a:prstClr>
+            </a:outerShdw>
+          </a:effectLst>
+        </p:spPr>
+        <p:txBody>
+          <a:bodyPr/>
+          <a:lstStyle/>
+          <a:p>
+            <a:r>
+              <a:rPr lang="en-US" dirty="0"/>
+              <a:t>HellaSwag Benchmark</a:t>
+            </a:r>
+          </a:p>
+        </p:txBody>
+      </p:sp>
+      <p:sp>
+        <p:nvSpPr>
+          <p:cNvPr id="5" name="Content Placeholder 4">
+            <a:extLst>
+              <a:ext uri="{FF2B5EF4-FFF2-40B4-BE49-F238E27FC236}">
+                <a16:creationId xmlns:a16="http://schemas.microsoft.com/office/drawing/2014/main" id="{C0329D24-9711-C54F-6123-3CFB19A68259}"/>
+              </a:ext>
+            </a:extLst>
+          </p:cNvPr>
+          <p:cNvSpPr>
+            <a:spLocks noGrp="1"/>
+          </p:cNvSpPr>
+          <p:nvPr>
+            <p:ph idx="1"/>
+          </p:nvPr>
+        </p:nvSpPr>
+        <p:spPr/>
+        <p:txBody>
+          <a:bodyPr/>
+          <a:lstStyle/>
+          <a:p>
+            <a:pPr marL="0" indent="0">
+              <a:buNone/>
+            </a:pPr>
+            <a:r>
+              <a:rPr lang="en-US" b="1" dirty="0">
+                <a:highlight>
+                  <a:srgbClr val="FFFF00"/>
+                </a:highlight>
+              </a:rPr>
+              <a:t>H</a:t>
+            </a:r>
+            <a:r>
+              <a:rPr lang="en-US" dirty="0"/>
+              <a:t>arder </a:t>
+            </a:r>
+            <a:r>
+              <a:rPr lang="en-US" b="1" dirty="0">
+                <a:highlight>
+                  <a:srgbClr val="FFFF00"/>
+                </a:highlight>
+              </a:rPr>
+              <a:t>E</a:t>
+            </a:r>
+            <a:r>
+              <a:rPr lang="en-US" dirty="0"/>
+              <a:t>ndings, </a:t>
+            </a:r>
+            <a:r>
+              <a:rPr lang="en-US" b="1" dirty="0">
+                <a:highlight>
+                  <a:srgbClr val="FFFF00"/>
+                </a:highlight>
+              </a:rPr>
+              <a:t>L</a:t>
+            </a:r>
+            <a:r>
+              <a:rPr lang="en-US" dirty="0"/>
+              <a:t>onger contexts, and </a:t>
+            </a:r>
+            <a:r>
+              <a:rPr lang="en-US" b="1" dirty="0">
+                <a:highlight>
+                  <a:srgbClr val="FFFF00"/>
+                </a:highlight>
+              </a:rPr>
+              <a:t>L</a:t>
+            </a:r>
+            <a:r>
+              <a:rPr lang="en-US" dirty="0"/>
+              <a:t>ow-shot </a:t>
+            </a:r>
+            <a:r>
+              <a:rPr lang="en-US" b="1" dirty="0">
+                <a:highlight>
+                  <a:srgbClr val="FFFF00"/>
+                </a:highlight>
+              </a:rPr>
+              <a:t>A</a:t>
+            </a:r>
+            <a:r>
+              <a:rPr lang="en-US" dirty="0"/>
+              <a:t>ctivities for </a:t>
+            </a:r>
+            <a:r>
+              <a:rPr lang="en-US" b="1" dirty="0">
+                <a:highlight>
+                  <a:srgbClr val="FFFF00"/>
+                </a:highlight>
+              </a:rPr>
+              <a:t>S</a:t>
+            </a:r>
+            <a:r>
+              <a:rPr lang="en-US" dirty="0"/>
+              <a:t>ituations </a:t>
+            </a:r>
+            <a:r>
+              <a:rPr lang="en-US" b="1" dirty="0">
+                <a:highlight>
+                  <a:srgbClr val="FFFF00"/>
+                </a:highlight>
+              </a:rPr>
+              <a:t>W</a:t>
+            </a:r>
+            <a:r>
+              <a:rPr lang="en-US" dirty="0"/>
+              <a:t>ith </a:t>
+            </a:r>
+            <a:r>
+              <a:rPr lang="en-US" b="1" dirty="0">
+                <a:highlight>
+                  <a:srgbClr val="FFFF00"/>
+                </a:highlight>
+              </a:rPr>
+              <a:t>A</a:t>
+            </a:r>
+            <a:r>
+              <a:rPr lang="en-US" dirty="0"/>
+              <a:t>dversarial </a:t>
+            </a:r>
+            <a:r>
+              <a:rPr lang="en-US" b="1" dirty="0">
+                <a:highlight>
+                  <a:srgbClr val="FFFF00"/>
+                </a:highlight>
+              </a:rPr>
+              <a:t>G</a:t>
+            </a:r>
+            <a:r>
+              <a:rPr lang="en-US" dirty="0"/>
+              <a:t>enerations</a:t>
+            </a:r>
+          </a:p>
+        </p:txBody>
+      </p:sp>
+      <p:sp>
+        <p:nvSpPr>
+          <p:cNvPr id="2" name="TextBox 1">
+            <a:extLst>
+              <a:ext uri="{FF2B5EF4-FFF2-40B4-BE49-F238E27FC236}">
+                <a16:creationId xmlns:a16="http://schemas.microsoft.com/office/drawing/2014/main" id="{5E0C1892-362C-BD71-52FE-8172DB655640}"/>
+              </a:ext>
+            </a:extLst>
+          </p:cNvPr>
+          <p:cNvSpPr txBox="1"/>
+          <p:nvPr/>
+        </p:nvSpPr>
+        <p:spPr>
+          <a:xfrm>
+            <a:off x="11625942" y="6082396"/>
+            <a:ext cx="441146" cy="369332"/>
+          </a:xfrm>
+          <a:prstGeom prst="rect">
+            <a:avLst/>
+          </a:prstGeom>
+          <a:noFill/>
+        </p:spPr>
+        <p:txBody>
+          <a:bodyPr wrap="none" rtlCol="0">
+            <a:spAutoFit/>
+          </a:bodyPr>
+          <a:lstStyle/>
+          <a:p>
+            <a:r>
+              <a:rPr lang="en-US" dirty="0"/>
+              <a:t>[1]</a:t>
+            </a:r>
+          </a:p>
+        </p:txBody>
+      </p:sp>
+      <p:sp>
+        <p:nvSpPr>
+          <p:cNvPr id="6" name="TextBox 5">
+            <a:extLst>
+              <a:ext uri="{FF2B5EF4-FFF2-40B4-BE49-F238E27FC236}">
+                <a16:creationId xmlns:a16="http://schemas.microsoft.com/office/drawing/2014/main" id="{63D3C0B3-AB31-F4B6-1764-EB87D0A9487A}"/>
+              </a:ext>
+            </a:extLst>
+          </p:cNvPr>
+          <p:cNvSpPr txBox="1"/>
+          <p:nvPr/>
+        </p:nvSpPr>
+        <p:spPr>
+          <a:xfrm>
+            <a:off x="1892322" y="3339962"/>
+            <a:ext cx="9893808" cy="523220"/>
+          </a:xfrm>
+          <a:prstGeom prst="rect">
+            <a:avLst/>
+          </a:prstGeom>
+          <a:noFill/>
+        </p:spPr>
+        <p:txBody>
+          <a:bodyPr wrap="square">
+            <a:spAutoFit/>
+          </a:bodyPr>
+          <a:lstStyle/>
+          <a:p>
+            <a:r>
+              <a:rPr lang="en-US" sz="2800" b="1" dirty="0">
+                <a:latin typeface="Courier New" panose="02070309020205020404" pitchFamily="49" charset="0"/>
+                <a:cs typeface="Courier New" panose="02070309020205020404" pitchFamily="49" charset="0"/>
+              </a:rPr>
+              <a:t>tl;dr “Pick the best ending to the context.”</a:t>
+            </a:r>
+          </a:p>
+        </p:txBody>
+      </p:sp>
+      <p:sp>
+        <p:nvSpPr>
+          <p:cNvPr id="7" name="TextBox 6">
+            <a:extLst>
+              <a:ext uri="{FF2B5EF4-FFF2-40B4-BE49-F238E27FC236}">
+                <a16:creationId xmlns:a16="http://schemas.microsoft.com/office/drawing/2014/main" id="{EAFFB681-F4A2-6734-DDF8-B788D0F76095}"/>
+              </a:ext>
+            </a:extLst>
+          </p:cNvPr>
+          <p:cNvSpPr txBox="1"/>
+          <p:nvPr/>
+        </p:nvSpPr>
+        <p:spPr>
+          <a:xfrm>
+            <a:off x="2941351" y="6040848"/>
+            <a:ext cx="8412449" cy="646331"/>
+          </a:xfrm>
+          <a:prstGeom prst="rect">
+            <a:avLst/>
+          </a:prstGeom>
+          <a:noFill/>
+        </p:spPr>
+        <p:txBody>
+          <a:bodyPr wrap="square">
+            <a:spAutoFit/>
+          </a:bodyPr>
+          <a:lstStyle/>
+          <a:p>
+            <a:pPr marL="285750" indent="-285750" algn="l">
+              <a:buFont typeface="Wingdings" panose="05000000000000000000" pitchFamily="2" charset="2"/>
+              <a:buChar char="§"/>
+            </a:pPr>
+            <a:r>
+              <a:rPr lang="en-US" sz="1800" b="0" i="0" u="none" strike="noStrike" baseline="0" dirty="0">
+                <a:latin typeface="NimbusRomNo9L-Regu"/>
+              </a:rPr>
+              <a:t>Paul G. Allen School of Computer Science &amp; Engineering, University of Washington</a:t>
+            </a:r>
+            <a:endParaRPr lang="en-US" dirty="0">
+              <a:latin typeface="NimbusRomNo9L-Regu"/>
+            </a:endParaRPr>
+          </a:p>
+          <a:p>
+            <a:pPr marL="285750" indent="-285750" algn="l">
+              <a:buFont typeface="Wingdings" panose="05000000000000000000" pitchFamily="2" charset="2"/>
+              <a:buChar char="§"/>
+            </a:pPr>
+            <a:r>
+              <a:rPr lang="en-US" sz="1800" b="0" i="0" u="none" strike="noStrike" baseline="0" dirty="0">
+                <a:latin typeface="NimbusRomNo9L-Regu"/>
+              </a:rPr>
+              <a:t>Allen Institute for Artificial Intelligence </a:t>
+            </a:r>
+            <a:endParaRPr lang="en-US" dirty="0"/>
+          </a:p>
+        </p:txBody>
+      </p:sp>
+      <p:sp>
+        <p:nvSpPr>
+          <p:cNvPr id="8" name="TextBox 7">
+            <a:extLst>
+              <a:ext uri="{FF2B5EF4-FFF2-40B4-BE49-F238E27FC236}">
+                <a16:creationId xmlns:a16="http://schemas.microsoft.com/office/drawing/2014/main" id="{B4F3C7BD-354A-0CD2-2538-93F96473927A}"/>
+              </a:ext>
+            </a:extLst>
+          </p:cNvPr>
+          <p:cNvSpPr txBox="1"/>
+          <p:nvPr/>
+        </p:nvSpPr>
+        <p:spPr>
+          <a:xfrm>
+            <a:off x="1892322" y="4067664"/>
+            <a:ext cx="6699587" cy="369332"/>
+          </a:xfrm>
+          <a:prstGeom prst="rect">
+            <a:avLst/>
+          </a:prstGeom>
+          <a:solidFill>
+            <a:schemeClr val="bg1"/>
+          </a:solidFill>
+        </p:spPr>
+        <p:txBody>
+          <a:bodyPr wrap="square">
+            <a:spAutoFit/>
+          </a:bodyPr>
+          <a:lstStyle/>
+          <a:p>
+            <a:r>
+              <a:rPr lang="en-US" sz="1800" dirty="0"/>
+              <a:t>Sentence-Answer examples taken from sites </a:t>
+            </a:r>
+            <a:r>
+              <a:rPr lang="en-US" sz="1800" dirty="0">
+                <a:hlinkClick r:id="rId2"/>
+              </a:rPr>
+              <a:t>Wikihow</a:t>
+            </a:r>
+            <a:r>
+              <a:rPr lang="en-US" sz="1800" dirty="0"/>
+              <a:t> and </a:t>
+            </a:r>
+            <a:r>
+              <a:rPr lang="en-US" sz="1800" dirty="0">
+                <a:hlinkClick r:id="rId3"/>
+              </a:rPr>
+              <a:t>ActivityNet</a:t>
+            </a:r>
+            <a:endParaRPr lang="en-US" sz="1800" dirty="0"/>
+          </a:p>
+        </p:txBody>
+      </p:sp>
+    </p:spTree>
+    <p:extLst>
+      <p:ext uri="{BB962C8B-B14F-4D97-AF65-F5344CB8AC3E}">
+        <p14:creationId xmlns:p14="http://schemas.microsoft.com/office/powerpoint/2010/main" val="2559766778"/>
+      </p:ext>
+    </p:extLst>
+  </p:cSld>
+  <p:clrMapOvr>
+    <a:masterClrMapping/>
+  </p:clrMapOvr>
+  <p:timing>
+    <p:tnLst>
+      <p:par>
+        <p:cTn id="1" dur="indefinite" restart="never" nodeType="tmRoot">
+          <p:childTnLst>
+            <p:seq concurrent="1" nextAc="seek">
+              <p:cTn id="2" dur="indefinite" nodeType="mainSeq">
+                <p:childTnLst>
+                  <p:par>
+                    <p:cTn id="3" fill="hold">
+                      <p:stCondLst>
+                        <p:cond delay="indefinite"/>
+                      </p:stCondLst>
+                      <p:childTnLst>
+                        <p:par>
+                          <p:cTn id="4" fill="hold">
+                            <p:stCondLst>
+                              <p:cond delay="0"/>
+                            </p:stCondLst>
+                            <p:childTnLst>
+                              <p:par>
+                                <p:cTn id="5" presetID="32" presetClass="emph" presetSubtype="0" fill="hold" grpId="0" nodeType="clickEffect">
+                                  <p:stCondLst>
+                                    <p:cond delay="0"/>
+                                  </p:stCondLst>
+                                  <p:childTnLst>
+                                    <p:animRot by="120000">
+                                      <p:cBhvr>
+                                        <p:cTn id="6" dur="100" fill="hold">
+                                          <p:stCondLst>
+                                            <p:cond delay="0"/>
+                                          </p:stCondLst>
+                                        </p:cTn>
+                                        <p:tgtEl>
+                                          <p:spTgt spid="8"/>
+                                        </p:tgtEl>
+                                        <p:attrNameLst>
+                                          <p:attrName>r</p:attrName>
+                                        </p:attrNameLst>
+                                      </p:cBhvr>
+                                    </p:animRot>
+                                    <p:animRot by="-240000">
+                                      <p:cBhvr>
+                                        <p:cTn id="7" dur="200" fill="hold">
+                                          <p:stCondLst>
+                                            <p:cond delay="200"/>
+                                          </p:stCondLst>
+                                        </p:cTn>
+                                        <p:tgtEl>
+                                          <p:spTgt spid="8"/>
+                                        </p:tgtEl>
+                                        <p:attrNameLst>
+                                          <p:attrName>r</p:attrName>
+                                        </p:attrNameLst>
+                                      </p:cBhvr>
+                                    </p:animRot>
+                                    <p:animRot by="240000">
+                                      <p:cBhvr>
+                                        <p:cTn id="8" dur="200" fill="hold">
+                                          <p:stCondLst>
+                                            <p:cond delay="400"/>
+                                          </p:stCondLst>
+                                        </p:cTn>
+                                        <p:tgtEl>
+                                          <p:spTgt spid="8"/>
+                                        </p:tgtEl>
+                                        <p:attrNameLst>
+                                          <p:attrName>r</p:attrName>
+                                        </p:attrNameLst>
+                                      </p:cBhvr>
+                                    </p:animRot>
+                                    <p:animRot by="-240000">
+                                      <p:cBhvr>
+                                        <p:cTn id="9" dur="200" fill="hold">
+                                          <p:stCondLst>
+                                            <p:cond delay="600"/>
+                                          </p:stCondLst>
+                                        </p:cTn>
+                                        <p:tgtEl>
+                                          <p:spTgt spid="8"/>
+                                        </p:tgtEl>
+                                        <p:attrNameLst>
+                                          <p:attrName>r</p:attrName>
+                                        </p:attrNameLst>
+                                      </p:cBhvr>
+                                    </p:animRot>
+                                    <p:animRot by="120000">
+                                      <p:cBhvr>
+                                        <p:cTn id="10" dur="200" fill="hold">
+                                          <p:stCondLst>
+                                            <p:cond delay="800"/>
+                                          </p:stCondLst>
+                                        </p:cTn>
+                                        <p:tgtEl>
+                                          <p:spTgt spid="8"/>
+                                        </p:tgtEl>
+                                        <p:attrNameLst>
+                                          <p:attrName>r</p:attrName>
+                                        </p:attrNameLst>
+                                      </p:cBhvr>
+                                    </p:animRot>
+                                  </p:childTnLst>
+                                </p:cTn>
+                              </p:par>
+                            </p:childTnLst>
+                          </p:cTn>
+                        </p:par>
+                      </p:childTnLst>
+                    </p:cTn>
+                  </p:par>
+                </p:childTnLst>
+              </p:cTn>
+              <p:prevCondLst>
+                <p:cond evt="onPrev" delay="0">
+                  <p:tgtEl>
+                    <p:sldTgt/>
+                  </p:tgtEl>
+                </p:cond>
+              </p:prevCondLst>
+              <p:nextCondLst>
+                <p:cond evt="onNext" delay="0">
+                  <p:tgtEl>
+                    <p:sldTgt/>
+                  </p:tgtEl>
+                </p:cond>
+              </p:nextCondLst>
+            </p:seq>
+          </p:childTnLst>
+        </p:cTn>
+      </p:par>
+    </p:tnLst>
+    <p:bldLst>
+      <p:bldP spid="8" grpId="0" animBg="1"/>
+    </p:bldLst>
+  </p:timing>
+</p:sld>
+</file>
+
+<file path=ppt/slides/slide25.xml><?xml version="1.0" encoding="utf-8"?>
+<p:sld xmlns:a="http://schemas.openxmlformats.org/drawingml/2006/main" xmlns:r="http://schemas.openxmlformats.org/officeDocument/2006/relationships" xmlns:p="http://schemas.openxmlformats.org/presentationml/2006/main">
+  <p:cSld>
+    <p:spTree>
+      <p:nvGrpSpPr>
+        <p:cNvPr id="1" name=""/>
+        <p:cNvGrpSpPr/>
+        <p:nvPr/>
+      </p:nvGrpSpPr>
+      <p:grpSpPr>
+        <a:xfrm>
+          <a:off x="0" y="0"/>
+          <a:ext cx="0" cy="0"/>
+          <a:chOff x="0" y="0"/>
+          <a:chExt cx="0" cy="0"/>
+        </a:xfrm>
+      </p:grpSpPr>
+      <p:sp>
+        <p:nvSpPr>
+          <p:cNvPr id="4" name="Title 3">
+            <a:extLst>
+              <a:ext uri="{FF2B5EF4-FFF2-40B4-BE49-F238E27FC236}">
+                <a16:creationId xmlns:a16="http://schemas.microsoft.com/office/drawing/2014/main" id="{7B32F22B-B99E-E5EB-4AB3-45FA40E423F9}"/>
+              </a:ext>
+            </a:extLst>
+          </p:cNvPr>
+          <p:cNvSpPr>
+            <a:spLocks noGrp="1"/>
+          </p:cNvSpPr>
+          <p:nvPr>
+            <p:ph type="title"/>
+          </p:nvPr>
+        </p:nvSpPr>
+        <p:spPr>
+          <a:xfrm>
+            <a:off x="171450" y="184151"/>
+            <a:ext cx="5457825" cy="749300"/>
+          </a:xfrm>
+          <a:solidFill>
+            <a:schemeClr val="bg1"/>
+          </a:solidFill>
+          <a:effectLst>
+            <a:outerShdw blurRad="50800" dist="38100" dir="8100000" algn="tr" rotWithShape="0">
+              <a:prstClr val="black">
+                <a:alpha val="40000"/>
+              </a:prstClr>
+            </a:outerShdw>
+          </a:effectLst>
+        </p:spPr>
+        <p:txBody>
+          <a:bodyPr/>
+          <a:lstStyle/>
+          <a:p>
+            <a:r>
+              <a:rPr lang="en-US" dirty="0"/>
+              <a:t>TruthfulQA Benchmark</a:t>
+            </a:r>
+          </a:p>
+        </p:txBody>
+      </p:sp>
+      <p:sp>
+        <p:nvSpPr>
+          <p:cNvPr id="5" name="Content Placeholder 4">
+            <a:extLst>
+              <a:ext uri="{FF2B5EF4-FFF2-40B4-BE49-F238E27FC236}">
+                <a16:creationId xmlns:a16="http://schemas.microsoft.com/office/drawing/2014/main" id="{C0329D24-9711-C54F-6123-3CFB19A68259}"/>
+              </a:ext>
+            </a:extLst>
+          </p:cNvPr>
+          <p:cNvSpPr>
+            <a:spLocks noGrp="1"/>
+          </p:cNvSpPr>
+          <p:nvPr>
+            <p:ph idx="1"/>
+          </p:nvPr>
+        </p:nvSpPr>
+        <p:spPr>
+          <a:xfrm>
+            <a:off x="609600" y="1828802"/>
+            <a:ext cx="10972800" cy="643378"/>
+          </a:xfrm>
+        </p:spPr>
+        <p:txBody>
+          <a:bodyPr/>
+          <a:lstStyle/>
+          <a:p>
+            <a:pPr marL="0" indent="0" algn="ctr">
+              <a:buNone/>
+            </a:pPr>
+            <a:r>
+              <a:rPr lang="en-US" dirty="0"/>
+              <a:t>“Measuring How Models Mimic Human Falsehoods”</a:t>
+            </a:r>
+          </a:p>
+        </p:txBody>
+      </p:sp>
+      <p:sp>
+        <p:nvSpPr>
+          <p:cNvPr id="2" name="TextBox 1">
+            <a:extLst>
+              <a:ext uri="{FF2B5EF4-FFF2-40B4-BE49-F238E27FC236}">
+                <a16:creationId xmlns:a16="http://schemas.microsoft.com/office/drawing/2014/main" id="{5E0C1892-362C-BD71-52FE-8172DB655640}"/>
+              </a:ext>
+            </a:extLst>
+          </p:cNvPr>
+          <p:cNvSpPr txBox="1"/>
+          <p:nvPr/>
+        </p:nvSpPr>
+        <p:spPr>
+          <a:xfrm>
+            <a:off x="11625942" y="6082396"/>
+            <a:ext cx="441146" cy="369332"/>
+          </a:xfrm>
+          <a:prstGeom prst="rect">
+            <a:avLst/>
+          </a:prstGeom>
+          <a:noFill/>
+        </p:spPr>
+        <p:txBody>
+          <a:bodyPr wrap="none" rtlCol="0">
+            <a:spAutoFit/>
+          </a:bodyPr>
+          <a:lstStyle/>
+          <a:p>
+            <a:r>
+              <a:rPr lang="en-US" dirty="0"/>
+              <a:t>[1]</a:t>
+            </a:r>
+          </a:p>
+        </p:txBody>
+      </p:sp>
+      <p:sp>
+        <p:nvSpPr>
+          <p:cNvPr id="7" name="TextBox 6">
+            <a:extLst>
+              <a:ext uri="{FF2B5EF4-FFF2-40B4-BE49-F238E27FC236}">
+                <a16:creationId xmlns:a16="http://schemas.microsoft.com/office/drawing/2014/main" id="{A20F660F-7DB6-5697-27F6-367166EE85F4}"/>
+              </a:ext>
+            </a:extLst>
+          </p:cNvPr>
+          <p:cNvSpPr txBox="1"/>
+          <p:nvPr/>
+        </p:nvSpPr>
+        <p:spPr>
+          <a:xfrm>
+            <a:off x="1721963" y="3059668"/>
+            <a:ext cx="8487266" cy="369332"/>
+          </a:xfrm>
+          <a:prstGeom prst="rect">
+            <a:avLst/>
+          </a:prstGeom>
+          <a:noFill/>
+        </p:spPr>
+        <p:txBody>
+          <a:bodyPr wrap="square">
+            <a:spAutoFit/>
+          </a:bodyPr>
+          <a:lstStyle/>
+          <a:p>
+            <a:r>
+              <a:rPr lang="en-US" dirty="0"/>
+              <a:t>817 questions spanning 38 categories, including health, law, finance and politics. </a:t>
+            </a:r>
+          </a:p>
+        </p:txBody>
+      </p:sp>
+      <p:sp>
+        <p:nvSpPr>
+          <p:cNvPr id="3" name="TextBox 2">
+            <a:extLst>
+              <a:ext uri="{FF2B5EF4-FFF2-40B4-BE49-F238E27FC236}">
+                <a16:creationId xmlns:a16="http://schemas.microsoft.com/office/drawing/2014/main" id="{62B60440-AC94-6914-A8E5-1543E3442213}"/>
+              </a:ext>
+            </a:extLst>
+          </p:cNvPr>
+          <p:cNvSpPr txBox="1"/>
+          <p:nvPr/>
+        </p:nvSpPr>
+        <p:spPr>
+          <a:xfrm>
+            <a:off x="6633713" y="5852994"/>
+            <a:ext cx="3027872" cy="369332"/>
+          </a:xfrm>
+          <a:prstGeom prst="rect">
+            <a:avLst/>
+          </a:prstGeom>
+          <a:noFill/>
+        </p:spPr>
+        <p:txBody>
+          <a:bodyPr wrap="square" rtlCol="0">
+            <a:spAutoFit/>
+          </a:bodyPr>
+          <a:lstStyle/>
+          <a:p>
+            <a:r>
+              <a:rPr lang="en-US" dirty="0"/>
+              <a:t>OpenAI, Univ of Oxford</a:t>
+            </a:r>
+          </a:p>
+        </p:txBody>
+      </p:sp>
+    </p:spTree>
+    <p:extLst>
+      <p:ext uri="{BB962C8B-B14F-4D97-AF65-F5344CB8AC3E}">
+        <p14:creationId xmlns:p14="http://schemas.microsoft.com/office/powerpoint/2010/main" val="2267048560"/>
+      </p:ext>
+    </p:extLst>
+  </p:cSld>
+  <p:clrMapOvr>
+    <a:masterClrMapping/>
+  </p:clrMapOvr>
+</p:sld>
+</file>
+
+<file path=ppt/slides/slide26.xml><?xml version="1.0" encoding="utf-8"?>
+<p:sld xmlns:a="http://schemas.openxmlformats.org/drawingml/2006/main" xmlns:r="http://schemas.openxmlformats.org/officeDocument/2006/relationships" xmlns:p="http://schemas.openxmlformats.org/presentationml/2006/main">
+  <p:cSld>
+    <p:spTree>
+      <p:nvGrpSpPr>
+        <p:cNvPr id="1" name=""/>
+        <p:cNvGrpSpPr/>
+        <p:nvPr/>
+      </p:nvGrpSpPr>
+      <p:grpSpPr>
+        <a:xfrm>
+          <a:off x="0" y="0"/>
+          <a:ext cx="0" cy="0"/>
+          <a:chOff x="0" y="0"/>
+          <a:chExt cx="0" cy="0"/>
+        </a:xfrm>
+      </p:grpSpPr>
+      <p:sp>
+        <p:nvSpPr>
+          <p:cNvPr id="3" name="TextBox 2">
+            <a:extLst>
+              <a:ext uri="{FF2B5EF4-FFF2-40B4-BE49-F238E27FC236}">
+                <a16:creationId xmlns:a16="http://schemas.microsoft.com/office/drawing/2014/main" id="{E7B4704E-22A9-45B6-0D62-539487552579}"/>
+              </a:ext>
+            </a:extLst>
+          </p:cNvPr>
+          <p:cNvSpPr txBox="1"/>
+          <p:nvPr/>
+        </p:nvSpPr>
+        <p:spPr>
+          <a:xfrm>
+            <a:off x="2219325" y="2110859"/>
+            <a:ext cx="6096000" cy="369332"/>
+          </a:xfrm>
+          <a:prstGeom prst="rect">
+            <a:avLst/>
+          </a:prstGeom>
+          <a:noFill/>
+        </p:spPr>
+        <p:txBody>
+          <a:bodyPr wrap="square">
+            <a:spAutoFit/>
+          </a:bodyPr>
+          <a:lstStyle/>
+          <a:p>
+            <a:r>
+              <a:rPr lang="en-US" dirty="0"/>
+              <a:t>Which expression is equivalent to 5(4x + 3) — 2x?</a:t>
+            </a:r>
+          </a:p>
+        </p:txBody>
+      </p:sp>
+      <p:sp>
+        <p:nvSpPr>
+          <p:cNvPr id="4" name="TextBox 3">
+            <a:extLst>
+              <a:ext uri="{FF2B5EF4-FFF2-40B4-BE49-F238E27FC236}">
+                <a16:creationId xmlns:a16="http://schemas.microsoft.com/office/drawing/2014/main" id="{CE9D3CE3-4266-AE1F-3726-21ECC175672B}"/>
+              </a:ext>
+            </a:extLst>
+          </p:cNvPr>
+          <p:cNvSpPr txBox="1"/>
+          <p:nvPr/>
+        </p:nvSpPr>
+        <p:spPr>
+          <a:xfrm>
+            <a:off x="117566" y="6318689"/>
+            <a:ext cx="2130007" cy="400110"/>
+          </a:xfrm>
+          <a:prstGeom prst="rect">
+            <a:avLst/>
+          </a:prstGeom>
+          <a:solidFill>
+            <a:schemeClr val="bg1"/>
+          </a:solidFill>
+          <a:effectLst>
+            <a:outerShdw blurRad="50800" dist="38100" dir="8100000" algn="tr" rotWithShape="0">
+              <a:prstClr val="black">
+                <a:alpha val="40000"/>
+              </a:prstClr>
+            </a:outerShdw>
+          </a:effectLst>
+        </p:spPr>
+        <p:txBody>
+          <a:bodyPr wrap="none" rtlCol="0">
+            <a:spAutoFit/>
+          </a:bodyPr>
+          <a:lstStyle/>
+          <a:p>
+            <a:r>
+              <a:rPr lang="en-US" sz="2000" dirty="0"/>
+              <a:t>MMLU Benchmark</a:t>
+            </a:r>
+          </a:p>
+        </p:txBody>
+      </p:sp>
+      <p:sp>
+        <p:nvSpPr>
+          <p:cNvPr id="6" name="TextBox 5">
+            <a:extLst>
+              <a:ext uri="{FF2B5EF4-FFF2-40B4-BE49-F238E27FC236}">
+                <a16:creationId xmlns:a16="http://schemas.microsoft.com/office/drawing/2014/main" id="{3B121110-EC68-C89C-994C-82ACF90B6E21}"/>
+              </a:ext>
+            </a:extLst>
+          </p:cNvPr>
+          <p:cNvSpPr txBox="1"/>
+          <p:nvPr/>
+        </p:nvSpPr>
+        <p:spPr>
+          <a:xfrm>
+            <a:off x="5518547" y="2930009"/>
+            <a:ext cx="1154906" cy="369332"/>
+          </a:xfrm>
+          <a:prstGeom prst="rect">
+            <a:avLst/>
+          </a:prstGeom>
+          <a:noFill/>
+        </p:spPr>
+        <p:txBody>
+          <a:bodyPr wrap="square">
+            <a:spAutoFit/>
+          </a:bodyPr>
+          <a:lstStyle/>
+          <a:p>
+            <a:r>
+              <a:rPr lang="en-US" dirty="0">
+                <a:highlight>
+                  <a:srgbClr val="FFFF00"/>
+                </a:highlight>
+              </a:rPr>
+              <a:t>18x+15</a:t>
+            </a:r>
+          </a:p>
+        </p:txBody>
+      </p:sp>
+      <p:sp>
+        <p:nvSpPr>
+          <p:cNvPr id="2" name="Title 1">
+            <a:extLst>
+              <a:ext uri="{FF2B5EF4-FFF2-40B4-BE49-F238E27FC236}">
+                <a16:creationId xmlns:a16="http://schemas.microsoft.com/office/drawing/2014/main" id="{FB539843-02B4-7CD1-BC84-A9B57FF116F9}"/>
+              </a:ext>
+            </a:extLst>
+          </p:cNvPr>
+          <p:cNvSpPr txBox="1">
+            <a:spLocks/>
+          </p:cNvSpPr>
+          <p:nvPr/>
+        </p:nvSpPr>
+        <p:spPr>
+          <a:xfrm>
+            <a:off x="609600" y="274638"/>
+            <a:ext cx="10972800" cy="656091"/>
+          </a:xfrm>
+          <a:prstGeom prst="rect">
+            <a:avLst/>
+          </a:prstGeom>
+        </p:spPr>
+        <p:txBody>
+          <a:bodyPr>
+            <a:normAutofit fontScale="97500" lnSpcReduction="10000"/>
+          </a:bodyPr>
+          <a:lstStyle>
+            <a:lvl1pPr algn="l" defTabSz="914400" rtl="0" eaLnBrk="1" latinLnBrk="0" hangingPunct="1">
+              <a:lnSpc>
+                <a:spcPct val="90000"/>
+              </a:lnSpc>
+              <a:spcBef>
+                <a:spcPct val="0"/>
+              </a:spcBef>
+              <a:buNone/>
+              <a:defRPr sz="4400" kern="1200">
+                <a:solidFill>
+                  <a:schemeClr val="tx1"/>
+                </a:solidFill>
+                <a:latin typeface="+mj-lt"/>
+                <a:ea typeface="+mj-ea"/>
+                <a:cs typeface="+mj-cs"/>
+              </a:defRPr>
+            </a:lvl1pPr>
+          </a:lstStyle>
+          <a:p>
+            <a:r>
+              <a:rPr lang="en-US" dirty="0"/>
+              <a:t>Previous question and correct answer</a:t>
+            </a:r>
+          </a:p>
+        </p:txBody>
+      </p:sp>
+    </p:spTree>
+    <p:extLst>
+      <p:ext uri="{BB962C8B-B14F-4D97-AF65-F5344CB8AC3E}">
+        <p14:creationId xmlns:p14="http://schemas.microsoft.com/office/powerpoint/2010/main" val="2368070232"/>
+      </p:ext>
+    </p:extLst>
+  </p:cSld>
+  <p:clrMapOvr>
+    <a:masterClrMapping/>
+  </p:clrMapOvr>
 </p:sld>
 </file>
 
@@ -8072,7 +11667,15 @@
           <a:p>
             <a:r>
               <a:rPr lang="en-US" dirty="0"/>
-              <a:t>Appearing in AI Leaderboards</a:t>
+              <a:t>Appearing </a:t>
+            </a:r>
+            <a:r>
+              <a:rPr lang="en-US"/>
+              <a:t>in LLM </a:t>
+            </a:r>
+            <a:r>
+              <a:rPr lang="en-US" dirty="0"/>
+              <a:t>Leaderboards</a:t>
             </a:r>
           </a:p>
           <a:p>

</xml_diff>

<commit_message>
Updated slides, deleted some unused data, moved the pre-baked notebooks
</commit_message>
<xml_diff>
--- a/CCSC-MW Fall 2024 Conference Tutorial.pptx
+++ b/CCSC-MW Fall 2024 Conference Tutorial.pptx
@@ -6,7 +6,7 @@
     <p:sldMasterId id="2147483664" r:id="rId2"/>
   </p:sldMasterIdLst>
   <p:notesMasterIdLst>
-    <p:notesMasterId r:id="rId29"/>
+    <p:notesMasterId r:id="rId28"/>
   </p:notesMasterIdLst>
   <p:sldIdLst>
     <p:sldId id="256" r:id="rId3"/>
@@ -34,7 +34,6 @@
     <p:sldId id="341" r:id="rId25"/>
     <p:sldId id="358" r:id="rId26"/>
     <p:sldId id="378" r:id="rId27"/>
-    <p:sldId id="443" r:id="rId28"/>
   </p:sldIdLst>
   <p:sldSz cx="12192000" cy="6858000"/>
   <p:notesSz cx="6858000" cy="9144000"/>
@@ -167,7 +166,6 @@
             <p14:sldId id="341"/>
             <p14:sldId id="358"/>
             <p14:sldId id="378"/>
-            <p14:sldId id="443"/>
           </p14:sldIdLst>
         </p14:section>
         <p14:section name="Unused" id="{92A7A9F2-3786-4115-8420-00D575879BE6}">
@@ -187,7 +185,7 @@
   <pc:docChgLst>
     <pc:chgData name="Nicholson, Delmer (Bill) (nicholdw)" userId="b56c8833-ee42-4335-8085-70d597acedf2" providerId="ADAL" clId="{FB213E8F-52F0-4CAB-A62F-63FF4F093653}"/>
     <pc:docChg chg="undo custSel addSld delSld modSld sldOrd modSection">
-      <pc:chgData name="Nicholson, Delmer (Bill) (nicholdw)" userId="b56c8833-ee42-4335-8085-70d597acedf2" providerId="ADAL" clId="{FB213E8F-52F0-4CAB-A62F-63FF4F093653}" dt="2024-09-20T17:36:27.888" v="1306"/>
+      <pc:chgData name="Nicholson, Delmer (Bill) (nicholdw)" userId="b56c8833-ee42-4335-8085-70d597acedf2" providerId="ADAL" clId="{FB213E8F-52F0-4CAB-A62F-63FF4F093653}" dt="2024-09-20T19:00:02.780" v="1489" actId="6549"/>
       <pc:docMkLst>
         <pc:docMk/>
       </pc:docMkLst>
@@ -249,6 +247,21 @@
             <pc:docMk/>
             <pc:sldMk cId="791857963" sldId="333"/>
             <ac:spMk id="3" creationId="{A2BCAF2E-3B20-5255-0081-D4C44F6DD16C}"/>
+          </ac:spMkLst>
+        </pc:spChg>
+      </pc:sldChg>
+      <pc:sldChg chg="modSp mod">
+        <pc:chgData name="Nicholson, Delmer (Bill) (nicholdw)" userId="b56c8833-ee42-4335-8085-70d597acedf2" providerId="ADAL" clId="{FB213E8F-52F0-4CAB-A62F-63FF4F093653}" dt="2024-09-20T18:38:24.400" v="1349" actId="6549"/>
+        <pc:sldMkLst>
+          <pc:docMk/>
+          <pc:sldMk cId="4262901382" sldId="334"/>
+        </pc:sldMkLst>
+        <pc:spChg chg="mod">
+          <ac:chgData name="Nicholson, Delmer (Bill) (nicholdw)" userId="b56c8833-ee42-4335-8085-70d597acedf2" providerId="ADAL" clId="{FB213E8F-52F0-4CAB-A62F-63FF4F093653}" dt="2024-09-20T18:38:24.400" v="1349" actId="6549"/>
+          <ac:spMkLst>
+            <pc:docMk/>
+            <pc:sldMk cId="4262901382" sldId="334"/>
+            <ac:spMk id="2" creationId="{0B9231E9-E72A-0DFF-A0DF-653DB304E14C}"/>
           </ac:spMkLst>
         </pc:spChg>
       </pc:sldChg>
@@ -428,11 +441,19 @@
         </pc:sldMkLst>
       </pc:sldChg>
       <pc:sldChg chg="addSp modSp mod">
-        <pc:chgData name="Nicholson, Delmer (Bill) (nicholdw)" userId="b56c8833-ee42-4335-8085-70d597acedf2" providerId="ADAL" clId="{FB213E8F-52F0-4CAB-A62F-63FF4F093653}" dt="2024-09-20T15:05:34.360" v="723" actId="14100"/>
+        <pc:chgData name="Nicholson, Delmer (Bill) (nicholdw)" userId="b56c8833-ee42-4335-8085-70d597acedf2" providerId="ADAL" clId="{FB213E8F-52F0-4CAB-A62F-63FF4F093653}" dt="2024-09-20T19:00:02.780" v="1489" actId="6549"/>
         <pc:sldMkLst>
           <pc:docMk/>
           <pc:sldMk cId="813828079" sldId="398"/>
         </pc:sldMkLst>
+        <pc:spChg chg="mod">
+          <ac:chgData name="Nicholson, Delmer (Bill) (nicholdw)" userId="b56c8833-ee42-4335-8085-70d597acedf2" providerId="ADAL" clId="{FB213E8F-52F0-4CAB-A62F-63FF4F093653}" dt="2024-09-20T19:00:02.780" v="1489" actId="6549"/>
+          <ac:spMkLst>
+            <pc:docMk/>
+            <pc:sldMk cId="813828079" sldId="398"/>
+            <ac:spMk id="5" creationId="{C0329D24-9711-C54F-6123-3CFB19A68259}"/>
+          </ac:spMkLst>
+        </pc:spChg>
         <pc:spChg chg="add mod">
           <ac:chgData name="Nicholson, Delmer (Bill) (nicholdw)" userId="b56c8833-ee42-4335-8085-70d597acedf2" providerId="ADAL" clId="{FB213E8F-52F0-4CAB-A62F-63FF4F093653}" dt="2024-09-20T15:05:34.360" v="723" actId="14100"/>
           <ac:spMkLst>
@@ -530,7 +551,7 @@
         </pc:sldMkLst>
       </pc:sldChg>
       <pc:sldChg chg="del">
-        <pc:chgData name="Nicholson, Delmer (Bill) (nicholdw)" userId="b56c8833-ee42-4335-8085-70d597acedf2" providerId="ADAL" clId="{FB213E8F-52F0-4CAB-A62F-63FF4F093653}" dt="2024-09-16T16:27:07.265" v="705" actId="47"/>
+        <pc:chgData name="Nicholson, Delmer (Bill) (nicholdw)" userId="b56c8833-ee42-4335-8085-70d597acedf2" providerId="ADAL" clId="{FB213E8F-52F0-4CAB-A62F-63FF4F093653}" dt="2024-09-20T18:59:28.186" v="1487" actId="2696"/>
         <pc:sldMkLst>
           <pc:docMk/>
           <pc:sldMk cId="2368070232" sldId="443"/>
@@ -597,13 +618,13 @@
         </pc:picChg>
       </pc:sldChg>
       <pc:sldChg chg="modSp mod">
-        <pc:chgData name="Nicholson, Delmer (Bill) (nicholdw)" userId="b56c8833-ee42-4335-8085-70d597acedf2" providerId="ADAL" clId="{FB213E8F-52F0-4CAB-A62F-63FF4F093653}" dt="2024-09-16T15:38:30.029" v="391" actId="27636"/>
+        <pc:chgData name="Nicholson, Delmer (Bill) (nicholdw)" userId="b56c8833-ee42-4335-8085-70d597acedf2" providerId="ADAL" clId="{FB213E8F-52F0-4CAB-A62F-63FF4F093653}" dt="2024-09-20T18:58:55.682" v="1486" actId="27636"/>
         <pc:sldMkLst>
           <pc:docMk/>
           <pc:sldMk cId="3186923783" sldId="449"/>
         </pc:sldMkLst>
         <pc:spChg chg="mod">
-          <ac:chgData name="Nicholson, Delmer (Bill) (nicholdw)" userId="b56c8833-ee42-4335-8085-70d597acedf2" providerId="ADAL" clId="{FB213E8F-52F0-4CAB-A62F-63FF4F093653}" dt="2024-09-16T15:38:30.029" v="391" actId="27636"/>
+          <ac:chgData name="Nicholson, Delmer (Bill) (nicholdw)" userId="b56c8833-ee42-4335-8085-70d597acedf2" providerId="ADAL" clId="{FB213E8F-52F0-4CAB-A62F-63FF4F093653}" dt="2024-09-20T18:58:55.682" v="1486" actId="27636"/>
           <ac:spMkLst>
             <pc:docMk/>
             <pc:sldMk cId="3186923783" sldId="449"/>
@@ -612,7 +633,7 @@
         </pc:spChg>
       </pc:sldChg>
       <pc:sldChg chg="modSp mod">
-        <pc:chgData name="Nicholson, Delmer (Bill) (nicholdw)" userId="b56c8833-ee42-4335-8085-70d597acedf2" providerId="ADAL" clId="{FB213E8F-52F0-4CAB-A62F-63FF4F093653}" dt="2024-09-20T17:00:55.761" v="1304" actId="20577"/>
+        <pc:chgData name="Nicholson, Delmer (Bill) (nicholdw)" userId="b56c8833-ee42-4335-8085-70d597acedf2" providerId="ADAL" clId="{FB213E8F-52F0-4CAB-A62F-63FF4F093653}" dt="2024-09-20T18:40:56.782" v="1395" actId="20577"/>
         <pc:sldMkLst>
           <pc:docMk/>
           <pc:sldMk cId="448040412" sldId="450"/>
@@ -626,7 +647,7 @@
           </ac:spMkLst>
         </pc:spChg>
         <pc:spChg chg="mod">
-          <ac:chgData name="Nicholson, Delmer (Bill) (nicholdw)" userId="b56c8833-ee42-4335-8085-70d597acedf2" providerId="ADAL" clId="{FB213E8F-52F0-4CAB-A62F-63FF4F093653}" dt="2024-09-20T17:00:55.761" v="1304" actId="20577"/>
+          <ac:chgData name="Nicholson, Delmer (Bill) (nicholdw)" userId="b56c8833-ee42-4335-8085-70d597acedf2" providerId="ADAL" clId="{FB213E8F-52F0-4CAB-A62F-63FF4F093653}" dt="2024-09-20T18:40:56.782" v="1395" actId="20577"/>
           <ac:spMkLst>
             <pc:docMk/>
             <pc:sldMk cId="448040412" sldId="450"/>
@@ -767,7 +788,7 @@
         </pc:spChg>
       </pc:sldChg>
       <pc:sldChg chg="modSp new mod">
-        <pc:chgData name="Nicholson, Delmer (Bill) (nicholdw)" userId="b56c8833-ee42-4335-8085-70d597acedf2" providerId="ADAL" clId="{FB213E8F-52F0-4CAB-A62F-63FF4F093653}" dt="2024-09-20T16:51:36.506" v="1139" actId="14100"/>
+        <pc:chgData name="Nicholson, Delmer (Bill) (nicholdw)" userId="b56c8833-ee42-4335-8085-70d597acedf2" providerId="ADAL" clId="{FB213E8F-52F0-4CAB-A62F-63FF4F093653}" dt="2024-09-20T18:40:16.872" v="1373" actId="20577"/>
         <pc:sldMkLst>
           <pc:docMk/>
           <pc:sldMk cId="741648780" sldId="455"/>
@@ -781,7 +802,7 @@
           </ac:spMkLst>
         </pc:spChg>
         <pc:spChg chg="mod">
-          <ac:chgData name="Nicholson, Delmer (Bill) (nicholdw)" userId="b56c8833-ee42-4335-8085-70d597acedf2" providerId="ADAL" clId="{FB213E8F-52F0-4CAB-A62F-63FF4F093653}" dt="2024-09-20T16:51:36.506" v="1139" actId="14100"/>
+          <ac:chgData name="Nicholson, Delmer (Bill) (nicholdw)" userId="b56c8833-ee42-4335-8085-70d597acedf2" providerId="ADAL" clId="{FB213E8F-52F0-4CAB-A62F-63FF4F093653}" dt="2024-09-20T18:40:16.872" v="1373" actId="20577"/>
           <ac:spMkLst>
             <pc:docMk/>
             <pc:sldMk cId="741648780" sldId="455"/>
@@ -6455,16 +6476,7 @@
           <a:p>
             <a:r>
               <a:rPr lang="en-US"/>
-              <a:t>“Question” = generically, the prompt along with the possible responses.</a:t>
-            </a:r>
-          </a:p>
-          <a:p>
-            <a:endParaRPr lang="en-US"/>
-          </a:p>
-          <a:p>
-            <a:r>
-              <a:rPr lang="en-US"/>
-              <a:t>“Input” = the prompt</a:t>
+              <a:t>“Input” = the prompt given to the LLM.</a:t>
             </a:r>
           </a:p>
           <a:p>
@@ -6472,6 +6484,18 @@
               <a:rPr lang="en-US"/>
               <a:t>“Target” = the possible responses for the input</a:t>
             </a:r>
+          </a:p>
+          <a:p>
+            <a:endParaRPr lang="en-US"/>
+          </a:p>
+          <a:p>
+            <a:r>
+              <a:rPr lang="en-US"/>
+              <a:t>“Question” = generically, the prompt along with all the possible responses.</a:t>
+            </a:r>
+          </a:p>
+          <a:p>
+            <a:endParaRPr lang="en-US"/>
           </a:p>
         </p:txBody>
       </p:sp>
@@ -6921,7 +6945,7 @@
             </a:pPr>
             <a:r>
               <a:rPr lang="en-US"/>
-              <a:t>In our code, we end up with:</a:t>
+              <a:t>In our code, we will build:</a:t>
             </a:r>
           </a:p>
           <a:p>
@@ -6950,7 +6974,7 @@
             <a:pPr lvl="2"/>
             <a:r>
               <a:rPr lang="en-US"/>
-              <a:t>Key “target” -&gt; the text of the possible responses</a:t>
+              <a:t>Key “target” -&gt; the text of all the possible responses</a:t>
             </a:r>
           </a:p>
           <a:p>
@@ -9513,7 +9537,7 @@
         </p:spPr>
         <p:txBody>
           <a:bodyPr>
-            <a:normAutofit fontScale="92500" lnSpcReduction="10000"/>
+            <a:normAutofit fontScale="62500" lnSpcReduction="20000"/>
           </a:bodyPr>
           <a:lstStyle/>
           <a:p>
@@ -9546,7 +9570,7 @@
           <a:p>
             <a:r>
               <a:rPr lang="en-US"/>
-              <a:t>Implement Sentiment Analysis</a:t>
+              <a:t>Sentiment analysis</a:t>
             </a:r>
           </a:p>
           <a:p>
@@ -9574,6 +9598,24 @@
             <a:r>
               <a:rPr lang="en-US"/>
               <a:t>Investigate grammar issues in questions </a:t>
+            </a:r>
+          </a:p>
+          <a:p>
+            <a:endParaRPr lang="en-US"/>
+          </a:p>
+          <a:p>
+            <a:r>
+              <a:rPr lang="en-US"/>
+              <a:t>Semantic analysis</a:t>
+            </a:r>
+          </a:p>
+          <a:p>
+            <a:endParaRPr lang="en-US"/>
+          </a:p>
+          <a:p>
+            <a:r>
+              <a:rPr lang="en-US"/>
+              <a:t>More data visualization</a:t>
             </a:r>
           </a:p>
           <a:p>
@@ -10949,208 +10991,6 @@
     <p:extLst>
       <p:ext uri="{BB962C8B-B14F-4D97-AF65-F5344CB8AC3E}">
         <p14:creationId xmlns:p14="http://schemas.microsoft.com/office/powerpoint/2010/main" val="2267048560"/>
-      </p:ext>
-    </p:extLst>
-  </p:cSld>
-  <p:clrMapOvr>
-    <a:masterClrMapping/>
-  </p:clrMapOvr>
-</p:sld>
-</file>
-
-<file path=ppt/slides/slide26.xml><?xml version="1.0" encoding="utf-8"?>
-<p:sld xmlns:a="http://schemas.openxmlformats.org/drawingml/2006/main" xmlns:r="http://schemas.openxmlformats.org/officeDocument/2006/relationships" xmlns:p="http://schemas.openxmlformats.org/presentationml/2006/main">
-  <p:cSld>
-    <p:spTree>
-      <p:nvGrpSpPr>
-        <p:cNvPr id="1" name=""/>
-        <p:cNvGrpSpPr/>
-        <p:nvPr/>
-      </p:nvGrpSpPr>
-      <p:grpSpPr>
-        <a:xfrm>
-          <a:off x="0" y="0"/>
-          <a:ext cx="0" cy="0"/>
-          <a:chOff x="0" y="0"/>
-          <a:chExt cx="0" cy="0"/>
-        </a:xfrm>
-      </p:grpSpPr>
-      <p:sp>
-        <p:nvSpPr>
-          <p:cNvPr id="3" name="TextBox 2">
-            <a:extLst>
-              <a:ext uri="{FF2B5EF4-FFF2-40B4-BE49-F238E27FC236}">
-                <a16:creationId xmlns:a16="http://schemas.microsoft.com/office/drawing/2014/main" id="{E7B4704E-22A9-45B6-0D62-539487552579}"/>
-              </a:ext>
-            </a:extLst>
-          </p:cNvPr>
-          <p:cNvSpPr txBox="1"/>
-          <p:nvPr/>
-        </p:nvSpPr>
-        <p:spPr>
-          <a:xfrm>
-            <a:off x="2219325" y="2110859"/>
-            <a:ext cx="6096000" cy="369332"/>
-          </a:xfrm>
-          <a:prstGeom prst="rect">
-            <a:avLst/>
-          </a:prstGeom>
-          <a:noFill/>
-        </p:spPr>
-        <p:txBody>
-          <a:bodyPr wrap="square">
-            <a:spAutoFit/>
-          </a:bodyPr>
-          <a:lstStyle/>
-          <a:p>
-            <a:r>
-              <a:rPr lang="en-US" dirty="0"/>
-              <a:t>Which expression is equivalent to 5(4x + 3) — 2x?</a:t>
-            </a:r>
-          </a:p>
-        </p:txBody>
-      </p:sp>
-      <p:sp>
-        <p:nvSpPr>
-          <p:cNvPr id="4" name="TextBox 3">
-            <a:extLst>
-              <a:ext uri="{FF2B5EF4-FFF2-40B4-BE49-F238E27FC236}">
-                <a16:creationId xmlns:a16="http://schemas.microsoft.com/office/drawing/2014/main" id="{CE9D3CE3-4266-AE1F-3726-21ECC175672B}"/>
-              </a:ext>
-            </a:extLst>
-          </p:cNvPr>
-          <p:cNvSpPr txBox="1"/>
-          <p:nvPr/>
-        </p:nvSpPr>
-        <p:spPr>
-          <a:xfrm>
-            <a:off x="117566" y="6318689"/>
-            <a:ext cx="2130007" cy="400110"/>
-          </a:xfrm>
-          <a:prstGeom prst="rect">
-            <a:avLst/>
-          </a:prstGeom>
-          <a:solidFill>
-            <a:schemeClr val="bg1"/>
-          </a:solidFill>
-          <a:effectLst>
-            <a:outerShdw blurRad="50800" dist="38100" dir="8100000" algn="tr" rotWithShape="0">
-              <a:prstClr val="black">
-                <a:alpha val="40000"/>
-              </a:prstClr>
-            </a:outerShdw>
-          </a:effectLst>
-        </p:spPr>
-        <p:txBody>
-          <a:bodyPr wrap="none" rtlCol="0">
-            <a:spAutoFit/>
-          </a:bodyPr>
-          <a:lstStyle/>
-          <a:p>
-            <a:r>
-              <a:rPr lang="en-US" sz="2000" dirty="0"/>
-              <a:t>MMLU Benchmark</a:t>
-            </a:r>
-          </a:p>
-        </p:txBody>
-      </p:sp>
-      <p:sp>
-        <p:nvSpPr>
-          <p:cNvPr id="6" name="TextBox 5">
-            <a:extLst>
-              <a:ext uri="{FF2B5EF4-FFF2-40B4-BE49-F238E27FC236}">
-                <a16:creationId xmlns:a16="http://schemas.microsoft.com/office/drawing/2014/main" id="{3B121110-EC68-C89C-994C-82ACF90B6E21}"/>
-              </a:ext>
-            </a:extLst>
-          </p:cNvPr>
-          <p:cNvSpPr txBox="1"/>
-          <p:nvPr/>
-        </p:nvSpPr>
-        <p:spPr>
-          <a:xfrm>
-            <a:off x="5518547" y="2930009"/>
-            <a:ext cx="1154906" cy="369332"/>
-          </a:xfrm>
-          <a:prstGeom prst="rect">
-            <a:avLst/>
-          </a:prstGeom>
-          <a:noFill/>
-        </p:spPr>
-        <p:txBody>
-          <a:bodyPr wrap="square">
-            <a:spAutoFit/>
-          </a:bodyPr>
-          <a:lstStyle/>
-          <a:p>
-            <a:r>
-              <a:rPr lang="en-US" dirty="0">
-                <a:highlight>
-                  <a:srgbClr val="FFFF00"/>
-                </a:highlight>
-              </a:rPr>
-              <a:t>18x+15</a:t>
-            </a:r>
-          </a:p>
-        </p:txBody>
-      </p:sp>
-      <p:sp>
-        <p:nvSpPr>
-          <p:cNvPr id="2" name="Title 1">
-            <a:extLst>
-              <a:ext uri="{FF2B5EF4-FFF2-40B4-BE49-F238E27FC236}">
-                <a16:creationId xmlns:a16="http://schemas.microsoft.com/office/drawing/2014/main" id="{FB539843-02B4-7CD1-BC84-A9B57FF116F9}"/>
-              </a:ext>
-            </a:extLst>
-          </p:cNvPr>
-          <p:cNvSpPr txBox="1">
-            <a:spLocks/>
-          </p:cNvSpPr>
-          <p:nvPr/>
-        </p:nvSpPr>
-        <p:spPr>
-          <a:xfrm>
-            <a:off x="609600" y="274638"/>
-            <a:ext cx="10972800" cy="656091"/>
-          </a:xfrm>
-          <a:prstGeom prst="rect">
-            <a:avLst/>
-          </a:prstGeom>
-        </p:spPr>
-        <p:txBody>
-          <a:bodyPr>
-            <a:normAutofit fontScale="97500" lnSpcReduction="10000"/>
-          </a:bodyPr>
-          <a:lstStyle>
-            <a:lvl1pPr algn="l" defTabSz="914400" rtl="0" eaLnBrk="1" latinLnBrk="0" hangingPunct="1">
-              <a:lnSpc>
-                <a:spcPct val="90000"/>
-              </a:lnSpc>
-              <a:spcBef>
-                <a:spcPct val="0"/>
-              </a:spcBef>
-              <a:buNone/>
-              <a:defRPr sz="4400" kern="1200">
-                <a:solidFill>
-                  <a:schemeClr val="tx1"/>
-                </a:solidFill>
-                <a:latin typeface="+mj-lt"/>
-                <a:ea typeface="+mj-ea"/>
-                <a:cs typeface="+mj-cs"/>
-              </a:defRPr>
-            </a:lvl1pPr>
-          </a:lstStyle>
-          <a:p>
-            <a:r>
-              <a:rPr lang="en-US" dirty="0"/>
-              <a:t>Previous question and correct answer</a:t>
-            </a:r>
-          </a:p>
-        </p:txBody>
-      </p:sp>
-    </p:spTree>
-    <p:extLst>
-      <p:ext uri="{BB962C8B-B14F-4D97-AF65-F5344CB8AC3E}">
-        <p14:creationId xmlns:p14="http://schemas.microsoft.com/office/powerpoint/2010/main" val="2368070232"/>
       </p:ext>
     </p:extLst>
   </p:cSld>
@@ -12041,12 +11881,9 @@
           <a:p>
             <a:r>
               <a:rPr lang="en-US"/>
-              <a:t>Benchmarks processed </a:t>
-            </a:r>
-            <a:r>
-              <a:rPr lang="en-US" dirty="0"/>
-              <a:t>today</a:t>
-            </a:r>
+              <a:t>Some Interesting Benchmarks</a:t>
+            </a:r>
+            <a:endParaRPr lang="en-US" dirty="0"/>
           </a:p>
         </p:txBody>
       </p:sp>
@@ -12281,8 +12118,13 @@
             </a:pPr>
             <a:r>
               <a:rPr lang="en-US" dirty="0"/>
-              <a:t>“Questions wherein humans outperformed LLMs  ”</a:t>
-            </a:r>
+              <a:t>“Questions wherein humans </a:t>
+            </a:r>
+            <a:r>
+              <a:rPr lang="en-US"/>
+              <a:t>outperformed LLMs”</a:t>
+            </a:r>
+            <a:endParaRPr lang="en-US" dirty="0"/>
           </a:p>
         </p:txBody>
       </p:sp>

</xml_diff>